<commit_message>
changed size of N for simulation data, added Resüme
</commit_message>
<xml_diff>
--- a/presentation/tsa_presentation_final.pptx
+++ b/presentation/tsa_presentation_final.pptx
@@ -817,42 +817,6 @@
           <a:bodyPr/>
           <a:lstStyle/>
           <a:p>
-            <a:pPr marL="0" marR="0" lvl="0" indent="0" algn="l" defTabSz="914400" rtl="0" eaLnBrk="1" fontAlgn="auto" latinLnBrk="0" hangingPunct="1">
-              <a:lnSpc>
-                <a:spcPct val="100000"/>
-              </a:lnSpc>
-              <a:spcBef>
-                <a:spcPts val="0"/>
-              </a:spcBef>
-              <a:spcAft>
-                <a:spcPts val="0"/>
-              </a:spcAft>
-              <a:buClrTx/>
-              <a:buSzTx/>
-              <a:buFontTx/>
-              <a:buNone/>
-              <a:tabLst/>
-              <a:defRPr/>
-            </a:pPr>
-            <a:r>
-              <a:rPr lang="de-DE" dirty="0"/>
-              <a:t>Quadratisch → Grad 2, liefert</a:t>
-            </a:r>
-            <a:r>
-              <a:rPr lang="de-DE" baseline="0" dirty="0"/>
-              <a:t> gute </a:t>
-            </a:r>
-            <a:r>
-              <a:rPr lang="de-DE" baseline="0" dirty="0" err="1"/>
-              <a:t>Fits</a:t>
-            </a:r>
-            <a:r>
-              <a:rPr lang="de-DE" baseline="0" dirty="0"/>
-              <a:t> für Konstante Daten (Grad 0), lineare Daten (Grad 1) und  quadratische Daten (Grad 2)</a:t>
-            </a:r>
-            <a:endParaRPr lang="de-DE" dirty="0"/>
-          </a:p>
-          <a:p>
             <a:endParaRPr lang="de-DE" dirty="0"/>
           </a:p>
         </p:txBody>
@@ -1358,8 +1322,12 @@
           <a:lstStyle/>
           <a:p>
             <a:r>
+              <a:rPr lang="de-DE" dirty="0" smtClean="0"/>
+              <a:t>Zu </a:t>
+            </a:r>
+            <a:r>
               <a:rPr lang="de-DE" dirty="0"/>
-              <a:t>Zu GARCH(1,1):</a:t>
+              <a:t>GARCH(1,1):</a:t>
             </a:r>
             <a:r>
               <a:rPr lang="de-DE" baseline="0" dirty="0"/>
@@ -8717,8 +8685,8 @@
           </a:p>
         </p:txBody>
       </p:sp>
-      <mc:AlternateContent xmlns:mc="http://schemas.openxmlformats.org/markup-compatibility/2006" xmlns:a14="http://schemas.microsoft.com/office/drawing/2010/main">
-        <mc:Choice Requires="a14">
+      <mc:AlternateContent xmlns:mc="http://schemas.openxmlformats.org/markup-compatibility/2006">
+        <mc:Choice xmlns:a14="http://schemas.microsoft.com/office/drawing/2010/main" Requires="a14">
           <p:sp>
             <p:nvSpPr>
               <p:cNvPr id="4" name="Inhaltsplatzhalter 3"/>
@@ -8736,8 +8704,13 @@
               <a:p>
                 <a:r>
                   <a:rPr lang="de-DE" dirty="0"/>
-                  <a:t>Daten im Zeitreihenkontext mit n = 1000</a:t>
+                  <a:t>Daten im Zeitreihenkontext mit n = </a:t>
                 </a:r>
+                <a:r>
+                  <a:rPr lang="de-DE" dirty="0"/>
+                  <a:t>100000</a:t>
+                </a:r>
+                <a:endParaRPr lang="de-DE" dirty="0"/>
               </a:p>
               <a:p>
                 <a14:m>
@@ -9100,7 +9073,7 @@
             </p:txBody>
           </p:sp>
         </mc:Choice>
-        <mc:Fallback xmlns="">
+        <mc:Fallback>
           <p:sp>
             <p:nvSpPr>
               <p:cNvPr id="4" name="Inhaltsplatzhalter 3"/>
@@ -9157,8 +9130,8 @@
           </a:p>
         </p:txBody>
       </p:sp>
-      <mc:AlternateContent xmlns:mc="http://schemas.openxmlformats.org/markup-compatibility/2006" xmlns:a14="http://schemas.microsoft.com/office/drawing/2010/main">
-        <mc:Choice Requires="a14">
+      <mc:AlternateContent xmlns:mc="http://schemas.openxmlformats.org/markup-compatibility/2006">
+        <mc:Choice xmlns:a14="http://schemas.microsoft.com/office/drawing/2010/main" Requires="a14">
           <p:sp>
             <p:nvSpPr>
               <p:cNvPr id="6" name="Inhaltsplatzhalter 5"/>
@@ -9176,8 +9149,13 @@
               <a:p>
                 <a:r>
                   <a:rPr lang="de-DE" dirty="0"/>
-                  <a:t>Daten im Zeitreihenkontext mit n = 1000</a:t>
+                  <a:t>Daten im Zeitreihenkontext mit n = </a:t>
                 </a:r>
+                <a:r>
+                  <a:rPr lang="de-DE" dirty="0"/>
+                  <a:t>100000</a:t>
+                </a:r>
+                <a:endParaRPr lang="de-DE" dirty="0"/>
               </a:p>
               <a:p>
                 <a14:m>
@@ -9737,7 +9715,7 @@
             </p:txBody>
           </p:sp>
         </mc:Choice>
-        <mc:Fallback xmlns="">
+        <mc:Fallback>
           <p:sp>
             <p:nvSpPr>
               <p:cNvPr id="6" name="Inhaltsplatzhalter 5"/>
@@ -10405,13 +10383,13 @@
               </a:ext>
             </a:extLst>
           </a:blip>
-          <a:srcRect t="13735"/>
+          <a:srcRect t="15362"/>
           <a:stretch/>
         </p:blipFill>
         <p:spPr>
           <a:xfrm>
-            <a:off x="683568" y="3407845"/>
-            <a:ext cx="2016224" cy="1324146"/>
+            <a:off x="466852" y="3507853"/>
+            <a:ext cx="2341146" cy="1156603"/>
           </a:xfrm>
           <a:prstGeom prst="rect">
             <a:avLst/>
@@ -10434,13 +10412,13 @@
               </a:ext>
             </a:extLst>
           </a:blip>
-          <a:srcRect t="11143"/>
+          <a:srcRect t="15848"/>
           <a:stretch/>
         </p:blipFill>
         <p:spPr>
           <a:xfrm>
-            <a:off x="3563888" y="3407844"/>
-            <a:ext cx="2016224" cy="1291912"/>
+            <a:off x="3414708" y="3507853"/>
+            <a:ext cx="2309420" cy="1134379"/>
           </a:xfrm>
           <a:prstGeom prst="rect">
             <a:avLst/>
@@ -10455,7 +10433,7 @@
           </p:cNvPicPr>
           <p:nvPr/>
         </p:nvPicPr>
-        <p:blipFill>
+        <p:blipFill rotWithShape="1">
           <a:blip r:embed="rId8" cstate="print">
             <a:extLst>
               <a:ext uri="{28A0092B-C50C-407E-A947-70E740481C1C}">
@@ -10463,14 +10441,13 @@
               </a:ext>
             </a:extLst>
           </a:blip>
-          <a:stretch>
-            <a:fillRect/>
-          </a:stretch>
+          <a:srcRect t="13579"/>
+          <a:stretch/>
         </p:blipFill>
         <p:spPr>
           <a:xfrm>
-            <a:off x="6444208" y="3377841"/>
-            <a:ext cx="2088231" cy="1291912"/>
+            <a:off x="6300192" y="3468286"/>
+            <a:ext cx="2309420" cy="1164958"/>
           </a:xfrm>
           <a:prstGeom prst="rect">
             <a:avLst/>
@@ -10568,12 +10545,16 @@
           </p:cNvGraphicFramePr>
           <p:nvPr>
             <p:ph sz="half" idx="2"/>
-            <p:extLst/>
+            <p:extLst>
+              <p:ext uri="{D42A27DB-BD31-4B8C-83A1-F6EECF244321}">
+                <p14:modId xmlns:p14="http://schemas.microsoft.com/office/powerpoint/2010/main" val="2891772774"/>
+              </p:ext>
+            </p:extLst>
           </p:nvPr>
         </p:nvGraphicFramePr>
         <p:xfrm>
-          <a:off x="323850" y="1419228"/>
-          <a:ext cx="4173540" cy="2232637"/>
+          <a:off x="323850" y="1419224"/>
+          <a:ext cx="4173540" cy="2258410"/>
         </p:xfrm>
         <a:graphic>
           <a:graphicData uri="http://schemas.openxmlformats.org/drawingml/2006/table">
@@ -10625,7 +10606,7 @@
                   </a:extLst>
                 </a:gridCol>
               </a:tblGrid>
-              <a:tr h="202967">
+              <a:tr h="225841">
                 <a:tc>
                   <a:txBody>
                     <a:bodyPr/>
@@ -10770,140 +10751,7 @@
                   </a:ext>
                 </a:extLst>
               </a:tr>
-              <a:tr h="202967">
-                <a:tc>
-                  <a:txBody>
-                    <a:bodyPr/>
-                    <a:lstStyle/>
-                    <a:p>
-                      <a:pPr algn="l" fontAlgn="b"/>
-                      <a:r>
-                        <a:rPr lang="de-DE" sz="1100" u="none" strike="noStrike" dirty="0">
-                          <a:effectLst/>
-                        </a:rPr>
-                        <a:t>ARCH(0)</a:t>
-                      </a:r>
-                      <a:endParaRPr lang="de-DE" sz="1100" b="0" i="0" u="none" strike="noStrike" dirty="0">
-                        <a:solidFill>
-                          <a:srgbClr val="000000"/>
-                        </a:solidFill>
-                        <a:effectLst/>
-                        <a:latin typeface="Calibri" panose="020F0502020204030204" pitchFamily="34" charset="0"/>
-                      </a:endParaRPr>
-                    </a:p>
-                  </a:txBody>
-                  <a:tcPr marL="9525" marR="9525" marT="9525" marB="0" anchor="ctr"/>
-                </a:tc>
-                <a:tc>
-                  <a:txBody>
-                    <a:bodyPr/>
-                    <a:lstStyle/>
-                    <a:p>
-                      <a:pPr algn="l" fontAlgn="b"/>
-                      <a:r>
-                        <a:rPr lang="de-DE" sz="1100" u="none" strike="noStrike" dirty="0">
-                          <a:effectLst/>
-                        </a:rPr>
-                        <a:t>0</a:t>
-                      </a:r>
-                      <a:endParaRPr lang="de-DE" sz="1100" b="0" i="0" u="none" strike="noStrike" dirty="0">
-                        <a:solidFill>
-                          <a:srgbClr val="000000"/>
-                        </a:solidFill>
-                        <a:effectLst/>
-                        <a:latin typeface="Calibri" panose="020F0502020204030204" pitchFamily="34" charset="0"/>
-                      </a:endParaRPr>
-                    </a:p>
-                  </a:txBody>
-                  <a:tcPr marL="9525" marR="9525" marT="9525" marB="0" anchor="ctr"/>
-                </a:tc>
-                <a:tc>
-                  <a:txBody>
-                    <a:bodyPr/>
-                    <a:lstStyle/>
-                    <a:p>
-                      <a:pPr algn="l" fontAlgn="b"/>
-                      <a:r>
-                        <a:rPr lang="de-DE" sz="1100" b="0" i="0" u="none" strike="noStrike" dirty="0">
-                          <a:solidFill>
-                            <a:srgbClr val="000000"/>
-                          </a:solidFill>
-                          <a:effectLst/>
-                          <a:latin typeface="Calibri" panose="020F0502020204030204" pitchFamily="34" charset="0"/>
-                        </a:rPr>
-                        <a:t>-1741,88</a:t>
-                      </a:r>
-                    </a:p>
-                  </a:txBody>
-                  <a:tcPr marL="9525" marR="9525" marT="9525" marB="0" anchor="b"/>
-                </a:tc>
-                <a:tc>
-                  <a:txBody>
-                    <a:bodyPr/>
-                    <a:lstStyle/>
-                    <a:p>
-                      <a:pPr algn="l" fontAlgn="b"/>
-                      <a:r>
-                        <a:rPr lang="de-DE" sz="1100" b="0" i="0" u="none" strike="noStrike" dirty="0">
-                          <a:solidFill>
-                            <a:srgbClr val="000000"/>
-                          </a:solidFill>
-                          <a:effectLst/>
-                          <a:latin typeface="Calibri" panose="020F0502020204030204" pitchFamily="34" charset="0"/>
-                        </a:rPr>
-                        <a:t>3485,758</a:t>
-                      </a:r>
-                    </a:p>
-                  </a:txBody>
-                  <a:tcPr marL="9525" marR="9525" marT="9525" marB="0" anchor="b"/>
-                </a:tc>
-                <a:tc>
-                  <a:txBody>
-                    <a:bodyPr/>
-                    <a:lstStyle/>
-                    <a:p>
-                      <a:pPr algn="l" fontAlgn="b"/>
-                      <a:r>
-                        <a:rPr lang="de-DE" sz="1100" b="0" i="0" u="none" strike="noStrike">
-                          <a:solidFill>
-                            <a:srgbClr val="000000"/>
-                          </a:solidFill>
-                          <a:effectLst/>
-                          <a:latin typeface="Calibri" panose="020F0502020204030204" pitchFamily="34" charset="0"/>
-                        </a:rPr>
-                        <a:t>3483,758</a:t>
-                      </a:r>
-                    </a:p>
-                  </a:txBody>
-                  <a:tcPr marL="9525" marR="9525" marT="9525" marB="0" anchor="b"/>
-                </a:tc>
-                <a:tc>
-                  <a:txBody>
-                    <a:bodyPr/>
-                    <a:lstStyle/>
-                    <a:p>
-                      <a:pPr algn="l" fontAlgn="b"/>
-                      <a:r>
-                        <a:rPr lang="de-DE" sz="1100" b="0" i="0" u="none" strike="noStrike">
-                          <a:solidFill>
-                            <a:srgbClr val="000000"/>
-                          </a:solidFill>
-                          <a:effectLst/>
-                          <a:latin typeface="Calibri" panose="020F0502020204030204" pitchFamily="34" charset="0"/>
-                        </a:rPr>
-                        <a:t>3483,758</a:t>
-                      </a:r>
-                    </a:p>
-                  </a:txBody>
-                  <a:tcPr marL="9525" marR="9525" marT="9525" marB="0" anchor="b"/>
-                </a:tc>
-                <a:extLst>
-                  <a:ext uri="{0D108BD9-81ED-4DB2-BD59-A6C34878D82A}">
-                    <a16:rowId xmlns:a16="http://schemas.microsoft.com/office/drawing/2014/main" val="4028447143"/>
-                  </a:ext>
-                </a:extLst>
-              </a:tr>
-              <a:tr h="202967">
+              <a:tr h="225841">
                 <a:tc>
                   <a:txBody>
                     <a:bodyPr/>
@@ -10969,14 +10817,66 @@
                     <a:p>
                       <a:pPr algn="l" fontAlgn="b"/>
                       <a:r>
-                        <a:rPr lang="de-DE" sz="1100" b="1" i="0" u="none" strike="noStrike" dirty="0">
+                        <a:rPr lang="de-DE" sz="1100" b="1" i="0" u="none" strike="noStrike">
                           <a:solidFill>
                             <a:srgbClr val="000000"/>
                           </a:solidFill>
                           <a:effectLst/>
                           <a:latin typeface="Calibri" panose="020F0502020204030204" pitchFamily="34" charset="0"/>
                         </a:rPr>
-                        <a:t>-1656,26</a:t>
+                        <a:t>-166817</a:t>
+                      </a:r>
+                    </a:p>
+                  </a:txBody>
+                  <a:tcPr marL="9525" marR="9525" marT="9525" marB="0" anchor="b">
+                    <a:solidFill>
+                      <a:schemeClr val="accent3">
+                        <a:lumMod val="75000"/>
+                      </a:schemeClr>
+                    </a:solidFill>
+                  </a:tcPr>
+                </a:tc>
+                <a:tc>
+                  <a:txBody>
+                    <a:bodyPr/>
+                    <a:lstStyle/>
+                    <a:p>
+                      <a:pPr algn="l" fontAlgn="b"/>
+                      <a:r>
+                        <a:rPr lang="de-DE" sz="1100" b="1" i="0" u="none" strike="noStrike">
+                          <a:solidFill>
+                            <a:srgbClr val="000000"/>
+                          </a:solidFill>
+                          <a:effectLst/>
+                          <a:latin typeface="Calibri" panose="020F0502020204030204" pitchFamily="34" charset="0"/>
+                        </a:rPr>
+                        <a:t>333637,8</a:t>
+                      </a:r>
+                    </a:p>
+                  </a:txBody>
+                  <a:tcPr marL="9525" marR="9525" marT="9525" marB="0" anchor="b">
+                    <a:solidFill>
+                      <a:schemeClr val="accent3">
+                        <a:lumMod val="75000"/>
+                      </a:schemeClr>
+                    </a:solidFill>
+                  </a:tcPr>
+                </a:tc>
+                <a:tc>
+                  <a:txBody>
+                    <a:bodyPr/>
+                    <a:lstStyle/>
+                    <a:p>
+                      <a:pPr algn="l" fontAlgn="b"/>
+                      <a:r>
+                        <a:rPr lang="de-DE" sz="1100" b="1" i="0" u="none" strike="noStrike">
+                          <a:solidFill>
+                            <a:srgbClr val="000000"/>
+                          </a:solidFill>
+                          <a:effectLst/>
+                          <a:latin typeface="Calibri" panose="020F0502020204030204" pitchFamily="34" charset="0"/>
+                        </a:rPr>
+                        <a:t>333635,8</a:t>
                       </a:r>
                     </a:p>
                   </a:txBody>
@@ -11002,59 +10902,7 @@
                           <a:effectLst/>
                           <a:latin typeface="Calibri" panose="020F0502020204030204" pitchFamily="34" charset="0"/>
                         </a:rPr>
-                        <a:t>3316,522</a:t>
-                      </a:r>
-                    </a:p>
-                  </a:txBody>
-                  <a:tcPr marL="9525" marR="9525" marT="9525" marB="0" anchor="b">
-                    <a:solidFill>
-                      <a:schemeClr val="accent3">
-                        <a:lumMod val="75000"/>
-                      </a:schemeClr>
-                    </a:solidFill>
-                  </a:tcPr>
-                </a:tc>
-                <a:tc>
-                  <a:txBody>
-                    <a:bodyPr/>
-                    <a:lstStyle/>
-                    <a:p>
-                      <a:pPr algn="l" fontAlgn="b"/>
-                      <a:r>
-                        <a:rPr lang="de-DE" sz="1100" b="1" i="0" u="none" strike="noStrike">
-                          <a:solidFill>
-                            <a:srgbClr val="000000"/>
-                          </a:solidFill>
-                          <a:effectLst/>
-                          <a:latin typeface="Calibri" panose="020F0502020204030204" pitchFamily="34" charset="0"/>
-                        </a:rPr>
-                        <a:t>3314,526</a:t>
-                      </a:r>
-                    </a:p>
-                  </a:txBody>
-                  <a:tcPr marL="9525" marR="9525" marT="9525" marB="0" anchor="b">
-                    <a:solidFill>
-                      <a:schemeClr val="accent3">
-                        <a:lumMod val="75000"/>
-                      </a:schemeClr>
-                    </a:solidFill>
-                  </a:tcPr>
-                </a:tc>
-                <a:tc>
-                  <a:txBody>
-                    <a:bodyPr/>
-                    <a:lstStyle/>
-                    <a:p>
-                      <a:pPr algn="l" fontAlgn="b"/>
-                      <a:r>
-                        <a:rPr lang="de-DE" sz="1100" b="1" i="0" u="none" strike="noStrike" dirty="0">
-                          <a:solidFill>
-                            <a:srgbClr val="000000"/>
-                          </a:solidFill>
-                          <a:effectLst/>
-                          <a:latin typeface="Calibri" panose="020F0502020204030204" pitchFamily="34" charset="0"/>
-                        </a:rPr>
-                        <a:t>3319,429</a:t>
+                        <a:t>333645,3</a:t>
                       </a:r>
                     </a:p>
                   </a:txBody>
@@ -11072,7 +10920,7 @@
                   </a:ext>
                 </a:extLst>
               </a:tr>
-              <a:tr h="202967">
+              <a:tr h="225841">
                 <a:tc>
                   <a:txBody>
                     <a:bodyPr/>
@@ -11126,14 +10974,54 @@
                     <a:p>
                       <a:pPr algn="l" fontAlgn="b"/>
                       <a:r>
-                        <a:rPr lang="de-DE" sz="1100" b="0" i="0" u="none" strike="noStrike" dirty="0">
+                        <a:rPr lang="de-DE" sz="1100" b="0" i="0" u="none" strike="noStrike">
                           <a:solidFill>
                             <a:srgbClr val="000000"/>
                           </a:solidFill>
                           <a:effectLst/>
                           <a:latin typeface="Calibri" panose="020F0502020204030204" pitchFamily="34" charset="0"/>
                         </a:rPr>
-                        <a:t>-1687,01</a:t>
+                        <a:t>-170019</a:t>
+                      </a:r>
+                    </a:p>
+                  </a:txBody>
+                  <a:tcPr marL="9525" marR="9525" marT="9525" marB="0" anchor="b"/>
+                </a:tc>
+                <a:tc>
+                  <a:txBody>
+                    <a:bodyPr/>
+                    <a:lstStyle/>
+                    <a:p>
+                      <a:pPr algn="l" fontAlgn="b"/>
+                      <a:r>
+                        <a:rPr lang="de-DE" sz="1100" b="0" i="0" u="none" strike="noStrike">
+                          <a:solidFill>
+                            <a:srgbClr val="000000"/>
+                          </a:solidFill>
+                          <a:effectLst/>
+                          <a:latin typeface="Calibri" panose="020F0502020204030204" pitchFamily="34" charset="0"/>
+                        </a:rPr>
+                        <a:t>340043,2</a:t>
+                      </a:r>
+                    </a:p>
+                  </a:txBody>
+                  <a:tcPr marL="9525" marR="9525" marT="9525" marB="0" anchor="b"/>
+                </a:tc>
+                <a:tc>
+                  <a:txBody>
+                    <a:bodyPr/>
+                    <a:lstStyle/>
+                    <a:p>
+                      <a:pPr algn="l" fontAlgn="b"/>
+                      <a:r>
+                        <a:rPr lang="de-DE" sz="1100" b="0" i="0" u="none" strike="noStrike">
+                          <a:solidFill>
+                            <a:srgbClr val="000000"/>
+                          </a:solidFill>
+                          <a:effectLst/>
+                          <a:latin typeface="Calibri" panose="020F0502020204030204" pitchFamily="34" charset="0"/>
+                        </a:rPr>
+                        <a:t>340041,2</a:t>
                       </a:r>
                     </a:p>
                   </a:txBody>
@@ -11153,47 +11041,7 @@
                           <a:effectLst/>
                           <a:latin typeface="Calibri" panose="020F0502020204030204" pitchFamily="34" charset="0"/>
                         </a:rPr>
-                        <a:t>3380,026</a:t>
-                      </a:r>
-                    </a:p>
-                  </a:txBody>
-                  <a:tcPr marL="9525" marR="9525" marT="9525" marB="0" anchor="b"/>
-                </a:tc>
-                <a:tc>
-                  <a:txBody>
-                    <a:bodyPr/>
-                    <a:lstStyle/>
-                    <a:p>
-                      <a:pPr algn="l" fontAlgn="b"/>
-                      <a:r>
-                        <a:rPr lang="de-DE" sz="1100" b="0" i="0" u="none" strike="noStrike" dirty="0">
-                          <a:solidFill>
-                            <a:srgbClr val="000000"/>
-                          </a:solidFill>
-                          <a:effectLst/>
-                          <a:latin typeface="Calibri" panose="020F0502020204030204" pitchFamily="34" charset="0"/>
-                        </a:rPr>
-                        <a:t>3378,038</a:t>
-                      </a:r>
-                    </a:p>
-                  </a:txBody>
-                  <a:tcPr marL="9525" marR="9525" marT="9525" marB="0" anchor="b"/>
-                </a:tc>
-                <a:tc>
-                  <a:txBody>
-                    <a:bodyPr/>
-                    <a:lstStyle/>
-                    <a:p>
-                      <a:pPr algn="l" fontAlgn="b"/>
-                      <a:r>
-                        <a:rPr lang="de-DE" sz="1100" b="0" i="0" u="none" strike="noStrike" dirty="0">
-                          <a:solidFill>
-                            <a:srgbClr val="000000"/>
-                          </a:solidFill>
-                          <a:effectLst/>
-                          <a:latin typeface="Calibri" panose="020F0502020204030204" pitchFamily="34" charset="0"/>
-                        </a:rPr>
-                        <a:t>3387,842</a:t>
+                        <a:t>340060,2</a:t>
                       </a:r>
                     </a:p>
                   </a:txBody>
@@ -11205,7 +11053,7 @@
                   </a:ext>
                 </a:extLst>
               </a:tr>
-              <a:tr h="202967">
+              <a:tr h="225841">
                 <a:tc>
                   <a:txBody>
                     <a:bodyPr/>
@@ -11259,34 +11107,14 @@
                     <a:p>
                       <a:pPr algn="l" fontAlgn="b"/>
                       <a:r>
-                        <a:rPr lang="de-DE" sz="1100" b="0" i="0" u="none" strike="noStrike" dirty="0">
+                        <a:rPr lang="de-DE" sz="1100" b="0" i="0" u="none" strike="noStrike">
                           <a:solidFill>
                             <a:srgbClr val="000000"/>
                           </a:solidFill>
                           <a:effectLst/>
                           <a:latin typeface="Calibri" panose="020F0502020204030204" pitchFamily="34" charset="0"/>
                         </a:rPr>
-                        <a:t>-1680,74</a:t>
-                      </a:r>
-                    </a:p>
-                  </a:txBody>
-                  <a:tcPr marL="9525" marR="9525" marT="9525" marB="0" anchor="b"/>
-                </a:tc>
-                <a:tc>
-                  <a:txBody>
-                    <a:bodyPr/>
-                    <a:lstStyle/>
-                    <a:p>
-                      <a:pPr algn="l" fontAlgn="b"/>
-                      <a:r>
-                        <a:rPr lang="de-DE" sz="1100" b="0" i="0" u="none" strike="noStrike" dirty="0">
-                          <a:solidFill>
-                            <a:srgbClr val="000000"/>
-                          </a:solidFill>
-                          <a:effectLst/>
-                          <a:latin typeface="Calibri" panose="020F0502020204030204" pitchFamily="34" charset="0"/>
-                        </a:rPr>
-                        <a:t>3369,477</a:t>
+                        <a:t>-170219</a:t>
                       </a:r>
                     </a:p>
                   </a:txBody>
@@ -11306,7 +11134,7 @@
                           <a:effectLst/>
                           <a:latin typeface="Calibri" panose="020F0502020204030204" pitchFamily="34" charset="0"/>
                         </a:rPr>
-                        <a:t>3367,501</a:t>
+                        <a:t>340446,3</a:t>
                       </a:r>
                     </a:p>
                   </a:txBody>
@@ -11319,14 +11147,34 @@
                     <a:p>
                       <a:pPr algn="l" fontAlgn="b"/>
                       <a:r>
-                        <a:rPr lang="de-DE" sz="1100" b="0" i="0" u="none" strike="noStrike" dirty="0">
+                        <a:rPr lang="de-DE" sz="1100" b="0" i="0" u="none" strike="noStrike">
                           <a:solidFill>
                             <a:srgbClr val="000000"/>
                           </a:solidFill>
                           <a:effectLst/>
                           <a:latin typeface="Calibri" panose="020F0502020204030204" pitchFamily="34" charset="0"/>
                         </a:rPr>
-                        <a:t>3382,2</a:t>
+                        <a:t>340444,3</a:t>
+                      </a:r>
+                    </a:p>
+                  </a:txBody>
+                  <a:tcPr marL="9525" marR="9525" marT="9525" marB="0" anchor="b"/>
+                </a:tc>
+                <a:tc>
+                  <a:txBody>
+                    <a:bodyPr/>
+                    <a:lstStyle/>
+                    <a:p>
+                      <a:pPr algn="l" fontAlgn="b"/>
+                      <a:r>
+                        <a:rPr lang="de-DE" sz="1100" b="0" i="0" u="none" strike="noStrike">
+                          <a:solidFill>
+                            <a:srgbClr val="000000"/>
+                          </a:solidFill>
+                          <a:effectLst/>
+                          <a:latin typeface="Calibri" panose="020F0502020204030204" pitchFamily="34" charset="0"/>
+                        </a:rPr>
+                        <a:t>340472,9</a:t>
                       </a:r>
                     </a:p>
                   </a:txBody>
@@ -11338,7 +11186,7 @@
                   </a:ext>
                 </a:extLst>
               </a:tr>
-              <a:tr h="202967">
+              <a:tr h="225841">
                 <a:tc>
                   <a:txBody>
                     <a:bodyPr/>
@@ -11399,7 +11247,7 @@
                           <a:effectLst/>
                           <a:latin typeface="Calibri" panose="020F0502020204030204" pitchFamily="34" charset="0"/>
                         </a:rPr>
-                        <a:t>-1679,09</a:t>
+                        <a:t>-169989</a:t>
                       </a:r>
                     </a:p>
                   </a:txBody>
@@ -11412,14 +11260,14 @@
                     <a:p>
                       <a:pPr algn="l" fontAlgn="b"/>
                       <a:r>
-                        <a:rPr lang="de-DE" sz="1100" b="0" i="0" u="none" strike="noStrike" dirty="0">
+                        <a:rPr lang="de-DE" sz="1100" b="0" i="0" u="none" strike="noStrike">
                           <a:solidFill>
                             <a:srgbClr val="000000"/>
                           </a:solidFill>
                           <a:effectLst/>
                           <a:latin typeface="Calibri" panose="020F0502020204030204" pitchFamily="34" charset="0"/>
                         </a:rPr>
-                        <a:t>3368,176</a:t>
+                        <a:t>339987,3</a:t>
                       </a:r>
                     </a:p>
                   </a:txBody>
@@ -11432,14 +11280,14 @@
                     <a:p>
                       <a:pPr algn="l" fontAlgn="b"/>
                       <a:r>
-                        <a:rPr lang="de-DE" sz="1100" b="0" i="0" u="none" strike="noStrike" dirty="0">
+                        <a:rPr lang="de-DE" sz="1100" b="0" i="0" u="none" strike="noStrike">
                           <a:solidFill>
                             <a:srgbClr val="000000"/>
                           </a:solidFill>
                           <a:effectLst/>
                           <a:latin typeface="Calibri" panose="020F0502020204030204" pitchFamily="34" charset="0"/>
                         </a:rPr>
-                        <a:t>3366,217</a:t>
+                        <a:t>339985,3</a:t>
                       </a:r>
                     </a:p>
                   </a:txBody>
@@ -11452,14 +11300,14 @@
                     <a:p>
                       <a:pPr algn="l" fontAlgn="b"/>
                       <a:r>
-                        <a:rPr lang="de-DE" sz="1100" b="0" i="0" u="none" strike="noStrike" dirty="0">
+                        <a:rPr lang="de-DE" sz="1100" b="0" i="0" u="none" strike="noStrike">
                           <a:solidFill>
                             <a:srgbClr val="000000"/>
                           </a:solidFill>
                           <a:effectLst/>
                           <a:latin typeface="Calibri" panose="020F0502020204030204" pitchFamily="34" charset="0"/>
                         </a:rPr>
-                        <a:t>3385,807</a:t>
+                        <a:t>340023,4</a:t>
                       </a:r>
                     </a:p>
                   </a:txBody>
@@ -11471,7 +11319,7 @@
                   </a:ext>
                 </a:extLst>
               </a:tr>
-              <a:tr h="202967">
+              <a:tr h="225841">
                 <a:tc>
                   <a:txBody>
                     <a:bodyPr/>
@@ -11525,14 +11373,14 @@
                     <a:p>
                       <a:pPr algn="l" fontAlgn="b"/>
                       <a:r>
-                        <a:rPr lang="de-DE" sz="1100" b="0" i="0" u="none" strike="noStrike">
+                        <a:rPr lang="de-DE" sz="1100" b="0" i="0" u="none" strike="noStrike" dirty="0">
                           <a:solidFill>
                             <a:srgbClr val="000000"/>
                           </a:solidFill>
                           <a:effectLst/>
                           <a:latin typeface="Calibri" panose="020F0502020204030204" pitchFamily="34" charset="0"/>
                         </a:rPr>
-                        <a:t>-1675,98</a:t>
+                        <a:t>-169548</a:t>
                       </a:r>
                     </a:p>
                   </a:txBody>
@@ -11552,7 +11400,7 @@
                           <a:effectLst/>
                           <a:latin typeface="Calibri" panose="020F0502020204030204" pitchFamily="34" charset="0"/>
                         </a:rPr>
-                        <a:t>3363,956</a:t>
+                        <a:t>339108,9</a:t>
                       </a:r>
                     </a:p>
                   </a:txBody>
@@ -11565,14 +11413,14 @@
                     <a:p>
                       <a:pPr algn="l" fontAlgn="b"/>
                       <a:r>
-                        <a:rPr lang="de-DE" sz="1100" b="0" i="0" u="none" strike="noStrike" dirty="0">
+                        <a:rPr lang="de-DE" sz="1100" b="0" i="0" u="none" strike="noStrike">
                           <a:solidFill>
                             <a:srgbClr val="000000"/>
                           </a:solidFill>
                           <a:effectLst/>
                           <a:latin typeface="Calibri" panose="020F0502020204030204" pitchFamily="34" charset="0"/>
                         </a:rPr>
-                        <a:t>3362,016</a:t>
+                        <a:t>339106,9</a:t>
                       </a:r>
                     </a:p>
                   </a:txBody>
@@ -11585,14 +11433,14 @@
                     <a:p>
                       <a:pPr algn="l" fontAlgn="b"/>
                       <a:r>
-                        <a:rPr lang="de-DE" sz="1100" b="0" i="0" u="none" strike="noStrike" dirty="0">
+                        <a:rPr lang="de-DE" sz="1100" b="0" i="0" u="none" strike="noStrike">
                           <a:solidFill>
                             <a:srgbClr val="000000"/>
                           </a:solidFill>
                           <a:effectLst/>
                           <a:latin typeface="Calibri" panose="020F0502020204030204" pitchFamily="34" charset="0"/>
                         </a:rPr>
-                        <a:t>3386,494</a:t>
+                        <a:t>339154,4</a:t>
                       </a:r>
                     </a:p>
                   </a:txBody>
@@ -11604,7 +11452,7 @@
                   </a:ext>
                 </a:extLst>
               </a:tr>
-              <a:tr h="202967">
+              <a:tr h="225841">
                 <a:tc>
                   <a:txBody>
                     <a:bodyPr/>
@@ -11665,7 +11513,7 @@
                           <a:effectLst/>
                           <a:latin typeface="Calibri" panose="020F0502020204030204" pitchFamily="34" charset="0"/>
                         </a:rPr>
-                        <a:t>-1672,78</a:t>
+                        <a:t>-169201</a:t>
                       </a:r>
                     </a:p>
                   </a:txBody>
@@ -11685,7 +11533,7 @@
                           <a:effectLst/>
                           <a:latin typeface="Calibri" panose="020F0502020204030204" pitchFamily="34" charset="0"/>
                         </a:rPr>
-                        <a:t>3359,564</a:t>
+                        <a:t>338416,1</a:t>
                       </a:r>
                     </a:p>
                   </a:txBody>
@@ -11698,14 +11546,14 @@
                     <a:p>
                       <a:pPr algn="l" fontAlgn="b"/>
                       <a:r>
-                        <a:rPr lang="de-DE" sz="1100" b="0" i="0" u="none" strike="noStrike" dirty="0">
+                        <a:rPr lang="de-DE" sz="1100" b="0" i="0" u="none" strike="noStrike">
                           <a:solidFill>
                             <a:srgbClr val="000000"/>
                           </a:solidFill>
                           <a:effectLst/>
                           <a:latin typeface="Calibri" panose="020F0502020204030204" pitchFamily="34" charset="0"/>
                         </a:rPr>
-                        <a:t>3357,649</a:t>
+                        <a:t>338414,1</a:t>
                       </a:r>
                     </a:p>
                   </a:txBody>
@@ -11718,14 +11566,14 @@
                     <a:p>
                       <a:pPr algn="l" fontAlgn="b"/>
                       <a:r>
-                        <a:rPr lang="de-DE" sz="1100" b="0" i="0" u="none" strike="noStrike" dirty="0">
+                        <a:rPr lang="de-DE" sz="1100" b="0" i="0" u="none" strike="noStrike">
                           <a:solidFill>
                             <a:srgbClr val="000000"/>
                           </a:solidFill>
                           <a:effectLst/>
                           <a:latin typeface="Calibri" panose="020F0502020204030204" pitchFamily="34" charset="0"/>
                         </a:rPr>
-                        <a:t>3387,011</a:t>
+                        <a:t>338471,2</a:t>
                       </a:r>
                     </a:p>
                   </a:txBody>
@@ -11737,7 +11585,7 @@
                   </a:ext>
                 </a:extLst>
               </a:tr>
-              <a:tr h="202967">
+              <a:tr h="225841">
                 <a:tc>
                   <a:txBody>
                     <a:bodyPr/>
@@ -11798,7 +11646,7 @@
                           <a:effectLst/>
                           <a:latin typeface="Calibri" panose="020F0502020204030204" pitchFamily="34" charset="0"/>
                         </a:rPr>
-                        <a:t>-1668,01</a:t>
+                        <a:t>-168879</a:t>
                       </a:r>
                     </a:p>
                   </a:txBody>
@@ -11818,7 +11666,7 @@
                           <a:effectLst/>
                           <a:latin typeface="Calibri" panose="020F0502020204030204" pitchFamily="34" charset="0"/>
                         </a:rPr>
-                        <a:t>3352,021</a:t>
+                        <a:t>337774,1</a:t>
                       </a:r>
                     </a:p>
                   </a:txBody>
@@ -11831,14 +11679,14 @@
                     <a:p>
                       <a:pPr algn="l" fontAlgn="b"/>
                       <a:r>
-                        <a:rPr lang="de-DE" sz="1100" b="0" i="0" u="none" strike="noStrike" dirty="0">
+                        <a:rPr lang="de-DE" sz="1100" b="0" i="0" u="none" strike="noStrike">
                           <a:solidFill>
                             <a:srgbClr val="000000"/>
                           </a:solidFill>
                           <a:effectLst/>
                           <a:latin typeface="Calibri" panose="020F0502020204030204" pitchFamily="34" charset="0"/>
                         </a:rPr>
-                        <a:t>3350,134</a:t>
+                        <a:t>337772,1</a:t>
                       </a:r>
                     </a:p>
                   </a:txBody>
@@ -11851,14 +11699,14 @@
                     <a:p>
                       <a:pPr algn="l" fontAlgn="b"/>
                       <a:r>
-                        <a:rPr lang="de-DE" sz="1100" b="0" i="0" u="none" strike="noStrike" dirty="0">
+                        <a:rPr lang="de-DE" sz="1100" b="0" i="0" u="none" strike="noStrike">
                           <a:solidFill>
                             <a:srgbClr val="000000"/>
                           </a:solidFill>
                           <a:effectLst/>
                           <a:latin typeface="Calibri" panose="020F0502020204030204" pitchFamily="34" charset="0"/>
                         </a:rPr>
-                        <a:t>3384,376</a:t>
+                        <a:t>337838,7</a:t>
                       </a:r>
                     </a:p>
                   </a:txBody>
@@ -11870,7 +11718,7 @@
                   </a:ext>
                 </a:extLst>
               </a:tr>
-              <a:tr h="202967">
+              <a:tr h="225841">
                 <a:tc>
                   <a:txBody>
                     <a:bodyPr/>
@@ -11931,7 +11779,7 @@
                           <a:effectLst/>
                           <a:latin typeface="Calibri" panose="020F0502020204030204" pitchFamily="34" charset="0"/>
                         </a:rPr>
-                        <a:t>-1664,91</a:t>
+                        <a:t>-168714</a:t>
                       </a:r>
                     </a:p>
                   </a:txBody>
@@ -11951,7 +11799,7 @@
                           <a:effectLst/>
                           <a:latin typeface="Calibri" panose="020F0502020204030204" pitchFamily="34" charset="0"/>
                         </a:rPr>
-                        <a:t>3347,82</a:t>
+                        <a:t>337445,1</a:t>
                       </a:r>
                     </a:p>
                   </a:txBody>
@@ -11971,7 +11819,7 @@
                           <a:effectLst/>
                           <a:latin typeface="Calibri" panose="020F0502020204030204" pitchFamily="34" charset="0"/>
                         </a:rPr>
-                        <a:t>3345,966</a:t>
+                        <a:t>337443,1</a:t>
                       </a:r>
                     </a:p>
                   </a:txBody>
@@ -11984,14 +11832,14 @@
                     <a:p>
                       <a:pPr algn="l" fontAlgn="b"/>
                       <a:r>
-                        <a:rPr lang="de-DE" sz="1100" b="0" i="0" u="none" strike="noStrike" dirty="0">
+                        <a:rPr lang="de-DE" sz="1100" b="0" i="0" u="none" strike="noStrike">
                           <a:solidFill>
                             <a:srgbClr val="000000"/>
                           </a:solidFill>
                           <a:effectLst/>
                           <a:latin typeface="Calibri" panose="020F0502020204030204" pitchFamily="34" charset="0"/>
                         </a:rPr>
-                        <a:t>3385,083</a:t>
+                        <a:t>337519,2</a:t>
                       </a:r>
                     </a:p>
                   </a:txBody>
@@ -12003,7 +11851,7 @@
                   </a:ext>
                 </a:extLst>
               </a:tr>
-              <a:tr h="202967">
+              <a:tr h="225841">
                 <a:tc>
                   <a:txBody>
                     <a:bodyPr/>
@@ -12064,7 +11912,7 @@
                           <a:effectLst/>
                           <a:latin typeface="Calibri" panose="020F0502020204030204" pitchFamily="34" charset="0"/>
                         </a:rPr>
-                        <a:t>-1688,61</a:t>
+                        <a:t>-170548</a:t>
                       </a:r>
                     </a:p>
                   </a:txBody>
@@ -12084,7 +11932,7 @@
                           <a:effectLst/>
                           <a:latin typeface="Calibri" panose="020F0502020204030204" pitchFamily="34" charset="0"/>
                         </a:rPr>
-                        <a:t>3383,223</a:t>
+                        <a:t>341101,3</a:t>
                       </a:r>
                     </a:p>
                   </a:txBody>
@@ -12104,7 +11952,7 @@
                           <a:effectLst/>
                           <a:latin typeface="Calibri" panose="020F0502020204030204" pitchFamily="34" charset="0"/>
                         </a:rPr>
-                        <a:t>3381,235</a:t>
+                        <a:t>341099,3</a:t>
                       </a:r>
                     </a:p>
                   </a:txBody>
@@ -12124,7 +11972,7 @@
                           <a:effectLst/>
                           <a:latin typeface="Calibri" panose="020F0502020204030204" pitchFamily="34" charset="0"/>
                         </a:rPr>
-                        <a:t>3391,038</a:t>
+                        <a:t>341118,4</a:t>
                       </a:r>
                     </a:p>
                   </a:txBody>
@@ -12243,7 +12091,7 @@
           </p:nvPr>
         </p:nvPicPr>
         <p:blipFill>
-          <a:blip r:embed="rId3" cstate="print">
+          <a:blip r:embed="rId3">
             <a:extLst>
               <a:ext uri="{28A0092B-C50C-407E-A947-70E740481C1C}">
                 <a14:useLocalDpi xmlns:a14="http://schemas.microsoft.com/office/drawing/2010/main" val="0"/>
@@ -12256,8 +12104,8 @@
         </p:blipFill>
         <p:spPr>
           <a:xfrm>
-            <a:off x="4645025" y="1420745"/>
-            <a:ext cx="4175447" cy="2256890"/>
+            <a:off x="4645025" y="1419224"/>
+            <a:ext cx="4175447" cy="2258410"/>
           </a:xfrm>
         </p:spPr>
       </p:pic>
@@ -12332,40 +12180,181 @@
           </a:p>
         </p:txBody>
       </p:sp>
-      <p:sp>
-        <p:nvSpPr>
-          <p:cNvPr id="10" name="Inhaltsplatzhalter 9"/>
-          <p:cNvSpPr>
-            <a:spLocks noGrp="1"/>
-          </p:cNvSpPr>
-          <p:nvPr>
-            <p:ph sz="quarter" idx="13"/>
-          </p:nvPr>
-        </p:nvSpPr>
-        <p:spPr/>
-        <p:txBody>
-          <a:bodyPr>
-            <a:normAutofit fontScale="92500" lnSpcReduction="10000"/>
-          </a:bodyPr>
-          <a:lstStyle/>
-          <a:p>
-            <a:r>
-              <a:rPr lang="de-DE" dirty="0"/>
-              <a:t>Best fit: ARCH(1)-Modell</a:t>
-            </a:r>
-          </a:p>
-          <a:p>
-            <a:r>
-              <a:rPr lang="de-DE" dirty="0"/>
-              <a:t>p-Wert Box-Pierce-Test der Residuen: </a:t>
-            </a:r>
-            <a:r>
-              <a:rPr lang="de-DE" b="1" dirty="0"/>
-              <a:t>0.8669</a:t>
-            </a:r>
-          </a:p>
-        </p:txBody>
-      </p:sp>
+      <mc:AlternateContent xmlns:mc="http://schemas.openxmlformats.org/markup-compatibility/2006">
+        <mc:Choice xmlns:a14="http://schemas.microsoft.com/office/drawing/2010/main" Requires="a14">
+          <p:sp>
+            <p:nvSpPr>
+              <p:cNvPr id="10" name="Inhaltsplatzhalter 9"/>
+              <p:cNvSpPr>
+                <a:spLocks noGrp="1"/>
+              </p:cNvSpPr>
+              <p:nvPr>
+                <p:ph sz="quarter" idx="13"/>
+              </p:nvPr>
+            </p:nvSpPr>
+            <p:spPr/>
+            <p:txBody>
+              <a:bodyPr>
+                <a:normAutofit fontScale="92500" lnSpcReduction="10000"/>
+              </a:bodyPr>
+              <a:lstStyle/>
+              <a:p>
+                <a:r>
+                  <a:rPr lang="de-DE" dirty="0" smtClean="0"/>
+                  <a:t>Best fit: ARCH(1)-Modell mit </a:t>
+                </a:r>
+                <a14:m>
+                  <m:oMath xmlns:m="http://schemas.openxmlformats.org/officeDocument/2006/math">
+                    <m:sSub>
+                      <m:sSubPr>
+                        <m:ctrlPr>
+                          <a:rPr lang="de-DE" i="1">
+                            <a:latin typeface="Cambria Math" panose="02040503050406030204" pitchFamily="18" charset="0"/>
+                          </a:rPr>
+                        </m:ctrlPr>
+                      </m:sSubPr>
+                      <m:e>
+                        <m:r>
+                          <m:rPr>
+                            <m:sty m:val="p"/>
+                          </m:rPr>
+                          <a:rPr lang="el-GR" i="1">
+                            <a:latin typeface="Cambria Math" panose="02040503050406030204" pitchFamily="18" charset="0"/>
+                          </a:rPr>
+                          <m:t>α</m:t>
+                        </m:r>
+                      </m:e>
+                      <m:sub>
+                        <m:r>
+                          <a:rPr lang="de-DE" i="1">
+                            <a:latin typeface="Cambria Math" panose="02040503050406030204" pitchFamily="18" charset="0"/>
+                          </a:rPr>
+                          <m:t>0</m:t>
+                        </m:r>
+                      </m:sub>
+                    </m:sSub>
+                    <m:r>
+                      <a:rPr lang="de-DE" i="1">
+                        <a:latin typeface="Cambria Math" panose="02040503050406030204" pitchFamily="18" charset="0"/>
+                      </a:rPr>
+                      <m:t>=</m:t>
+                    </m:r>
+                    <m:r>
+                      <a:rPr lang="de-DE">
+                        <a:latin typeface="Cambria Math" panose="02040503050406030204" pitchFamily="18" charset="0"/>
+                      </a:rPr>
+                      <m:t>1</m:t>
+                    </m:r>
+                    <m:r>
+                      <a:rPr lang="de-DE" b="0" i="0" smtClean="0">
+                        <a:latin typeface="Cambria Math" panose="02040503050406030204" pitchFamily="18" charset="0"/>
+                      </a:rPr>
+                      <m:t>.0086</m:t>
+                    </m:r>
+                    <m:r>
+                      <a:rPr lang="de-DE">
+                        <a:latin typeface="Cambria Math" panose="02040503050406030204" pitchFamily="18" charset="0"/>
+                      </a:rPr>
+                      <m:t>,  </m:t>
+                    </m:r>
+                    <m:sSub>
+                      <m:sSubPr>
+                        <m:ctrlPr>
+                          <a:rPr lang="de-DE" i="1">
+                            <a:latin typeface="Cambria Math" panose="02040503050406030204" pitchFamily="18" charset="0"/>
+                          </a:rPr>
+                        </m:ctrlPr>
+                      </m:sSubPr>
+                      <m:e>
+                        <m:r>
+                          <m:rPr>
+                            <m:sty m:val="p"/>
+                          </m:rPr>
+                          <a:rPr lang="el-GR" i="1">
+                            <a:latin typeface="Cambria Math" panose="02040503050406030204" pitchFamily="18" charset="0"/>
+                          </a:rPr>
+                          <m:t>α</m:t>
+                        </m:r>
+                      </m:e>
+                      <m:sub>
+                        <m:r>
+                          <a:rPr lang="de-DE" i="1">
+                            <a:latin typeface="Cambria Math" panose="02040503050406030204" pitchFamily="18" charset="0"/>
+                          </a:rPr>
+                          <m:t>1</m:t>
+                        </m:r>
+                      </m:sub>
+                    </m:sSub>
+                    <m:r>
+                      <a:rPr lang="de-DE" i="1">
+                        <a:latin typeface="Cambria Math" panose="02040503050406030204" pitchFamily="18" charset="0"/>
+                      </a:rPr>
+                      <m:t>=0.</m:t>
+                    </m:r>
+                    <m:r>
+                      <a:rPr lang="de-DE" i="1">
+                        <a:latin typeface="Cambria Math" panose="02040503050406030204" pitchFamily="18" charset="0"/>
+                      </a:rPr>
+                      <m:t>5</m:t>
+                    </m:r>
+                    <m:r>
+                      <a:rPr lang="de-DE" b="0" i="1" smtClean="0">
+                        <a:latin typeface="Cambria Math" panose="02040503050406030204" pitchFamily="18" charset="0"/>
+                      </a:rPr>
+                      <m:t>008</m:t>
+                    </m:r>
+                  </m:oMath>
+                </a14:m>
+                <a:endParaRPr lang="de-DE" dirty="0"/>
+              </a:p>
+              <a:p>
+                <a:r>
+                  <a:rPr lang="de-DE" dirty="0"/>
+                  <a:t>p-Wert Box-Pierce-Test der Residuen: </a:t>
+                </a:r>
+                <a:r>
+                  <a:rPr lang="de-DE" b="1" dirty="0" smtClean="0"/>
+                  <a:t>0.3972</a:t>
+                </a:r>
+                <a:endParaRPr lang="de-DE" b="1" dirty="0"/>
+              </a:p>
+            </p:txBody>
+          </p:sp>
+        </mc:Choice>
+        <mc:Fallback>
+          <p:sp>
+            <p:nvSpPr>
+              <p:cNvPr id="10" name="Inhaltsplatzhalter 9"/>
+              <p:cNvSpPr>
+                <a:spLocks noGrp="1" noRot="1" noChangeAspect="1" noMove="1" noResize="1" noEditPoints="1" noAdjustHandles="1" noChangeArrowheads="1" noChangeShapeType="1" noTextEdit="1"/>
+              </p:cNvSpPr>
+              <p:nvPr>
+                <p:ph sz="quarter" idx="13"/>
+              </p:nvPr>
+            </p:nvSpPr>
+            <p:spPr>
+              <a:blipFill>
+                <a:blip r:embed="rId4"/>
+                <a:stretch>
+                  <a:fillRect t="-4167" b="-6250"/>
+                </a:stretch>
+              </a:blipFill>
+            </p:spPr>
+            <p:txBody>
+              <a:bodyPr/>
+              <a:lstStyle/>
+              <a:p>
+                <a:r>
+                  <a:rPr lang="de-DE">
+                    <a:noFill/>
+                  </a:rPr>
+                  <a:t> </a:t>
+                </a:r>
+              </a:p>
+            </p:txBody>
+          </p:sp>
+        </mc:Fallback>
+      </mc:AlternateContent>
     </p:spTree>
     <p:extLst>
       <p:ext uri="{BB962C8B-B14F-4D97-AF65-F5344CB8AC3E}">
@@ -12549,12 +12538,16 @@
           </p:cNvGraphicFramePr>
           <p:nvPr>
             <p:ph sz="quarter" idx="4"/>
-            <p:extLst/>
+            <p:extLst>
+              <p:ext uri="{D42A27DB-BD31-4B8C-83A1-F6EECF244321}">
+                <p14:modId xmlns:p14="http://schemas.microsoft.com/office/powerpoint/2010/main" val="1980304653"/>
+              </p:ext>
+            </p:extLst>
           </p:nvPr>
         </p:nvGraphicFramePr>
         <p:xfrm>
-          <a:off x="323527" y="1412115"/>
-          <a:ext cx="4173540" cy="2232637"/>
+          <a:off x="323527" y="1412111"/>
+          <a:ext cx="4173540" cy="2232640"/>
         </p:xfrm>
         <a:graphic>
           <a:graphicData uri="http://schemas.openxmlformats.org/drawingml/2006/table">
@@ -12606,7 +12599,7 @@
                   </a:extLst>
                 </a:gridCol>
               </a:tblGrid>
-              <a:tr h="202967">
+              <a:tr h="223264">
                 <a:tc>
                   <a:txBody>
                     <a:bodyPr/>
@@ -12751,140 +12744,7 @@
                   </a:ext>
                 </a:extLst>
               </a:tr>
-              <a:tr h="202967">
-                <a:tc>
-                  <a:txBody>
-                    <a:bodyPr/>
-                    <a:lstStyle/>
-                    <a:p>
-                      <a:pPr algn="l" fontAlgn="b"/>
-                      <a:r>
-                        <a:rPr lang="de-DE" sz="1100" u="none" strike="noStrike" dirty="0">
-                          <a:effectLst/>
-                        </a:rPr>
-                        <a:t>ARCH(0)</a:t>
-                      </a:r>
-                      <a:endParaRPr lang="de-DE" sz="1100" b="0" i="0" u="none" strike="noStrike" dirty="0">
-                        <a:solidFill>
-                          <a:srgbClr val="000000"/>
-                        </a:solidFill>
-                        <a:effectLst/>
-                        <a:latin typeface="Calibri" panose="020F0502020204030204" pitchFamily="34" charset="0"/>
-                      </a:endParaRPr>
-                    </a:p>
-                  </a:txBody>
-                  <a:tcPr marL="9525" marR="9525" marT="9525" marB="0" anchor="ctr"/>
-                </a:tc>
-                <a:tc>
-                  <a:txBody>
-                    <a:bodyPr/>
-                    <a:lstStyle/>
-                    <a:p>
-                      <a:pPr algn="l" fontAlgn="b"/>
-                      <a:r>
-                        <a:rPr lang="de-DE" sz="1100" u="none" strike="noStrike" dirty="0">
-                          <a:effectLst/>
-                        </a:rPr>
-                        <a:t>0</a:t>
-                      </a:r>
-                      <a:endParaRPr lang="de-DE" sz="1100" b="0" i="0" u="none" strike="noStrike" dirty="0">
-                        <a:solidFill>
-                          <a:srgbClr val="000000"/>
-                        </a:solidFill>
-                        <a:effectLst/>
-                        <a:latin typeface="Calibri" panose="020F0502020204030204" pitchFamily="34" charset="0"/>
-                      </a:endParaRPr>
-                    </a:p>
-                  </a:txBody>
-                  <a:tcPr marL="9525" marR="9525" marT="9525" marB="0" anchor="ctr"/>
-                </a:tc>
-                <a:tc>
-                  <a:txBody>
-                    <a:bodyPr/>
-                    <a:lstStyle/>
-                    <a:p>
-                      <a:pPr algn="l" fontAlgn="b"/>
-                      <a:r>
-                        <a:rPr lang="de-DE" sz="1100" b="0" i="0" u="none" strike="noStrike" dirty="0">
-                          <a:solidFill>
-                            <a:srgbClr val="000000"/>
-                          </a:solidFill>
-                          <a:effectLst/>
-                          <a:latin typeface="Calibri" panose="020F0502020204030204" pitchFamily="34" charset="0"/>
-                        </a:rPr>
-                        <a:t>-1961,68</a:t>
-                      </a:r>
-                    </a:p>
-                  </a:txBody>
-                  <a:tcPr marL="9525" marR="9525" marT="9525" marB="0" anchor="b"/>
-                </a:tc>
-                <a:tc>
-                  <a:txBody>
-                    <a:bodyPr/>
-                    <a:lstStyle/>
-                    <a:p>
-                      <a:pPr algn="l" fontAlgn="b"/>
-                      <a:r>
-                        <a:rPr lang="de-DE" sz="1100" b="0" i="0" u="none" strike="noStrike">
-                          <a:solidFill>
-                            <a:srgbClr val="000000"/>
-                          </a:solidFill>
-                          <a:effectLst/>
-                          <a:latin typeface="Calibri" panose="020F0502020204030204" pitchFamily="34" charset="0"/>
-                        </a:rPr>
-                        <a:t>3925,363</a:t>
-                      </a:r>
-                    </a:p>
-                  </a:txBody>
-                  <a:tcPr marL="9525" marR="9525" marT="9525" marB="0" anchor="b"/>
-                </a:tc>
-                <a:tc>
-                  <a:txBody>
-                    <a:bodyPr/>
-                    <a:lstStyle/>
-                    <a:p>
-                      <a:pPr algn="l" fontAlgn="b"/>
-                      <a:r>
-                        <a:rPr lang="de-DE" sz="1100" b="0" i="0" u="none" strike="noStrike">
-                          <a:solidFill>
-                            <a:srgbClr val="000000"/>
-                          </a:solidFill>
-                          <a:effectLst/>
-                          <a:latin typeface="Calibri" panose="020F0502020204030204" pitchFamily="34" charset="0"/>
-                        </a:rPr>
-                        <a:t>3923,363</a:t>
-                      </a:r>
-                    </a:p>
-                  </a:txBody>
-                  <a:tcPr marL="9525" marR="9525" marT="9525" marB="0" anchor="b"/>
-                </a:tc>
-                <a:tc>
-                  <a:txBody>
-                    <a:bodyPr/>
-                    <a:lstStyle/>
-                    <a:p>
-                      <a:pPr algn="l" fontAlgn="b"/>
-                      <a:r>
-                        <a:rPr lang="de-DE" sz="1100" b="0" i="0" u="none" strike="noStrike">
-                          <a:solidFill>
-                            <a:srgbClr val="000000"/>
-                          </a:solidFill>
-                          <a:effectLst/>
-                          <a:latin typeface="Calibri" panose="020F0502020204030204" pitchFamily="34" charset="0"/>
-                        </a:rPr>
-                        <a:t>3923,363</a:t>
-                      </a:r>
-                    </a:p>
-                  </a:txBody>
-                  <a:tcPr marL="9525" marR="9525" marT="9525" marB="0" anchor="b"/>
-                </a:tc>
-                <a:extLst>
-                  <a:ext uri="{0D108BD9-81ED-4DB2-BD59-A6C34878D82A}">
-                    <a16:rowId xmlns:a16="http://schemas.microsoft.com/office/drawing/2014/main" val="2553124018"/>
-                  </a:ext>
-                </a:extLst>
-              </a:tr>
-              <a:tr h="202967">
+              <a:tr h="223264">
                 <a:tc>
                   <a:txBody>
                     <a:bodyPr/>
@@ -12907,7 +12767,11 @@
                     </a:p>
                   </a:txBody>
                   <a:tcPr marL="9525" marR="9525" marT="9525" marB="0" anchor="ctr">
-                    <a:noFill/>
+                    <a:solidFill>
+                      <a:schemeClr val="bg1">
+                        <a:lumMod val="85000"/>
+                      </a:schemeClr>
+                    </a:solidFill>
                   </a:tcPr>
                 </a:tc>
                 <a:tc>
@@ -12932,29 +12796,11 @@
                     </a:p>
                   </a:txBody>
                   <a:tcPr marL="9525" marR="9525" marT="9525" marB="0" anchor="ctr">
-                    <a:noFill/>
-                  </a:tcPr>
-                </a:tc>
-                <a:tc>
-                  <a:txBody>
-                    <a:bodyPr/>
-                    <a:lstStyle/>
-                    <a:p>
-                      <a:pPr algn="l" fontAlgn="b"/>
-                      <a:r>
-                        <a:rPr lang="de-DE" sz="1100" b="0" i="0" u="none" strike="noStrike" dirty="0">
-                          <a:solidFill>
-                            <a:srgbClr val="000000"/>
-                          </a:solidFill>
-                          <a:effectLst/>
-                          <a:latin typeface="Calibri" panose="020F0502020204030204" pitchFamily="34" charset="0"/>
-                        </a:rPr>
-                        <a:t>-1880,13</a:t>
-                      </a:r>
-                    </a:p>
-                  </a:txBody>
-                  <a:tcPr marL="9525" marR="9525" marT="9525" marB="0" anchor="b">
-                    <a:noFill/>
+                    <a:solidFill>
+                      <a:schemeClr val="bg1">
+                        <a:lumMod val="85000"/>
+                      </a:schemeClr>
+                    </a:solidFill>
                   </a:tcPr>
                 </a:tc>
                 <a:tc>
@@ -12971,12 +12817,16 @@
                           <a:effectLst/>
                           <a:latin typeface="Calibri" panose="020F0502020204030204" pitchFamily="34" charset="0"/>
                         </a:rPr>
-                        <a:t>3764,263</a:t>
+                        <a:t>-189857</a:t>
                       </a:r>
                     </a:p>
                   </a:txBody>
                   <a:tcPr marL="9525" marR="9525" marT="9525" marB="0" anchor="b">
-                    <a:noFill/>
+                    <a:solidFill>
+                      <a:schemeClr val="bg1">
+                        <a:lumMod val="85000"/>
+                      </a:schemeClr>
+                    </a:solidFill>
                   </a:tcPr>
                 </a:tc>
                 <a:tc>
@@ -12993,12 +12843,16 @@
                           <a:effectLst/>
                           <a:latin typeface="Calibri" panose="020F0502020204030204" pitchFamily="34" charset="0"/>
                         </a:rPr>
-                        <a:t>3762,267</a:t>
+                        <a:t>379717,1</a:t>
                       </a:r>
                     </a:p>
                   </a:txBody>
                   <a:tcPr marL="9525" marR="9525" marT="9525" marB="0" anchor="b">
-                    <a:noFill/>
+                    <a:solidFill>
+                      <a:schemeClr val="bg1">
+                        <a:lumMod val="85000"/>
+                      </a:schemeClr>
+                    </a:solidFill>
                   </a:tcPr>
                 </a:tc>
                 <a:tc>
@@ -13015,12 +12869,42 @@
                           <a:effectLst/>
                           <a:latin typeface="Calibri" panose="020F0502020204030204" pitchFamily="34" charset="0"/>
                         </a:rPr>
-                        <a:t>3767,171</a:t>
+                        <a:t>379715,1</a:t>
                       </a:r>
                     </a:p>
                   </a:txBody>
                   <a:tcPr marL="9525" marR="9525" marT="9525" marB="0" anchor="b">
-                    <a:noFill/>
+                    <a:solidFill>
+                      <a:schemeClr val="bg1">
+                        <a:lumMod val="85000"/>
+                      </a:schemeClr>
+                    </a:solidFill>
+                  </a:tcPr>
+                </a:tc>
+                <a:tc>
+                  <a:txBody>
+                    <a:bodyPr/>
+                    <a:lstStyle/>
+                    <a:p>
+                      <a:pPr algn="l" fontAlgn="b"/>
+                      <a:r>
+                        <a:rPr lang="de-DE" sz="1100" b="0" i="0" u="none" strike="noStrike">
+                          <a:solidFill>
+                            <a:srgbClr val="000000"/>
+                          </a:solidFill>
+                          <a:effectLst/>
+                          <a:latin typeface="Calibri" panose="020F0502020204030204" pitchFamily="34" charset="0"/>
+                        </a:rPr>
+                        <a:t>379724,6</a:t>
+                      </a:r>
+                    </a:p>
+                  </a:txBody>
+                  <a:tcPr marL="9525" marR="9525" marT="9525" marB="0" anchor="b">
+                    <a:solidFill>
+                      <a:schemeClr val="bg1">
+                        <a:lumMod val="85000"/>
+                      </a:schemeClr>
+                    </a:solidFill>
                   </a:tcPr>
                 </a:tc>
                 <a:extLst>
@@ -13029,7 +12913,7 @@
                   </a:ext>
                 </a:extLst>
               </a:tr>
-              <a:tr h="202967">
+              <a:tr h="223264">
                 <a:tc>
                   <a:txBody>
                     <a:bodyPr/>
@@ -13083,14 +12967,14 @@
                     <a:p>
                       <a:pPr algn="l" fontAlgn="b"/>
                       <a:r>
-                        <a:rPr lang="de-DE" sz="1100" b="0" i="0" u="none" strike="noStrike" dirty="0">
+                        <a:rPr lang="de-DE" sz="1100" b="0" i="0" u="none" strike="noStrike">
                           <a:solidFill>
                             <a:srgbClr val="000000"/>
                           </a:solidFill>
                           <a:effectLst/>
                           <a:latin typeface="Calibri" panose="020F0502020204030204" pitchFamily="34" charset="0"/>
                         </a:rPr>
-                        <a:t>-1844,9</a:t>
+                        <a:t>-186800</a:t>
                       </a:r>
                     </a:p>
                   </a:txBody>
@@ -13110,7 +12994,7 @@
                           <a:effectLst/>
                           <a:latin typeface="Calibri" panose="020F0502020204030204" pitchFamily="34" charset="0"/>
                         </a:rPr>
-                        <a:t>3695,792</a:t>
+                        <a:t>373605,2</a:t>
                       </a:r>
                     </a:p>
                   </a:txBody>
@@ -13130,7 +13014,7 @@
                           <a:effectLst/>
                           <a:latin typeface="Calibri" panose="020F0502020204030204" pitchFamily="34" charset="0"/>
                         </a:rPr>
-                        <a:t>3693,804</a:t>
+                        <a:t>373603,2</a:t>
                       </a:r>
                     </a:p>
                   </a:txBody>
@@ -13150,7 +13034,7 @@
                           <a:effectLst/>
                           <a:latin typeface="Calibri" panose="020F0502020204030204" pitchFamily="34" charset="0"/>
                         </a:rPr>
-                        <a:t>3703,608</a:t>
+                        <a:t>373622,2</a:t>
                       </a:r>
                     </a:p>
                   </a:txBody>
@@ -13162,7 +13046,7 @@
                   </a:ext>
                 </a:extLst>
               </a:tr>
-              <a:tr h="202967">
+              <a:tr h="223264">
                 <a:tc>
                   <a:txBody>
                     <a:bodyPr/>
@@ -13235,7 +13119,7 @@
                           <a:effectLst/>
                           <a:latin typeface="Calibri" panose="020F0502020204030204" pitchFamily="34" charset="0"/>
                         </a:rPr>
-                        <a:t>-1835,98</a:t>
+                        <a:t>-186108</a:t>
                       </a:r>
                     </a:p>
                   </a:txBody>
@@ -13261,7 +13145,7 @@
                           <a:effectLst/>
                           <a:latin typeface="Calibri" panose="020F0502020204030204" pitchFamily="34" charset="0"/>
                         </a:rPr>
-                        <a:t>3679,966</a:t>
+                        <a:t>372224,9</a:t>
                       </a:r>
                     </a:p>
                   </a:txBody>
@@ -13287,7 +13171,7 @@
                           <a:effectLst/>
                           <a:latin typeface="Calibri" panose="020F0502020204030204" pitchFamily="34" charset="0"/>
                         </a:rPr>
-                        <a:t>3677,99</a:t>
+                        <a:t>372222,9</a:t>
                       </a:r>
                     </a:p>
                   </a:txBody>
@@ -13313,7 +13197,7 @@
                           <a:effectLst/>
                           <a:latin typeface="Calibri" panose="020F0502020204030204" pitchFamily="34" charset="0"/>
                         </a:rPr>
-                        <a:t>3692,689</a:t>
+                        <a:t>372251,5</a:t>
                       </a:r>
                     </a:p>
                   </a:txBody>
@@ -13331,7 +13215,7 @@
                   </a:ext>
                 </a:extLst>
               </a:tr>
-              <a:tr h="202967">
+              <a:tr h="223264">
                 <a:tc>
                   <a:txBody>
                     <a:bodyPr/>
@@ -13392,27 +13276,7 @@
                           <a:effectLst/>
                           <a:latin typeface="Calibri" panose="020F0502020204030204" pitchFamily="34" charset="0"/>
                         </a:rPr>
-                        <a:t>-1882,96</a:t>
-                      </a:r>
-                    </a:p>
-                  </a:txBody>
-                  <a:tcPr marL="9525" marR="9525" marT="9525" marB="0" anchor="b"/>
-                </a:tc>
-                <a:tc>
-                  <a:txBody>
-                    <a:bodyPr/>
-                    <a:lstStyle/>
-                    <a:p>
-                      <a:pPr algn="l" fontAlgn="b"/>
-                      <a:r>
-                        <a:rPr lang="de-DE" sz="1100" b="0" i="0" u="none" strike="noStrike" dirty="0">
-                          <a:solidFill>
-                            <a:srgbClr val="000000"/>
-                          </a:solidFill>
-                          <a:effectLst/>
-                          <a:latin typeface="Calibri" panose="020F0502020204030204" pitchFamily="34" charset="0"/>
-                        </a:rPr>
-                        <a:t>3775,92</a:t>
+                        <a:t>-191739</a:t>
                       </a:r>
                     </a:p>
                   </a:txBody>
@@ -13432,7 +13296,7 @@
                           <a:effectLst/>
                           <a:latin typeface="Calibri" panose="020F0502020204030204" pitchFamily="34" charset="0"/>
                         </a:rPr>
-                        <a:t>3773,96</a:t>
+                        <a:t>383488,2</a:t>
                       </a:r>
                     </a:p>
                   </a:txBody>
@@ -13452,7 +13316,27 @@
                           <a:effectLst/>
                           <a:latin typeface="Calibri" panose="020F0502020204030204" pitchFamily="34" charset="0"/>
                         </a:rPr>
-                        <a:t>3793,551</a:t>
+                        <a:t>383486,2</a:t>
+                      </a:r>
+                    </a:p>
+                  </a:txBody>
+                  <a:tcPr marL="9525" marR="9525" marT="9525" marB="0" anchor="b"/>
+                </a:tc>
+                <a:tc>
+                  <a:txBody>
+                    <a:bodyPr/>
+                    <a:lstStyle/>
+                    <a:p>
+                      <a:pPr algn="l" fontAlgn="b"/>
+                      <a:r>
+                        <a:rPr lang="de-DE" sz="1100" b="0" i="0" u="none" strike="noStrike">
+                          <a:solidFill>
+                            <a:srgbClr val="000000"/>
+                          </a:solidFill>
+                          <a:effectLst/>
+                          <a:latin typeface="Calibri" panose="020F0502020204030204" pitchFamily="34" charset="0"/>
+                        </a:rPr>
+                        <a:t>383524,3</a:t>
                       </a:r>
                     </a:p>
                   </a:txBody>
@@ -13464,7 +13348,7 @@
                   </a:ext>
                 </a:extLst>
               </a:tr>
-              <a:tr h="202967">
+              <a:tr h="223264">
                 <a:tc>
                   <a:txBody>
                     <a:bodyPr/>
@@ -13518,34 +13402,14 @@
                     <a:p>
                       <a:pPr algn="l" fontAlgn="b"/>
                       <a:r>
-                        <a:rPr lang="de-DE" sz="1100" b="0" i="0" u="none" strike="noStrike" dirty="0">
+                        <a:rPr lang="de-DE" sz="1100" b="0" i="0" u="none" strike="noStrike">
                           <a:solidFill>
                             <a:srgbClr val="000000"/>
                           </a:solidFill>
                           <a:effectLst/>
                           <a:latin typeface="Calibri" panose="020F0502020204030204" pitchFamily="34" charset="0"/>
                         </a:rPr>
-                        <a:t>-1875,63</a:t>
-                      </a:r>
-                    </a:p>
-                  </a:txBody>
-                  <a:tcPr marL="9525" marR="9525" marT="9525" marB="0" anchor="b"/>
-                </a:tc>
-                <a:tc>
-                  <a:txBody>
-                    <a:bodyPr/>
-                    <a:lstStyle/>
-                    <a:p>
-                      <a:pPr algn="l" fontAlgn="b"/>
-                      <a:r>
-                        <a:rPr lang="de-DE" sz="1100" b="0" i="0" u="none" strike="noStrike" dirty="0">
-                          <a:solidFill>
-                            <a:srgbClr val="000000"/>
-                          </a:solidFill>
-                          <a:effectLst/>
-                          <a:latin typeface="Calibri" panose="020F0502020204030204" pitchFamily="34" charset="0"/>
-                        </a:rPr>
-                        <a:t>3763,267</a:t>
+                        <a:t>-191135</a:t>
                       </a:r>
                     </a:p>
                   </a:txBody>
@@ -13565,7 +13429,7 @@
                           <a:effectLst/>
                           <a:latin typeface="Calibri" panose="020F0502020204030204" pitchFamily="34" charset="0"/>
                         </a:rPr>
-                        <a:t>3761,327</a:t>
+                        <a:t>382282,1</a:t>
                       </a:r>
                     </a:p>
                   </a:txBody>
@@ -13585,7 +13449,27 @@
                           <a:effectLst/>
                           <a:latin typeface="Calibri" panose="020F0502020204030204" pitchFamily="34" charset="0"/>
                         </a:rPr>
-                        <a:t>3785,805</a:t>
+                        <a:t>382280,1</a:t>
+                      </a:r>
+                    </a:p>
+                  </a:txBody>
+                  <a:tcPr marL="9525" marR="9525" marT="9525" marB="0" anchor="b"/>
+                </a:tc>
+                <a:tc>
+                  <a:txBody>
+                    <a:bodyPr/>
+                    <a:lstStyle/>
+                    <a:p>
+                      <a:pPr algn="l" fontAlgn="b"/>
+                      <a:r>
+                        <a:rPr lang="de-DE" sz="1100" b="0" i="0" u="none" strike="noStrike">
+                          <a:solidFill>
+                            <a:srgbClr val="000000"/>
+                          </a:solidFill>
+                          <a:effectLst/>
+                          <a:latin typeface="Calibri" panose="020F0502020204030204" pitchFamily="34" charset="0"/>
+                        </a:rPr>
+                        <a:t>382327,6</a:t>
                       </a:r>
                     </a:p>
                   </a:txBody>
@@ -13597,7 +13481,7 @@
                   </a:ext>
                 </a:extLst>
               </a:tr>
-              <a:tr h="202967">
+              <a:tr h="223264">
                 <a:tc>
                   <a:txBody>
                     <a:bodyPr/>
@@ -13658,47 +13542,7 @@
                           <a:effectLst/>
                           <a:latin typeface="Calibri" panose="020F0502020204030204" pitchFamily="34" charset="0"/>
                         </a:rPr>
-                        <a:t>-1868,78</a:t>
-                      </a:r>
-                    </a:p>
-                  </a:txBody>
-                  <a:tcPr marL="9525" marR="9525" marT="9525" marB="0" anchor="b"/>
-                </a:tc>
-                <a:tc>
-                  <a:txBody>
-                    <a:bodyPr/>
-                    <a:lstStyle/>
-                    <a:p>
-                      <a:pPr algn="l" fontAlgn="b"/>
-                      <a:r>
-                        <a:rPr lang="de-DE" sz="1100" b="0" i="0" u="none" strike="noStrike" dirty="0">
-                          <a:solidFill>
-                            <a:srgbClr val="000000"/>
-                          </a:solidFill>
-                          <a:effectLst/>
-                          <a:latin typeface="Calibri" panose="020F0502020204030204" pitchFamily="34" charset="0"/>
-                        </a:rPr>
-                        <a:t>3751,565</a:t>
-                      </a:r>
-                    </a:p>
-                  </a:txBody>
-                  <a:tcPr marL="9525" marR="9525" marT="9525" marB="0" anchor="b"/>
-                </a:tc>
-                <a:tc>
-                  <a:txBody>
-                    <a:bodyPr/>
-                    <a:lstStyle/>
-                    <a:p>
-                      <a:pPr algn="l" fontAlgn="b"/>
-                      <a:r>
-                        <a:rPr lang="de-DE" sz="1100" b="0" i="0" u="none" strike="noStrike" dirty="0">
-                          <a:solidFill>
-                            <a:srgbClr val="000000"/>
-                          </a:solidFill>
-                          <a:effectLst/>
-                          <a:latin typeface="Calibri" panose="020F0502020204030204" pitchFamily="34" charset="0"/>
-                        </a:rPr>
-                        <a:t>3749,649</a:t>
+                        <a:t>-190624</a:t>
                       </a:r>
                     </a:p>
                   </a:txBody>
@@ -13718,7 +13562,47 @@
                           <a:effectLst/>
                           <a:latin typeface="Calibri" panose="020F0502020204030204" pitchFamily="34" charset="0"/>
                         </a:rPr>
-                        <a:t>3779,011</a:t>
+                        <a:t>381261,8</a:t>
+                      </a:r>
+                    </a:p>
+                  </a:txBody>
+                  <a:tcPr marL="9525" marR="9525" marT="9525" marB="0" anchor="b"/>
+                </a:tc>
+                <a:tc>
+                  <a:txBody>
+                    <a:bodyPr/>
+                    <a:lstStyle/>
+                    <a:p>
+                      <a:pPr algn="l" fontAlgn="b"/>
+                      <a:r>
+                        <a:rPr lang="de-DE" sz="1100" b="0" i="0" u="none" strike="noStrike">
+                          <a:solidFill>
+                            <a:srgbClr val="000000"/>
+                          </a:solidFill>
+                          <a:effectLst/>
+                          <a:latin typeface="Calibri" panose="020F0502020204030204" pitchFamily="34" charset="0"/>
+                        </a:rPr>
+                        <a:t>381259,8</a:t>
+                      </a:r>
+                    </a:p>
+                  </a:txBody>
+                  <a:tcPr marL="9525" marR="9525" marT="9525" marB="0" anchor="b"/>
+                </a:tc>
+                <a:tc>
+                  <a:txBody>
+                    <a:bodyPr/>
+                    <a:lstStyle/>
+                    <a:p>
+                      <a:pPr algn="l" fontAlgn="b"/>
+                      <a:r>
+                        <a:rPr lang="de-DE" sz="1100" b="0" i="0" u="none" strike="noStrike">
+                          <a:solidFill>
+                            <a:srgbClr val="000000"/>
+                          </a:solidFill>
+                          <a:effectLst/>
+                          <a:latin typeface="Calibri" panose="020F0502020204030204" pitchFamily="34" charset="0"/>
+                        </a:rPr>
+                        <a:t>381316,8</a:t>
                       </a:r>
                     </a:p>
                   </a:txBody>
@@ -13730,7 +13614,7 @@
                   </a:ext>
                 </a:extLst>
               </a:tr>
-              <a:tr h="202967">
+              <a:tr h="223264">
                 <a:tc>
                   <a:txBody>
                     <a:bodyPr/>
@@ -13791,7 +13675,7 @@
                           <a:effectLst/>
                           <a:latin typeface="Calibri" panose="020F0502020204030204" pitchFamily="34" charset="0"/>
                         </a:rPr>
-                        <a:t>-1861,65</a:t>
+                        <a:t>-190073</a:t>
                       </a:r>
                     </a:p>
                   </a:txBody>
@@ -13811,27 +13695,7 @@
                           <a:effectLst/>
                           <a:latin typeface="Calibri" panose="020F0502020204030204" pitchFamily="34" charset="0"/>
                         </a:rPr>
-                        <a:t>3739,297</a:t>
-                      </a:r>
-                    </a:p>
-                  </a:txBody>
-                  <a:tcPr marL="9525" marR="9525" marT="9525" marB="0" anchor="b"/>
-                </a:tc>
-                <a:tc>
-                  <a:txBody>
-                    <a:bodyPr/>
-                    <a:lstStyle/>
-                    <a:p>
-                      <a:pPr algn="l" fontAlgn="b"/>
-                      <a:r>
-                        <a:rPr lang="de-DE" sz="1100" b="0" i="0" u="none" strike="noStrike" dirty="0">
-                          <a:solidFill>
-                            <a:srgbClr val="000000"/>
-                          </a:solidFill>
-                          <a:effectLst/>
-                          <a:latin typeface="Calibri" panose="020F0502020204030204" pitchFamily="34" charset="0"/>
-                        </a:rPr>
-                        <a:t>3737,41</a:t>
+                        <a:t>380162,9</a:t>
                       </a:r>
                     </a:p>
                   </a:txBody>
@@ -13851,7 +13715,27 @@
                           <a:effectLst/>
                           <a:latin typeface="Calibri" panose="020F0502020204030204" pitchFamily="34" charset="0"/>
                         </a:rPr>
-                        <a:t>3771,652</a:t>
+                        <a:t>380160,9</a:t>
+                      </a:r>
+                    </a:p>
+                  </a:txBody>
+                  <a:tcPr marL="9525" marR="9525" marT="9525" marB="0" anchor="b"/>
+                </a:tc>
+                <a:tc>
+                  <a:txBody>
+                    <a:bodyPr/>
+                    <a:lstStyle/>
+                    <a:p>
+                      <a:pPr algn="l" fontAlgn="b"/>
+                      <a:r>
+                        <a:rPr lang="de-DE" sz="1100" b="0" i="0" u="none" strike="noStrike">
+                          <a:solidFill>
+                            <a:srgbClr val="000000"/>
+                          </a:solidFill>
+                          <a:effectLst/>
+                          <a:latin typeface="Calibri" panose="020F0502020204030204" pitchFamily="34" charset="0"/>
+                        </a:rPr>
+                        <a:t>380227,5</a:t>
                       </a:r>
                     </a:p>
                   </a:txBody>
@@ -13863,7 +13747,7 @@
                   </a:ext>
                 </a:extLst>
               </a:tr>
-              <a:tr h="202967">
+              <a:tr h="223264">
                 <a:tc>
                   <a:txBody>
                     <a:bodyPr/>
@@ -13894,12 +13778,12 @@
                     <a:p>
                       <a:pPr algn="l" fontAlgn="b"/>
                       <a:r>
-                        <a:rPr lang="de-DE" sz="1100" u="none" strike="noStrike">
+                        <a:rPr lang="de-DE" sz="1100" u="none" strike="noStrike" dirty="0">
                           <a:effectLst/>
                         </a:rPr>
                         <a:t>8</a:t>
                       </a:r>
-                      <a:endParaRPr lang="de-DE" sz="1100" b="0" i="0" u="none" strike="noStrike">
+                      <a:endParaRPr lang="de-DE" sz="1100" b="0" i="0" u="none" strike="noStrike" dirty="0">
                         <a:solidFill>
                           <a:srgbClr val="000000"/>
                         </a:solidFill>
@@ -13924,7 +13808,27 @@
                           <a:effectLst/>
                           <a:latin typeface="Calibri" panose="020F0502020204030204" pitchFamily="34" charset="0"/>
                         </a:rPr>
-                        <a:t>-1854,75</a:t>
+                        <a:t>-189610</a:t>
+                      </a:r>
+                    </a:p>
+                  </a:txBody>
+                  <a:tcPr marL="9525" marR="9525" marT="9525" marB="0" anchor="b"/>
+                </a:tc>
+                <a:tc>
+                  <a:txBody>
+                    <a:bodyPr/>
+                    <a:lstStyle/>
+                    <a:p>
+                      <a:pPr algn="l" fontAlgn="b"/>
+                      <a:r>
+                        <a:rPr lang="de-DE" sz="1100" b="0" i="0" u="none" strike="noStrike" dirty="0">
+                          <a:solidFill>
+                            <a:srgbClr val="000000"/>
+                          </a:solidFill>
+                          <a:effectLst/>
+                          <a:latin typeface="Calibri" panose="020F0502020204030204" pitchFamily="34" charset="0"/>
+                        </a:rPr>
+                        <a:t>379238,5</a:t>
                       </a:r>
                     </a:p>
                   </a:txBody>
@@ -13944,27 +13848,7 @@
                           <a:effectLst/>
                           <a:latin typeface="Calibri" panose="020F0502020204030204" pitchFamily="34" charset="0"/>
                         </a:rPr>
-                        <a:t>3727,497</a:t>
-                      </a:r>
-                    </a:p>
-                  </a:txBody>
-                  <a:tcPr marL="9525" marR="9525" marT="9525" marB="0" anchor="b"/>
-                </a:tc>
-                <a:tc>
-                  <a:txBody>
-                    <a:bodyPr/>
-                    <a:lstStyle/>
-                    <a:p>
-                      <a:pPr algn="l" fontAlgn="b"/>
-                      <a:r>
-                        <a:rPr lang="de-DE" sz="1100" b="0" i="0" u="none" strike="noStrike" dirty="0">
-                          <a:solidFill>
-                            <a:srgbClr val="000000"/>
-                          </a:solidFill>
-                          <a:effectLst/>
-                          <a:latin typeface="Calibri" panose="020F0502020204030204" pitchFamily="34" charset="0"/>
-                        </a:rPr>
-                        <a:t>3725,642</a:t>
+                        <a:t>379236,5</a:t>
                       </a:r>
                     </a:p>
                   </a:txBody>
@@ -13984,7 +13868,7 @@
                           <a:effectLst/>
                           <a:latin typeface="Calibri" panose="020F0502020204030204" pitchFamily="34" charset="0"/>
                         </a:rPr>
-                        <a:t>3764,759</a:t>
+                        <a:t>379312,7</a:t>
                       </a:r>
                     </a:p>
                   </a:txBody>
@@ -13996,7 +13880,7 @@
                   </a:ext>
                 </a:extLst>
               </a:tr>
-              <a:tr h="202967">
+              <a:tr h="223264">
                 <a:tc>
                   <a:txBody>
                     <a:bodyPr/>
@@ -14057,7 +13941,7 @@
                           <a:effectLst/>
                           <a:latin typeface="Calibri" panose="020F0502020204030204" pitchFamily="34" charset="0"/>
                         </a:rPr>
-                        <a:t>-1907,46</a:t>
+                        <a:t>-194141</a:t>
                       </a:r>
                     </a:p>
                   </a:txBody>
@@ -14077,7 +13961,27 @@
                           <a:effectLst/>
                           <a:latin typeface="Calibri" panose="020F0502020204030204" pitchFamily="34" charset="0"/>
                         </a:rPr>
-                        <a:t>3820,911</a:t>
+                        <a:t>388287,3</a:t>
+                      </a:r>
+                    </a:p>
+                  </a:txBody>
+                  <a:tcPr marL="9525" marR="9525" marT="9525" marB="0" anchor="b"/>
+                </a:tc>
+                <a:tc>
+                  <a:txBody>
+                    <a:bodyPr/>
+                    <a:lstStyle/>
+                    <a:p>
+                      <a:pPr algn="l" fontAlgn="b"/>
+                      <a:r>
+                        <a:rPr lang="de-DE" sz="1100" b="0" i="0" u="none" strike="noStrike">
+                          <a:solidFill>
+                            <a:srgbClr val="000000"/>
+                          </a:solidFill>
+                          <a:effectLst/>
+                          <a:latin typeface="Calibri" panose="020F0502020204030204" pitchFamily="34" charset="0"/>
+                        </a:rPr>
+                        <a:t>388285,3</a:t>
                       </a:r>
                     </a:p>
                   </a:txBody>
@@ -14097,27 +14001,7 @@
                           <a:effectLst/>
                           <a:latin typeface="Calibri" panose="020F0502020204030204" pitchFamily="34" charset="0"/>
                         </a:rPr>
-                        <a:t>3818,923</a:t>
-                      </a:r>
-                    </a:p>
-                  </a:txBody>
-                  <a:tcPr marL="9525" marR="9525" marT="9525" marB="0" anchor="b"/>
-                </a:tc>
-                <a:tc>
-                  <a:txBody>
-                    <a:bodyPr/>
-                    <a:lstStyle/>
-                    <a:p>
-                      <a:pPr algn="l" fontAlgn="b"/>
-                      <a:r>
-                        <a:rPr lang="de-DE" sz="1100" b="0" i="0" u="none" strike="noStrike" dirty="0">
-                          <a:solidFill>
-                            <a:srgbClr val="000000"/>
-                          </a:solidFill>
-                          <a:effectLst/>
-                          <a:latin typeface="Calibri" panose="020F0502020204030204" pitchFamily="34" charset="0"/>
-                        </a:rPr>
-                        <a:t>3828,726</a:t>
+                        <a:t>388304,3</a:t>
                       </a:r>
                     </a:p>
                   </a:txBody>
@@ -14204,40 +14088,267 @@
           </a:p>
         </p:txBody>
       </p:sp>
-      <p:sp>
-        <p:nvSpPr>
-          <p:cNvPr id="10" name="Inhaltsplatzhalter 9"/>
-          <p:cNvSpPr>
-            <a:spLocks noGrp="1"/>
-          </p:cNvSpPr>
-          <p:nvPr>
-            <p:ph sz="quarter" idx="13"/>
-          </p:nvPr>
-        </p:nvSpPr>
-        <p:spPr/>
-        <p:txBody>
-          <a:bodyPr>
-            <a:normAutofit fontScale="92500" lnSpcReduction="10000"/>
-          </a:bodyPr>
-          <a:lstStyle/>
-          <a:p>
-            <a:r>
-              <a:rPr lang="de-DE" dirty="0"/>
-              <a:t>Best fit: ARCH(3)-Modell</a:t>
-            </a:r>
-          </a:p>
-          <a:p>
-            <a:r>
-              <a:rPr lang="de-DE" dirty="0"/>
-              <a:t>p-Wert Box-Pierce-Test der Residuen: </a:t>
-            </a:r>
-            <a:r>
-              <a:rPr lang="de-DE" b="1" dirty="0"/>
-              <a:t>0.7895</a:t>
-            </a:r>
-          </a:p>
-        </p:txBody>
-      </p:sp>
+      <mc:AlternateContent xmlns:mc="http://schemas.openxmlformats.org/markup-compatibility/2006">
+        <mc:Choice xmlns:a14="http://schemas.microsoft.com/office/drawing/2010/main" Requires="a14">
+          <p:sp>
+            <p:nvSpPr>
+              <p:cNvPr id="10" name="Inhaltsplatzhalter 9"/>
+              <p:cNvSpPr>
+                <a:spLocks noGrp="1"/>
+              </p:cNvSpPr>
+              <p:nvPr>
+                <p:ph sz="quarter" idx="13"/>
+              </p:nvPr>
+            </p:nvSpPr>
+            <p:spPr/>
+            <p:txBody>
+              <a:bodyPr>
+                <a:normAutofit fontScale="92500" lnSpcReduction="10000"/>
+              </a:bodyPr>
+              <a:lstStyle/>
+              <a:p>
+                <a:r>
+                  <a:rPr lang="de-DE" dirty="0" smtClean="0"/>
+                  <a:t>Best fit: ARCH(3)-Modell mit </a:t>
+                </a:r>
+                <a14:m>
+                  <m:oMath xmlns:m="http://schemas.openxmlformats.org/officeDocument/2006/math">
+                    <m:sSub>
+                      <m:sSubPr>
+                        <m:ctrlPr>
+                          <a:rPr lang="de-DE" i="1">
+                            <a:latin typeface="Cambria Math" panose="02040503050406030204" pitchFamily="18" charset="0"/>
+                          </a:rPr>
+                        </m:ctrlPr>
+                      </m:sSubPr>
+                      <m:e>
+                        <m:r>
+                          <m:rPr>
+                            <m:sty m:val="p"/>
+                          </m:rPr>
+                          <a:rPr lang="el-GR" i="1">
+                            <a:latin typeface="Cambria Math" panose="02040503050406030204" pitchFamily="18" charset="0"/>
+                          </a:rPr>
+                          <m:t>α</m:t>
+                        </m:r>
+                      </m:e>
+                      <m:sub>
+                        <m:r>
+                          <a:rPr lang="de-DE" i="1">
+                            <a:latin typeface="Cambria Math" panose="02040503050406030204" pitchFamily="18" charset="0"/>
+                          </a:rPr>
+                          <m:t>0</m:t>
+                        </m:r>
+                      </m:sub>
+                    </m:sSub>
+                    <m:r>
+                      <a:rPr lang="de-DE" i="1">
+                        <a:latin typeface="Cambria Math" panose="02040503050406030204" pitchFamily="18" charset="0"/>
+                      </a:rPr>
+                      <m:t>=1</m:t>
+                    </m:r>
+                    <m:r>
+                      <a:rPr lang="de-DE" b="0" i="1" smtClean="0">
+                        <a:latin typeface="Cambria Math" panose="02040503050406030204" pitchFamily="18" charset="0"/>
+                      </a:rPr>
+                      <m:t>.011</m:t>
+                    </m:r>
+                    <m:r>
+                      <a:rPr lang="de-DE" i="1">
+                        <a:latin typeface="Cambria Math" panose="02040503050406030204" pitchFamily="18" charset="0"/>
+                      </a:rPr>
+                      <m:t>,  </m:t>
+                    </m:r>
+                    <m:sSub>
+                      <m:sSubPr>
+                        <m:ctrlPr>
+                          <a:rPr lang="de-DE" i="1">
+                            <a:latin typeface="Cambria Math" panose="02040503050406030204" pitchFamily="18" charset="0"/>
+                          </a:rPr>
+                        </m:ctrlPr>
+                      </m:sSubPr>
+                      <m:e>
+                        <m:r>
+                          <m:rPr>
+                            <m:sty m:val="p"/>
+                          </m:rPr>
+                          <a:rPr lang="el-GR" i="1">
+                            <a:latin typeface="Cambria Math" panose="02040503050406030204" pitchFamily="18" charset="0"/>
+                          </a:rPr>
+                          <m:t>α</m:t>
+                        </m:r>
+                      </m:e>
+                      <m:sub>
+                        <m:r>
+                          <a:rPr lang="de-DE" i="1">
+                            <a:latin typeface="Cambria Math" panose="02040503050406030204" pitchFamily="18" charset="0"/>
+                          </a:rPr>
+                          <m:t>1</m:t>
+                        </m:r>
+                      </m:sub>
+                    </m:sSub>
+                    <m:r>
+                      <a:rPr lang="de-DE" i="1">
+                        <a:latin typeface="Cambria Math" panose="02040503050406030204" pitchFamily="18" charset="0"/>
+                      </a:rPr>
+                      <m:t>=0.</m:t>
+                    </m:r>
+                    <m:r>
+                      <a:rPr lang="de-DE" b="0" i="0" smtClean="0">
+                        <a:latin typeface="Cambria Math" panose="02040503050406030204" pitchFamily="18" charset="0"/>
+                      </a:rPr>
+                      <m:t>3974</m:t>
+                    </m:r>
+                    <m:r>
+                      <a:rPr lang="de-DE">
+                        <a:latin typeface="Cambria Math" panose="02040503050406030204" pitchFamily="18" charset="0"/>
+                      </a:rPr>
+                      <m:t>,  </m:t>
+                    </m:r>
+                    <m:sSub>
+                      <m:sSubPr>
+                        <m:ctrlPr>
+                          <a:rPr lang="de-DE" i="1">
+                            <a:latin typeface="Cambria Math" panose="02040503050406030204" pitchFamily="18" charset="0"/>
+                          </a:rPr>
+                        </m:ctrlPr>
+                      </m:sSubPr>
+                      <m:e>
+                        <m:r>
+                          <m:rPr>
+                            <m:sty m:val="p"/>
+                          </m:rPr>
+                          <a:rPr lang="el-GR" i="1">
+                            <a:latin typeface="Cambria Math" panose="02040503050406030204" pitchFamily="18" charset="0"/>
+                          </a:rPr>
+                          <m:t>α</m:t>
+                        </m:r>
+                      </m:e>
+                      <m:sub>
+                        <m:r>
+                          <a:rPr lang="de-DE" i="1">
+                            <a:latin typeface="Cambria Math" panose="02040503050406030204" pitchFamily="18" charset="0"/>
+                          </a:rPr>
+                          <m:t>2</m:t>
+                        </m:r>
+                      </m:sub>
+                    </m:sSub>
+                    <m:r>
+                      <a:rPr lang="de-DE" i="1">
+                        <a:latin typeface="Cambria Math" panose="02040503050406030204" pitchFamily="18" charset="0"/>
+                      </a:rPr>
+                      <m:t>=0.</m:t>
+                    </m:r>
+                    <m:r>
+                      <a:rPr lang="de-DE" b="0" i="1" smtClean="0">
+                        <a:latin typeface="Cambria Math" panose="02040503050406030204" pitchFamily="18" charset="0"/>
+                      </a:rPr>
+                      <m:t>1989</m:t>
+                    </m:r>
+                    <m:r>
+                      <a:rPr lang="de-DE">
+                        <a:latin typeface="Cambria Math" panose="02040503050406030204" pitchFamily="18" charset="0"/>
+                      </a:rPr>
+                      <m:t>,  </m:t>
+                    </m:r>
+                    <m:sSub>
+                      <m:sSubPr>
+                        <m:ctrlPr>
+                          <a:rPr lang="de-DE" i="1">
+                            <a:latin typeface="Cambria Math" panose="02040503050406030204" pitchFamily="18" charset="0"/>
+                          </a:rPr>
+                        </m:ctrlPr>
+                      </m:sSubPr>
+                      <m:e>
+                        <m:r>
+                          <m:rPr>
+                            <m:sty m:val="p"/>
+                          </m:rPr>
+                          <a:rPr lang="el-GR" i="1">
+                            <a:latin typeface="Cambria Math" panose="02040503050406030204" pitchFamily="18" charset="0"/>
+                          </a:rPr>
+                          <m:t>α</m:t>
+                        </m:r>
+                      </m:e>
+                      <m:sub>
+                        <m:r>
+                          <a:rPr lang="de-DE" i="1">
+                            <a:latin typeface="Cambria Math" panose="02040503050406030204" pitchFamily="18" charset="0"/>
+                          </a:rPr>
+                          <m:t>3</m:t>
+                        </m:r>
+                      </m:sub>
+                    </m:sSub>
+                    <m:r>
+                      <a:rPr lang="de-DE" i="1">
+                        <a:latin typeface="Cambria Math" panose="02040503050406030204" pitchFamily="18" charset="0"/>
+                      </a:rPr>
+                      <m:t>=0.</m:t>
+                    </m:r>
+                    <m:r>
+                      <a:rPr lang="de-DE" i="1">
+                        <a:latin typeface="Cambria Math" panose="02040503050406030204" pitchFamily="18" charset="0"/>
+                      </a:rPr>
+                      <m:t>1</m:t>
+                    </m:r>
+                    <m:r>
+                      <a:rPr lang="de-DE" b="0" i="1" smtClean="0">
+                        <a:latin typeface="Cambria Math" panose="02040503050406030204" pitchFamily="18" charset="0"/>
+                      </a:rPr>
+                      <m:t>040</m:t>
+                    </m:r>
+                  </m:oMath>
+                </a14:m>
+                <a:endParaRPr lang="de-DE" dirty="0"/>
+              </a:p>
+              <a:p>
+                <a:r>
+                  <a:rPr lang="de-DE" dirty="0"/>
+                  <a:t>p-Wert Box-Pierce-Test der Residuen: </a:t>
+                </a:r>
+                <a:r>
+                  <a:rPr lang="de-DE" b="1" dirty="0" smtClean="0"/>
+                  <a:t>0.401</a:t>
+                </a:r>
+                <a:endParaRPr lang="de-DE" b="1" dirty="0"/>
+              </a:p>
+            </p:txBody>
+          </p:sp>
+        </mc:Choice>
+        <mc:Fallback>
+          <p:sp>
+            <p:nvSpPr>
+              <p:cNvPr id="10" name="Inhaltsplatzhalter 9"/>
+              <p:cNvSpPr>
+                <a:spLocks noGrp="1" noRot="1" noChangeAspect="1" noMove="1" noResize="1" noEditPoints="1" noAdjustHandles="1" noChangeArrowheads="1" noChangeShapeType="1" noTextEdit="1"/>
+              </p:cNvSpPr>
+              <p:nvPr>
+                <p:ph sz="quarter" idx="13"/>
+              </p:nvPr>
+            </p:nvSpPr>
+            <p:spPr>
+              <a:blipFill>
+                <a:blip r:embed="rId3"/>
+                <a:stretch>
+                  <a:fillRect t="-4167" b="-6250"/>
+                </a:stretch>
+              </a:blipFill>
+            </p:spPr>
+            <p:txBody>
+              <a:bodyPr/>
+              <a:lstStyle/>
+              <a:p>
+                <a:r>
+                  <a:rPr lang="de-DE">
+                    <a:noFill/>
+                  </a:rPr>
+                  <a:t> </a:t>
+                </a:r>
+              </a:p>
+            </p:txBody>
+          </p:sp>
+        </mc:Fallback>
+      </mc:AlternateContent>
       <p:pic>
         <p:nvPicPr>
           <p:cNvPr id="14" name="Inhaltsplatzhalter 11"/>
@@ -14249,7 +14360,7 @@
           </p:nvPr>
         </p:nvPicPr>
         <p:blipFill>
-          <a:blip r:embed="rId3" cstate="print">
+          <a:blip r:embed="rId4">
             <a:extLst>
               <a:ext uri="{28A0092B-C50C-407E-A947-70E740481C1C}">
                 <a14:useLocalDpi xmlns:a14="http://schemas.microsoft.com/office/drawing/2010/main" val="0"/>
@@ -14262,8 +14373,8 @@
         </p:blipFill>
         <p:spPr>
           <a:xfrm>
-            <a:off x="4644705" y="1420745"/>
-            <a:ext cx="4175767" cy="2256890"/>
+            <a:off x="4644705" y="1419622"/>
+            <a:ext cx="4175767" cy="2225130"/>
           </a:xfrm>
         </p:spPr>
       </p:pic>
@@ -14358,12 +14469,16 @@
           </p:cNvGraphicFramePr>
           <p:nvPr>
             <p:ph sz="half" idx="2"/>
-            <p:extLst/>
+            <p:extLst>
+              <p:ext uri="{D42A27DB-BD31-4B8C-83A1-F6EECF244321}">
+                <p14:modId xmlns:p14="http://schemas.microsoft.com/office/powerpoint/2010/main" val="1738542040"/>
+              </p:ext>
+            </p:extLst>
           </p:nvPr>
         </p:nvGraphicFramePr>
         <p:xfrm>
-          <a:off x="323850" y="1419225"/>
-          <a:ext cx="4173540" cy="2232637"/>
+          <a:off x="323850" y="1419219"/>
+          <a:ext cx="4173540" cy="2232650"/>
         </p:xfrm>
         <a:graphic>
           <a:graphicData uri="http://schemas.openxmlformats.org/drawingml/2006/table">
@@ -14415,7 +14530,7 @@
                   </a:extLst>
                 </a:gridCol>
               </a:tblGrid>
-              <a:tr h="202967">
+              <a:tr h="223265">
                 <a:tc>
                   <a:txBody>
                     <a:bodyPr/>
@@ -14560,140 +14675,7 @@
                   </a:ext>
                 </a:extLst>
               </a:tr>
-              <a:tr h="202967">
-                <a:tc>
-                  <a:txBody>
-                    <a:bodyPr/>
-                    <a:lstStyle/>
-                    <a:p>
-                      <a:pPr algn="l" fontAlgn="b"/>
-                      <a:r>
-                        <a:rPr lang="de-DE" sz="1100" u="none" strike="noStrike" dirty="0">
-                          <a:effectLst/>
-                        </a:rPr>
-                        <a:t>ARCH(0)</a:t>
-                      </a:r>
-                      <a:endParaRPr lang="de-DE" sz="1100" b="0" i="0" u="none" strike="noStrike" dirty="0">
-                        <a:solidFill>
-                          <a:srgbClr val="000000"/>
-                        </a:solidFill>
-                        <a:effectLst/>
-                        <a:latin typeface="Calibri" panose="020F0502020204030204" pitchFamily="34" charset="0"/>
-                      </a:endParaRPr>
-                    </a:p>
-                  </a:txBody>
-                  <a:tcPr marL="9525" marR="9525" marT="9525" marB="0" anchor="ctr"/>
-                </a:tc>
-                <a:tc>
-                  <a:txBody>
-                    <a:bodyPr/>
-                    <a:lstStyle/>
-                    <a:p>
-                      <a:pPr algn="l" fontAlgn="b"/>
-                      <a:r>
-                        <a:rPr lang="de-DE" sz="1100" u="none" strike="noStrike" dirty="0">
-                          <a:effectLst/>
-                        </a:rPr>
-                        <a:t>0</a:t>
-                      </a:r>
-                      <a:endParaRPr lang="de-DE" sz="1100" b="0" i="0" u="none" strike="noStrike" dirty="0">
-                        <a:solidFill>
-                          <a:srgbClr val="000000"/>
-                        </a:solidFill>
-                        <a:effectLst/>
-                        <a:latin typeface="Calibri" panose="020F0502020204030204" pitchFamily="34" charset="0"/>
-                      </a:endParaRPr>
-                    </a:p>
-                  </a:txBody>
-                  <a:tcPr marL="9525" marR="9525" marT="9525" marB="0" anchor="ctr"/>
-                </a:tc>
-                <a:tc>
-                  <a:txBody>
-                    <a:bodyPr/>
-                    <a:lstStyle/>
-                    <a:p>
-                      <a:pPr algn="l" fontAlgn="b"/>
-                      <a:r>
-                        <a:rPr lang="de-DE" sz="1100" b="0" i="0" u="none" strike="noStrike">
-                          <a:solidFill>
-                            <a:srgbClr val="000000"/>
-                          </a:solidFill>
-                          <a:effectLst/>
-                          <a:latin typeface="Calibri" panose="020F0502020204030204" pitchFamily="34" charset="0"/>
-                        </a:rPr>
-                        <a:t>-257499</a:t>
-                      </a:r>
-                    </a:p>
-                  </a:txBody>
-                  <a:tcPr marL="9525" marR="9525" marT="9525" marB="0" anchor="b"/>
-                </a:tc>
-                <a:tc>
-                  <a:txBody>
-                    <a:bodyPr/>
-                    <a:lstStyle/>
-                    <a:p>
-                      <a:pPr algn="l" fontAlgn="b"/>
-                      <a:r>
-                        <a:rPr lang="de-DE" sz="1100" b="0" i="0" u="none" strike="noStrike">
-                          <a:solidFill>
-                            <a:srgbClr val="000000"/>
-                          </a:solidFill>
-                          <a:effectLst/>
-                          <a:latin typeface="Calibri" panose="020F0502020204030204" pitchFamily="34" charset="0"/>
-                        </a:rPr>
-                        <a:t>515000,5</a:t>
-                      </a:r>
-                    </a:p>
-                  </a:txBody>
-                  <a:tcPr marL="9525" marR="9525" marT="9525" marB="0" anchor="b"/>
-                </a:tc>
-                <a:tc>
-                  <a:txBody>
-                    <a:bodyPr/>
-                    <a:lstStyle/>
-                    <a:p>
-                      <a:pPr algn="l" fontAlgn="b"/>
-                      <a:r>
-                        <a:rPr lang="de-DE" sz="1100" b="0" i="0" u="none" strike="noStrike">
-                          <a:solidFill>
-                            <a:srgbClr val="000000"/>
-                          </a:solidFill>
-                          <a:effectLst/>
-                          <a:latin typeface="Calibri" panose="020F0502020204030204" pitchFamily="34" charset="0"/>
-                        </a:rPr>
-                        <a:t>514998,5</a:t>
-                      </a:r>
-                    </a:p>
-                  </a:txBody>
-                  <a:tcPr marL="9525" marR="9525" marT="9525" marB="0" anchor="b"/>
-                </a:tc>
-                <a:tc>
-                  <a:txBody>
-                    <a:bodyPr/>
-                    <a:lstStyle/>
-                    <a:p>
-                      <a:pPr algn="l" fontAlgn="b"/>
-                      <a:r>
-                        <a:rPr lang="de-DE" sz="1100" b="0" i="0" u="none" strike="noStrike">
-                          <a:solidFill>
-                            <a:srgbClr val="000000"/>
-                          </a:solidFill>
-                          <a:effectLst/>
-                          <a:latin typeface="Calibri" panose="020F0502020204030204" pitchFamily="34" charset="0"/>
-                        </a:rPr>
-                        <a:t>514998,5</a:t>
-                      </a:r>
-                    </a:p>
-                  </a:txBody>
-                  <a:tcPr marL="9525" marR="9525" marT="9525" marB="0" anchor="b"/>
-                </a:tc>
-                <a:extLst>
-                  <a:ext uri="{0D108BD9-81ED-4DB2-BD59-A6C34878D82A}">
-                    <a16:rowId xmlns:a16="http://schemas.microsoft.com/office/drawing/2014/main" val="896925308"/>
-                  </a:ext>
-                </a:extLst>
-              </a:tr>
-              <a:tr h="202967">
+              <a:tr h="223265">
                 <a:tc>
                   <a:txBody>
                     <a:bodyPr/>
@@ -14716,7 +14698,11 @@
                     </a:p>
                   </a:txBody>
                   <a:tcPr marL="9525" marR="9525" marT="9525" marB="0" anchor="ctr">
-                    <a:noFill/>
+                    <a:solidFill>
+                      <a:schemeClr val="bg1">
+                        <a:lumMod val="85000"/>
+                      </a:schemeClr>
+                    </a:solidFill>
                   </a:tcPr>
                 </a:tc>
                 <a:tc>
@@ -14741,7 +14727,11 @@
                     </a:p>
                   </a:txBody>
                   <a:tcPr marL="9525" marR="9525" marT="9525" marB="0" anchor="ctr">
-                    <a:noFill/>
+                    <a:solidFill>
+                      <a:schemeClr val="bg1">
+                        <a:lumMod val="85000"/>
+                      </a:schemeClr>
+                    </a:solidFill>
                   </a:tcPr>
                 </a:tc>
                 <a:tc>
@@ -14758,12 +14748,16 @@
                           <a:effectLst/>
                           <a:latin typeface="Calibri" panose="020F0502020204030204" pitchFamily="34" charset="0"/>
                         </a:rPr>
-                        <a:t>-256750</a:t>
+                        <a:t>-256748</a:t>
                       </a:r>
                     </a:p>
                   </a:txBody>
                   <a:tcPr marL="9525" marR="9525" marT="9525" marB="0" anchor="b">
-                    <a:noFill/>
+                    <a:solidFill>
+                      <a:schemeClr val="bg1">
+                        <a:lumMod val="85000"/>
+                      </a:schemeClr>
+                    </a:solidFill>
                   </a:tcPr>
                 </a:tc>
                 <a:tc>
@@ -14780,12 +14774,16 @@
                           <a:effectLst/>
                           <a:latin typeface="Calibri" panose="020F0502020204030204" pitchFamily="34" charset="0"/>
                         </a:rPr>
-                        <a:t>513503,7</a:t>
+                        <a:t>513500,7</a:t>
                       </a:r>
                     </a:p>
                   </a:txBody>
                   <a:tcPr marL="9525" marR="9525" marT="9525" marB="0" anchor="b">
-                    <a:noFill/>
+                    <a:solidFill>
+                      <a:schemeClr val="bg1">
+                        <a:lumMod val="85000"/>
+                      </a:schemeClr>
+                    </a:solidFill>
                   </a:tcPr>
                 </a:tc>
                 <a:tc>
@@ -14802,12 +14800,16 @@
                           <a:effectLst/>
                           <a:latin typeface="Calibri" panose="020F0502020204030204" pitchFamily="34" charset="0"/>
                         </a:rPr>
-                        <a:t>513501,7</a:t>
+                        <a:t>513498,7</a:t>
                       </a:r>
                     </a:p>
                   </a:txBody>
                   <a:tcPr marL="9525" marR="9525" marT="9525" marB="0" anchor="b">
-                    <a:noFill/>
+                    <a:solidFill>
+                      <a:schemeClr val="bg1">
+                        <a:lumMod val="85000"/>
+                      </a:schemeClr>
+                    </a:solidFill>
                   </a:tcPr>
                 </a:tc>
                 <a:tc>
@@ -14824,12 +14826,16 @@
                           <a:effectLst/>
                           <a:latin typeface="Calibri" panose="020F0502020204030204" pitchFamily="34" charset="0"/>
                         </a:rPr>
-                        <a:t>513511,2</a:t>
+                        <a:t>513508,2</a:t>
                       </a:r>
                     </a:p>
                   </a:txBody>
                   <a:tcPr marL="9525" marR="9525" marT="9525" marB="0" anchor="b">
-                    <a:noFill/>
+                    <a:solidFill>
+                      <a:schemeClr val="bg1">
+                        <a:lumMod val="85000"/>
+                      </a:schemeClr>
+                    </a:solidFill>
                   </a:tcPr>
                 </a:tc>
                 <a:extLst>
@@ -14838,7 +14844,7 @@
                   </a:ext>
                 </a:extLst>
               </a:tr>
-              <a:tr h="202967">
+              <a:tr h="223265">
                 <a:tc>
                   <a:txBody>
                     <a:bodyPr/>
@@ -14892,14 +14898,14 @@
                     <a:p>
                       <a:pPr algn="l" fontAlgn="b"/>
                       <a:r>
-                        <a:rPr lang="de-DE" sz="1100" b="0" i="0" u="none" strike="noStrike" dirty="0">
+                        <a:rPr lang="de-DE" sz="1100" b="0" i="0" u="none" strike="noStrike">
                           <a:solidFill>
                             <a:srgbClr val="000000"/>
                           </a:solidFill>
                           <a:effectLst/>
                           <a:latin typeface="Calibri" panose="020F0502020204030204" pitchFamily="34" charset="0"/>
                         </a:rPr>
-                        <a:t>-256266</a:t>
+                        <a:t>-256264</a:t>
                       </a:r>
                     </a:p>
                   </a:txBody>
@@ -14919,7 +14925,7 @@
                           <a:effectLst/>
                           <a:latin typeface="Calibri" panose="020F0502020204030204" pitchFamily="34" charset="0"/>
                         </a:rPr>
-                        <a:t>512537,3</a:t>
+                        <a:t>512534,1</a:t>
                       </a:r>
                     </a:p>
                   </a:txBody>
@@ -14939,7 +14945,7 @@
                           <a:effectLst/>
                           <a:latin typeface="Calibri" panose="020F0502020204030204" pitchFamily="34" charset="0"/>
                         </a:rPr>
-                        <a:t>512535,3</a:t>
+                        <a:t>512532,1</a:t>
                       </a:r>
                     </a:p>
                   </a:txBody>
@@ -14959,7 +14965,7 @@
                           <a:effectLst/>
                           <a:latin typeface="Calibri" panose="020F0502020204030204" pitchFamily="34" charset="0"/>
                         </a:rPr>
-                        <a:t>512554,3</a:t>
+                        <a:t>512551,1</a:t>
                       </a:r>
                     </a:p>
                   </a:txBody>
@@ -14971,7 +14977,7 @@
                   </a:ext>
                 </a:extLst>
               </a:tr>
-              <a:tr h="202967">
+              <a:tr h="223265">
                 <a:tc>
                   <a:txBody>
                     <a:bodyPr/>
@@ -14994,7 +15000,11 @@
                     </a:p>
                   </a:txBody>
                   <a:tcPr marL="9525" marR="9525" marT="9525" marB="0" anchor="ctr">
-                    <a:noFill/>
+                    <a:solidFill>
+                      <a:schemeClr val="bg1">
+                        <a:lumMod val="85000"/>
+                      </a:schemeClr>
+                    </a:solidFill>
                   </a:tcPr>
                 </a:tc>
                 <a:tc>
@@ -15019,7 +15029,11 @@
                     </a:p>
                   </a:txBody>
                   <a:tcPr marL="9525" marR="9525" marT="9525" marB="0" anchor="ctr">
-                    <a:noFill/>
+                    <a:solidFill>
+                      <a:schemeClr val="bg1">
+                        <a:lumMod val="85000"/>
+                      </a:schemeClr>
+                    </a:solidFill>
                   </a:tcPr>
                 </a:tc>
                 <a:tc>
@@ -15041,7 +15055,11 @@
                     </a:p>
                   </a:txBody>
                   <a:tcPr marL="9525" marR="9525" marT="9525" marB="0" anchor="b">
-                    <a:noFill/>
+                    <a:solidFill>
+                      <a:schemeClr val="bg1">
+                        <a:lumMod val="85000"/>
+                      </a:schemeClr>
+                    </a:solidFill>
                   </a:tcPr>
                 </a:tc>
                 <a:tc>
@@ -15058,12 +15076,16 @@
                           <a:effectLst/>
                           <a:latin typeface="Calibri" panose="020F0502020204030204" pitchFamily="34" charset="0"/>
                         </a:rPr>
-                        <a:t>511828,2</a:t>
+                        <a:t>511827,4</a:t>
                       </a:r>
                     </a:p>
                   </a:txBody>
                   <a:tcPr marL="9525" marR="9525" marT="9525" marB="0" anchor="b">
-                    <a:noFill/>
+                    <a:solidFill>
+                      <a:schemeClr val="bg1">
+                        <a:lumMod val="85000"/>
+                      </a:schemeClr>
+                    </a:solidFill>
                   </a:tcPr>
                 </a:tc>
                 <a:tc>
@@ -15080,12 +15102,16 @@
                           <a:effectLst/>
                           <a:latin typeface="Calibri" panose="020F0502020204030204" pitchFamily="34" charset="0"/>
                         </a:rPr>
-                        <a:t>511826,2</a:t>
+                        <a:t>511825,4</a:t>
                       </a:r>
                     </a:p>
                   </a:txBody>
                   <a:tcPr marL="9525" marR="9525" marT="9525" marB="0" anchor="b">
-                    <a:noFill/>
+                    <a:solidFill>
+                      <a:schemeClr val="bg1">
+                        <a:lumMod val="85000"/>
+                      </a:schemeClr>
+                    </a:solidFill>
                   </a:tcPr>
                 </a:tc>
                 <a:tc>
@@ -15095,19 +15121,23 @@
                     <a:p>
                       <a:pPr algn="l" fontAlgn="b"/>
                       <a:r>
-                        <a:rPr lang="de-DE" sz="1100" b="0" i="0" u="none" strike="noStrike" dirty="0">
+                        <a:rPr lang="de-DE" sz="1100" b="0" i="0" u="none" strike="noStrike">
                           <a:solidFill>
                             <a:srgbClr val="000000"/>
                           </a:solidFill>
                           <a:effectLst/>
                           <a:latin typeface="Calibri" panose="020F0502020204030204" pitchFamily="34" charset="0"/>
                         </a:rPr>
-                        <a:t>511854,7</a:t>
+                        <a:t>511853,9</a:t>
                       </a:r>
                     </a:p>
                   </a:txBody>
                   <a:tcPr marL="9525" marR="9525" marT="9525" marB="0" anchor="b">
-                    <a:noFill/>
+                    <a:solidFill>
+                      <a:schemeClr val="bg1">
+                        <a:lumMod val="85000"/>
+                      </a:schemeClr>
+                    </a:solidFill>
                   </a:tcPr>
                 </a:tc>
                 <a:extLst>
@@ -15116,7 +15146,7 @@
                   </a:ext>
                 </a:extLst>
               </a:tr>
-              <a:tr h="202967">
+              <a:tr h="223265">
                 <a:tc>
                   <a:txBody>
                     <a:bodyPr/>
@@ -15170,14 +15200,14 @@
                     <a:p>
                       <a:pPr algn="l" fontAlgn="b"/>
                       <a:r>
-                        <a:rPr lang="de-DE" sz="1100" b="0" i="0" u="none" strike="noStrike">
+                        <a:rPr lang="de-DE" sz="1100" b="0" i="0" u="none" strike="noStrike" dirty="0">
                           <a:solidFill>
                             <a:srgbClr val="000000"/>
                           </a:solidFill>
                           <a:effectLst/>
                           <a:latin typeface="Calibri" panose="020F0502020204030204" pitchFamily="34" charset="0"/>
                         </a:rPr>
-                        <a:t>-255742</a:t>
+                        <a:t>-255740</a:t>
                       </a:r>
                     </a:p>
                   </a:txBody>
@@ -15197,7 +15227,7 @@
                           <a:effectLst/>
                           <a:latin typeface="Calibri" panose="020F0502020204030204" pitchFamily="34" charset="0"/>
                         </a:rPr>
-                        <a:t>511494,2</a:t>
+                        <a:t>511490,8</a:t>
                       </a:r>
                     </a:p>
                   </a:txBody>
@@ -15217,7 +15247,7 @@
                           <a:effectLst/>
                           <a:latin typeface="Calibri" panose="020F0502020204030204" pitchFamily="34" charset="0"/>
                         </a:rPr>
-                        <a:t>511492,2</a:t>
+                        <a:t>511488,8</a:t>
                       </a:r>
                     </a:p>
                   </a:txBody>
@@ -15237,7 +15267,7 @@
                           <a:effectLst/>
                           <a:latin typeface="Calibri" panose="020F0502020204030204" pitchFamily="34" charset="0"/>
                         </a:rPr>
-                        <a:t>511530,2</a:t>
+                        <a:t>511526,9</a:t>
                       </a:r>
                     </a:p>
                   </a:txBody>
@@ -15249,7 +15279,7 @@
                   </a:ext>
                 </a:extLst>
               </a:tr>
-              <a:tr h="202967">
+              <a:tr h="223265">
                 <a:tc>
                   <a:txBody>
                     <a:bodyPr/>
@@ -15310,7 +15340,7 @@
                           <a:effectLst/>
                           <a:latin typeface="Calibri" panose="020F0502020204030204" pitchFamily="34" charset="0"/>
                         </a:rPr>
-                        <a:t>-255596</a:t>
+                        <a:t>-255594</a:t>
                       </a:r>
                     </a:p>
                   </a:txBody>
@@ -15330,7 +15360,7 @@
                           <a:effectLst/>
                           <a:latin typeface="Calibri" panose="020F0502020204030204" pitchFamily="34" charset="0"/>
                         </a:rPr>
-                        <a:t>511204,5</a:t>
+                        <a:t>511200,6</a:t>
                       </a:r>
                     </a:p>
                   </a:txBody>
@@ -15350,7 +15380,7 @@
                           <a:effectLst/>
                           <a:latin typeface="Calibri" panose="020F0502020204030204" pitchFamily="34" charset="0"/>
                         </a:rPr>
-                        <a:t>511202,5</a:t>
+                        <a:t>511198,6</a:t>
                       </a:r>
                     </a:p>
                   </a:txBody>
@@ -15370,7 +15400,7 @@
                           <a:effectLst/>
                           <a:latin typeface="Calibri" panose="020F0502020204030204" pitchFamily="34" charset="0"/>
                         </a:rPr>
-                        <a:t>511250,1</a:t>
+                        <a:t>511246,2</a:t>
                       </a:r>
                     </a:p>
                   </a:txBody>
@@ -15382,7 +15412,7 @@
                   </a:ext>
                 </a:extLst>
               </a:tr>
-              <a:tr h="202967">
+              <a:tr h="223265">
                 <a:tc>
                   <a:txBody>
                     <a:bodyPr/>
@@ -15443,7 +15473,7 @@
                           <a:effectLst/>
                           <a:latin typeface="Calibri" panose="020F0502020204030204" pitchFamily="34" charset="0"/>
                         </a:rPr>
-                        <a:t>-255511</a:t>
+                        <a:t>-255509</a:t>
                       </a:r>
                     </a:p>
                   </a:txBody>
@@ -15463,7 +15493,7 @@
                           <a:effectLst/>
                           <a:latin typeface="Calibri" panose="020F0502020204030204" pitchFamily="34" charset="0"/>
                         </a:rPr>
-                        <a:t>511035,3</a:t>
+                        <a:t>511031,5</a:t>
                       </a:r>
                     </a:p>
                   </a:txBody>
@@ -15483,7 +15513,7 @@
                           <a:effectLst/>
                           <a:latin typeface="Calibri" panose="020F0502020204030204" pitchFamily="34" charset="0"/>
                         </a:rPr>
-                        <a:t>511033,3</a:t>
+                        <a:t>511029,5</a:t>
                       </a:r>
                     </a:p>
                   </a:txBody>
@@ -15503,7 +15533,7 @@
                           <a:effectLst/>
                           <a:latin typeface="Calibri" panose="020F0502020204030204" pitchFamily="34" charset="0"/>
                         </a:rPr>
-                        <a:t>511090,4</a:t>
+                        <a:t>511086,6</a:t>
                       </a:r>
                     </a:p>
                   </a:txBody>
@@ -15515,7 +15545,7 @@
                   </a:ext>
                 </a:extLst>
               </a:tr>
-              <a:tr h="202967">
+              <a:tr h="223265">
                 <a:tc>
                   <a:txBody>
                     <a:bodyPr/>
@@ -15576,7 +15606,7 @@
                           <a:effectLst/>
                           <a:latin typeface="Calibri" panose="020F0502020204030204" pitchFamily="34" charset="0"/>
                         </a:rPr>
-                        <a:t>-255440</a:t>
+                        <a:t>-255438</a:t>
                       </a:r>
                     </a:p>
                   </a:txBody>
@@ -15596,7 +15626,7 @@
                           <a:effectLst/>
                           <a:latin typeface="Calibri" panose="020F0502020204030204" pitchFamily="34" charset="0"/>
                         </a:rPr>
-                        <a:t>510895,6</a:t>
+                        <a:t>510891,4</a:t>
                       </a:r>
                     </a:p>
                   </a:txBody>
@@ -15616,7 +15646,7 @@
                           <a:effectLst/>
                           <a:latin typeface="Calibri" panose="020F0502020204030204" pitchFamily="34" charset="0"/>
                         </a:rPr>
-                        <a:t>510893,6</a:t>
+                        <a:t>510889,4</a:t>
                       </a:r>
                     </a:p>
                   </a:txBody>
@@ -15636,7 +15666,7 @@
                           <a:effectLst/>
                           <a:latin typeface="Calibri" panose="020F0502020204030204" pitchFamily="34" charset="0"/>
                         </a:rPr>
-                        <a:t>510960,2</a:t>
+                        <a:t>510956</a:t>
                       </a:r>
                     </a:p>
                   </a:txBody>
@@ -15648,7 +15678,7 @@
                   </a:ext>
                 </a:extLst>
               </a:tr>
-              <a:tr h="202967">
+              <a:tr h="223265">
                 <a:tc>
                   <a:txBody>
                     <a:bodyPr/>
@@ -15702,14 +15732,14 @@
                     <a:p>
                       <a:pPr algn="l" fontAlgn="b"/>
                       <a:r>
-                        <a:rPr lang="de-DE" sz="1100" b="0" i="0" u="none" strike="noStrike" dirty="0">
+                        <a:rPr lang="de-DE" sz="1100" b="0" i="0" u="none" strike="noStrike">
                           <a:solidFill>
                             <a:srgbClr val="000000"/>
                           </a:solidFill>
                           <a:effectLst/>
                           <a:latin typeface="Calibri" panose="020F0502020204030204" pitchFamily="34" charset="0"/>
                         </a:rPr>
-                        <a:t>-255401</a:t>
+                        <a:t>-255398</a:t>
                       </a:r>
                     </a:p>
                   </a:txBody>
@@ -15729,7 +15759,7 @@
                           <a:effectLst/>
                           <a:latin typeface="Calibri" panose="020F0502020204030204" pitchFamily="34" charset="0"/>
                         </a:rPr>
-                        <a:t>510819,1</a:t>
+                        <a:t>510814,8</a:t>
                       </a:r>
                     </a:p>
                   </a:txBody>
@@ -15749,7 +15779,7 @@
                           <a:effectLst/>
                           <a:latin typeface="Calibri" panose="020F0502020204030204" pitchFamily="34" charset="0"/>
                         </a:rPr>
-                        <a:t>510817,1</a:t>
+                        <a:t>510812,8</a:t>
                       </a:r>
                     </a:p>
                   </a:txBody>
@@ -15769,7 +15799,7 @@
                           <a:effectLst/>
                           <a:latin typeface="Calibri" panose="020F0502020204030204" pitchFamily="34" charset="0"/>
                         </a:rPr>
-                        <a:t>510893,2</a:t>
+                        <a:t>510888,9</a:t>
                       </a:r>
                     </a:p>
                   </a:txBody>
@@ -15781,7 +15811,7 @@
                   </a:ext>
                 </a:extLst>
               </a:tr>
-              <a:tr h="202967">
+              <a:tr h="223265">
                 <a:tc>
                   <a:txBody>
                     <a:bodyPr/>
@@ -15854,7 +15884,7 @@
                           <a:effectLst/>
                           <a:latin typeface="Calibri" panose="020F0502020204030204" pitchFamily="34" charset="0"/>
                         </a:rPr>
-                        <a:t>-255367</a:t>
+                        <a:t>-255366</a:t>
                       </a:r>
                     </a:p>
                   </a:txBody>
@@ -15880,33 +15910,7 @@
                           <a:effectLst/>
                           <a:latin typeface="Calibri" panose="020F0502020204030204" pitchFamily="34" charset="0"/>
                         </a:rPr>
-                        <a:t>510740,3</a:t>
-                      </a:r>
-                    </a:p>
-                  </a:txBody>
-                  <a:tcPr marL="9525" marR="9525" marT="9525" marB="0" anchor="b">
-                    <a:solidFill>
-                      <a:schemeClr val="accent3">
-                        <a:lumMod val="75000"/>
-                      </a:schemeClr>
-                    </a:solidFill>
-                  </a:tcPr>
-                </a:tc>
-                <a:tc>
-                  <a:txBody>
-                    <a:bodyPr/>
-                    <a:lstStyle/>
-                    <a:p>
-                      <a:pPr algn="l" fontAlgn="b"/>
-                      <a:r>
-                        <a:rPr lang="de-DE" sz="1100" b="1" i="0" u="none" strike="noStrike">
-                          <a:solidFill>
-                            <a:srgbClr val="000000"/>
-                          </a:solidFill>
-                          <a:effectLst/>
-                          <a:latin typeface="Calibri" panose="020F0502020204030204" pitchFamily="34" charset="0"/>
-                        </a:rPr>
-                        <a:t>510738,3</a:t>
+                        <a:t>510737,5</a:t>
                       </a:r>
                     </a:p>
                   </a:txBody>
@@ -15932,7 +15936,33 @@
                           <a:effectLst/>
                           <a:latin typeface="Calibri" panose="020F0502020204030204" pitchFamily="34" charset="0"/>
                         </a:rPr>
-                        <a:t>510757,3</a:t>
+                        <a:t>510735,5</a:t>
+                      </a:r>
+                    </a:p>
+                  </a:txBody>
+                  <a:tcPr marL="9525" marR="9525" marT="9525" marB="0" anchor="b">
+                    <a:solidFill>
+                      <a:schemeClr val="accent3">
+                        <a:lumMod val="75000"/>
+                      </a:schemeClr>
+                    </a:solidFill>
+                  </a:tcPr>
+                </a:tc>
+                <a:tc>
+                  <a:txBody>
+                    <a:bodyPr/>
+                    <a:lstStyle/>
+                    <a:p>
+                      <a:pPr algn="l" fontAlgn="b"/>
+                      <a:r>
+                        <a:rPr lang="de-DE" sz="1100" b="1" i="0" u="none" strike="noStrike" dirty="0">
+                          <a:solidFill>
+                            <a:srgbClr val="000000"/>
+                          </a:solidFill>
+                          <a:effectLst/>
+                          <a:latin typeface="Calibri" panose="020F0502020204030204" pitchFamily="34" charset="0"/>
+                        </a:rPr>
+                        <a:t>510754,5</a:t>
                       </a:r>
                     </a:p>
                   </a:txBody>
@@ -16057,7 +16087,7 @@
           </p:nvPr>
         </p:nvPicPr>
         <p:blipFill>
-          <a:blip r:embed="rId4" cstate="print">
+          <a:blip r:embed="rId4">
             <a:extLst>
               <a:ext uri="{28A0092B-C50C-407E-A947-70E740481C1C}">
                 <a14:useLocalDpi xmlns:a14="http://schemas.microsoft.com/office/drawing/2010/main" val="0"/>
@@ -16070,8 +16100,8 @@
         </p:blipFill>
         <p:spPr>
           <a:xfrm>
-            <a:off x="4645026" y="1419225"/>
-            <a:ext cx="4175447" cy="2232025"/>
+            <a:off x="4645026" y="1419226"/>
+            <a:ext cx="4175447" cy="2232644"/>
           </a:xfrm>
         </p:spPr>
       </p:pic>
@@ -16146,44 +16176,219 @@
           </a:p>
         </p:txBody>
       </p:sp>
-      <p:sp>
-        <p:nvSpPr>
-          <p:cNvPr id="10" name="Inhaltsplatzhalter 9"/>
-          <p:cNvSpPr>
-            <a:spLocks noGrp="1"/>
-          </p:cNvSpPr>
-          <p:nvPr>
-            <p:ph sz="quarter" idx="13"/>
-          </p:nvPr>
-        </p:nvSpPr>
-        <p:spPr/>
-        <p:txBody>
-          <a:bodyPr>
-            <a:normAutofit fontScale="92500" lnSpcReduction="10000"/>
-          </a:bodyPr>
-          <a:lstStyle/>
-          <a:p>
-            <a:r>
-              <a:rPr lang="de-DE" dirty="0"/>
-              <a:t>Best fit: GARCH(1,1)</a:t>
-            </a:r>
-          </a:p>
-          <a:p>
-            <a:r>
-              <a:rPr lang="de-DE" dirty="0"/>
-              <a:t>p-Wert Box-Pierce-Test der Residuen: </a:t>
-            </a:r>
-            <a:r>
-              <a:rPr lang="de-DE" b="1" dirty="0"/>
-              <a:t>0.3979</a:t>
-            </a:r>
-            <a:r>
-              <a:rPr lang="de-DE" dirty="0"/>
-              <a:t> </a:t>
-            </a:r>
-          </a:p>
-        </p:txBody>
-      </p:sp>
+      <mc:AlternateContent xmlns:mc="http://schemas.openxmlformats.org/markup-compatibility/2006">
+        <mc:Choice xmlns:a14="http://schemas.microsoft.com/office/drawing/2010/main" Requires="a14">
+          <p:sp>
+            <p:nvSpPr>
+              <p:cNvPr id="10" name="Inhaltsplatzhalter 9"/>
+              <p:cNvSpPr>
+                <a:spLocks noGrp="1"/>
+              </p:cNvSpPr>
+              <p:nvPr>
+                <p:ph sz="quarter" idx="13"/>
+              </p:nvPr>
+            </p:nvSpPr>
+            <p:spPr/>
+            <p:txBody>
+              <a:bodyPr>
+                <a:normAutofit fontScale="92500" lnSpcReduction="10000"/>
+              </a:bodyPr>
+              <a:lstStyle/>
+              <a:p>
+                <a:r>
+                  <a:rPr lang="de-DE" dirty="0" smtClean="0"/>
+                  <a:t>Best fit: GARCH(1,1) mit </a:t>
+                </a:r>
+                <a14:m>
+                  <m:oMath xmlns:m="http://schemas.openxmlformats.org/officeDocument/2006/math">
+                    <m:sSub>
+                      <m:sSubPr>
+                        <m:ctrlPr>
+                          <a:rPr lang="de-DE" i="1">
+                            <a:latin typeface="Cambria Math" panose="02040503050406030204" pitchFamily="18" charset="0"/>
+                          </a:rPr>
+                        </m:ctrlPr>
+                      </m:sSubPr>
+                      <m:e>
+                        <m:r>
+                          <m:rPr>
+                            <m:sty m:val="p"/>
+                          </m:rPr>
+                          <a:rPr lang="el-GR" i="1">
+                            <a:latin typeface="Cambria Math" panose="02040503050406030204" pitchFamily="18" charset="0"/>
+                          </a:rPr>
+                          <m:t>α</m:t>
+                        </m:r>
+                      </m:e>
+                      <m:sub>
+                        <m:r>
+                          <a:rPr lang="de-DE" i="1">
+                            <a:latin typeface="Cambria Math" panose="02040503050406030204" pitchFamily="18" charset="0"/>
+                          </a:rPr>
+                          <m:t>0</m:t>
+                        </m:r>
+                      </m:sub>
+                    </m:sSub>
+                    <m:r>
+                      <a:rPr lang="de-DE" i="1">
+                        <a:latin typeface="Cambria Math" panose="02040503050406030204" pitchFamily="18" charset="0"/>
+                      </a:rPr>
+                      <m:t>=1</m:t>
+                    </m:r>
+                    <m:r>
+                      <a:rPr lang="de-DE" b="0" i="1" smtClean="0">
+                        <a:latin typeface="Cambria Math" panose="02040503050406030204" pitchFamily="18" charset="0"/>
+                      </a:rPr>
+                      <m:t>.00223</m:t>
+                    </m:r>
+                    <m:r>
+                      <a:rPr lang="de-DE" i="1">
+                        <a:latin typeface="Cambria Math" panose="02040503050406030204" pitchFamily="18" charset="0"/>
+                      </a:rPr>
+                      <m:t>,  </m:t>
+                    </m:r>
+                    <m:sSub>
+                      <m:sSubPr>
+                        <m:ctrlPr>
+                          <a:rPr lang="de-DE" i="1">
+                            <a:latin typeface="Cambria Math" panose="02040503050406030204" pitchFamily="18" charset="0"/>
+                          </a:rPr>
+                        </m:ctrlPr>
+                      </m:sSubPr>
+                      <m:e>
+                        <m:r>
+                          <m:rPr>
+                            <m:sty m:val="p"/>
+                          </m:rPr>
+                          <a:rPr lang="el-GR" i="1">
+                            <a:latin typeface="Cambria Math" panose="02040503050406030204" pitchFamily="18" charset="0"/>
+                          </a:rPr>
+                          <m:t>α</m:t>
+                        </m:r>
+                      </m:e>
+                      <m:sub>
+                        <m:r>
+                          <a:rPr lang="de-DE" i="1">
+                            <a:latin typeface="Cambria Math" panose="02040503050406030204" pitchFamily="18" charset="0"/>
+                          </a:rPr>
+                          <m:t>1</m:t>
+                        </m:r>
+                      </m:sub>
+                    </m:sSub>
+                    <m:r>
+                      <a:rPr lang="de-DE" i="1">
+                        <a:latin typeface="Cambria Math" panose="02040503050406030204" pitchFamily="18" charset="0"/>
+                      </a:rPr>
+                      <m:t>=0.</m:t>
+                    </m:r>
+                    <m:r>
+                      <a:rPr lang="de-DE" b="0" i="0" smtClean="0">
+                        <a:latin typeface="Cambria Math" panose="02040503050406030204" pitchFamily="18" charset="0"/>
+                      </a:rPr>
+                      <m:t>09778</m:t>
+                    </m:r>
+                    <m:r>
+                      <a:rPr lang="de-DE">
+                        <a:latin typeface="Cambria Math" panose="02040503050406030204" pitchFamily="18" charset="0"/>
+                      </a:rPr>
+                      <m:t>,  </m:t>
+                    </m:r>
+                    <m:sSub>
+                      <m:sSubPr>
+                        <m:ctrlPr>
+                          <a:rPr lang="de-DE" i="1">
+                            <a:latin typeface="Cambria Math" panose="02040503050406030204" pitchFamily="18" charset="0"/>
+                          </a:rPr>
+                        </m:ctrlPr>
+                      </m:sSubPr>
+                      <m:e>
+                        <m:r>
+                          <m:rPr>
+                            <m:sty m:val="p"/>
+                          </m:rPr>
+                          <a:rPr lang="el-GR" i="1">
+                            <a:latin typeface="Cambria Math" panose="02040503050406030204" pitchFamily="18" charset="0"/>
+                          </a:rPr>
+                          <m:t>β</m:t>
+                        </m:r>
+                      </m:e>
+                      <m:sub>
+                        <m:r>
+                          <a:rPr lang="de-DE" i="1">
+                            <a:latin typeface="Cambria Math" panose="02040503050406030204" pitchFamily="18" charset="0"/>
+                          </a:rPr>
+                          <m:t>1</m:t>
+                        </m:r>
+                      </m:sub>
+                    </m:sSub>
+                    <m:r>
+                      <a:rPr lang="de-DE" i="1">
+                        <a:latin typeface="Cambria Math" panose="02040503050406030204" pitchFamily="18" charset="0"/>
+                      </a:rPr>
+                      <m:t>=0.</m:t>
+                    </m:r>
+                    <m:r>
+                      <a:rPr lang="de-DE" b="0" i="1" smtClean="0">
+                        <a:latin typeface="Cambria Math" panose="02040503050406030204" pitchFamily="18" charset="0"/>
+                      </a:rPr>
+                      <m:t>80298</m:t>
+                    </m:r>
+                  </m:oMath>
+                </a14:m>
+                <a:endParaRPr lang="de-DE" dirty="0"/>
+              </a:p>
+              <a:p>
+                <a:r>
+                  <a:rPr lang="de-DE" dirty="0"/>
+                  <a:t>p-Wert Box-Pierce-Test der Residuen: </a:t>
+                </a:r>
+                <a:r>
+                  <a:rPr lang="de-DE" b="1" dirty="0" smtClean="0"/>
+                  <a:t>0.3953</a:t>
+                </a:r>
+                <a:r>
+                  <a:rPr lang="de-DE" dirty="0" smtClean="0"/>
+                  <a:t> </a:t>
+                </a:r>
+                <a:endParaRPr lang="de-DE" dirty="0"/>
+              </a:p>
+            </p:txBody>
+          </p:sp>
+        </mc:Choice>
+        <mc:Fallback>
+          <p:sp>
+            <p:nvSpPr>
+              <p:cNvPr id="10" name="Inhaltsplatzhalter 9"/>
+              <p:cNvSpPr>
+                <a:spLocks noGrp="1" noRot="1" noChangeAspect="1" noMove="1" noResize="1" noEditPoints="1" noAdjustHandles="1" noChangeArrowheads="1" noChangeShapeType="1" noTextEdit="1"/>
+              </p:cNvSpPr>
+              <p:nvPr>
+                <p:ph sz="quarter" idx="13"/>
+              </p:nvPr>
+            </p:nvSpPr>
+            <p:spPr>
+              <a:blipFill>
+                <a:blip r:embed="rId5"/>
+                <a:stretch>
+                  <a:fillRect t="-4167" b="-6250"/>
+                </a:stretch>
+              </a:blipFill>
+            </p:spPr>
+            <p:txBody>
+              <a:bodyPr/>
+              <a:lstStyle/>
+              <a:p>
+                <a:r>
+                  <a:rPr lang="de-DE">
+                    <a:noFill/>
+                  </a:rPr>
+                  <a:t> </a:t>
+                </a:r>
+              </a:p>
+            </p:txBody>
+          </p:sp>
+        </mc:Fallback>
+      </mc:AlternateContent>
     </p:spTree>
     <p:extLst>
       <p:ext uri="{BB962C8B-B14F-4D97-AF65-F5344CB8AC3E}">
@@ -19016,9 +19221,51 @@
           <a:lstStyle/>
           <a:p>
             <a:r>
+              <a:rPr lang="de-DE" dirty="0" smtClean="0"/>
+              <a:t>ARCH &amp; GARCH-Prozesse wichtig bei der Modellierung von Prozessen mit Volatilitätsschwankungen</a:t>
+            </a:r>
+          </a:p>
+          <a:p>
+            <a:r>
+              <a:rPr lang="de-DE" dirty="0" smtClean="0"/>
+              <a:t>ARCH-Prozesse identifizierbar anhand der PACF der quadrierten Daten (AR-Modell)</a:t>
+            </a:r>
+          </a:p>
+          <a:p>
+            <a:r>
+              <a:rPr lang="de-DE" dirty="0" smtClean="0"/>
+              <a:t>Identifizierung von GARCH-Prozessen schwierig (Verwechselbarkeit mit ARCH-Prozessen hohen Grades)</a:t>
+            </a:r>
+          </a:p>
+          <a:p>
+            <a:r>
+              <a:rPr lang="de-DE" dirty="0" smtClean="0"/>
+              <a:t>BIC als Kriterium für Model </a:t>
+            </a:r>
+            <a:r>
+              <a:rPr lang="de-DE" dirty="0" err="1" smtClean="0"/>
+              <a:t>Selection</a:t>
+            </a:r>
+            <a:r>
+              <a:rPr lang="de-DE" dirty="0" smtClean="0"/>
+              <a:t> für große N zur Auswahl des korrekten Modells sinnvoll (asymptotisch konsistent)</a:t>
+            </a:r>
+            <a:endParaRPr lang="de-DE" dirty="0" smtClean="0"/>
+          </a:p>
+          <a:p>
+            <a:r>
+              <a:rPr lang="de-DE" dirty="0" smtClean="0"/>
+              <a:t>GARCH-Modellierung zur Vorhersage von </a:t>
+            </a:r>
+            <a:r>
               <a:rPr lang="de-DE" dirty="0"/>
-              <a:t>TODO Resümee</a:t>
-            </a:r>
+              <a:t>Volatilitätsschwankungen</a:t>
+            </a:r>
+            <a:r>
+              <a:rPr lang="de-DE" dirty="0" smtClean="0"/>
+              <a:t> bei Zeitreihen im Finanzbereich </a:t>
+            </a:r>
+            <a:endParaRPr lang="de-DE" dirty="0"/>
           </a:p>
         </p:txBody>
       </p:sp>
@@ -19216,6 +19463,17 @@
             <a:r>
               <a:rPr lang="de-DE" dirty="0"/>
               <a:t>, O., Schlegel, A.:</a:t>
+            </a:r>
+            <a:r>
+              <a:rPr lang="de-DE" sz="1400" dirty="0">
+                <a:solidFill>
+                  <a:schemeClr val="tx1">
+                    <a:lumMod val="75000"/>
+                    <a:lumOff val="25000"/>
+                  </a:schemeClr>
+                </a:solidFill>
+              </a:rPr>
+              <a:t/>
             </a:r>
             <a:br>
               <a:rPr lang="de-DE" sz="1400" dirty="0">
@@ -20229,6 +20487,14 @@
   <p:clrMapOvr>
     <a:masterClrMapping/>
   </p:clrMapOvr>
+  <mc:AlternateContent xmlns:mc="http://schemas.openxmlformats.org/markup-compatibility/2006">
+    <mc:Choice xmlns:p14="http://schemas.microsoft.com/office/powerpoint/2010/main" Requires="p14">
+      <p:transition spd="slow" p14:dur="2000"/>
+    </mc:Choice>
+    <mc:Fallback>
+      <p:transition spd="slow"/>
+    </mc:Fallback>
+  </mc:AlternateContent>
 </p:sld>
 </file>
 
@@ -21700,13 +21966,22 @@
               <a:t> </a:t>
             </a:r>
             <a:r>
-              <a:rPr lang="de-DE" sz="1400" dirty="0" err="1"/>
+              <a:rPr lang="de-DE" sz="1400" dirty="0" err="1" smtClean="0"/>
               <a:t>highest</a:t>
             </a:r>
             <a:r>
               <a:rPr lang="de-DE" sz="1400" dirty="0"/>
-              <a:t> AIC</a:t>
-            </a:r>
+              <a:t> </a:t>
+            </a:r>
+            <a:r>
+              <a:rPr lang="de-DE" sz="1400" dirty="0"/>
+              <a:t>B</a:t>
+            </a:r>
+            <a:r>
+              <a:rPr lang="de-DE" sz="1400" dirty="0" smtClean="0"/>
+              <a:t>IC</a:t>
+            </a:r>
+            <a:endParaRPr lang="de-DE" sz="1400" dirty="0"/>
           </a:p>
           <a:p>
             <a:endParaRPr lang="de-DE" dirty="0"/>
@@ -22053,8 +22328,8 @@
           </a:p>
         </p:txBody>
       </p:sp>
-      <mc:AlternateContent xmlns:mc="http://schemas.openxmlformats.org/markup-compatibility/2006" xmlns:a14="http://schemas.microsoft.com/office/drawing/2010/main">
-        <mc:Choice Requires="a14">
+      <mc:AlternateContent xmlns:mc="http://schemas.openxmlformats.org/markup-compatibility/2006">
+        <mc:Choice xmlns:a14="http://schemas.microsoft.com/office/drawing/2010/main" Requires="a14">
           <p:sp>
             <p:nvSpPr>
               <p:cNvPr id="3" name="Inhaltsplatzhalter 2"/>
@@ -22831,7 +23106,19 @@
                   <a:rPr lang="de-DE" dirty="0">
                     <a:sym typeface="Wingdings" panose="05000000000000000000" pitchFamily="2" charset="2"/>
                   </a:rPr>
-                  <a:t>Benutztes Kriterium: Kleinster AIC Wert  Best fit</a:t>
+                  <a:t>Benutztes Kriterium: Kleinster </a:t>
+                </a:r>
+                <a:r>
+                  <a:rPr lang="de-DE" dirty="0" smtClean="0">
+                    <a:sym typeface="Wingdings" panose="05000000000000000000" pitchFamily="2" charset="2"/>
+                  </a:rPr>
+                  <a:t>BIC Wert (asymptotisch konsistent) </a:t>
+                </a:r>
+                <a:r>
+                  <a:rPr lang="de-DE" dirty="0">
+                    <a:sym typeface="Wingdings" panose="05000000000000000000" pitchFamily="2" charset="2"/>
+                  </a:rPr>
+                  <a:t> Best fit</a:t>
                 </a:r>
                 <a:endParaRPr lang="de-DE" b="0" dirty="0">
                   <a:sym typeface="Wingdings" panose="05000000000000000000" pitchFamily="2" charset="2"/>
@@ -22911,7 +23198,7 @@
             </p:txBody>
           </p:sp>
         </mc:Choice>
-        <mc:Fallback xmlns="">
+        <mc:Fallback>
           <p:sp>
             <p:nvSpPr>
               <p:cNvPr id="3" name="Inhaltsplatzhalter 2"/>

</xml_diff>

<commit_message>
Update presentation_final regarding the dax index part
</commit_message>
<xml_diff>
--- a/presentation/tsa_presentation_final.pptx
+++ b/presentation/tsa_presentation_final.pptx
@@ -5,10 +5,10 @@
     <p:sldMasterId id="2147483658" r:id="rId1"/>
   </p:sldMasterIdLst>
   <p:notesMasterIdLst>
-    <p:notesMasterId r:id="rId26"/>
+    <p:notesMasterId r:id="rId25"/>
   </p:notesMasterIdLst>
   <p:handoutMasterIdLst>
-    <p:handoutMasterId r:id="rId27"/>
+    <p:handoutMasterId r:id="rId26"/>
   </p:handoutMasterIdLst>
   <p:sldIdLst>
     <p:sldId id="290" r:id="rId2"/>
@@ -24,17 +24,16 @@
     <p:sldId id="327" r:id="rId12"/>
     <p:sldId id="328" r:id="rId13"/>
     <p:sldId id="329" r:id="rId14"/>
-    <p:sldId id="332" r:id="rId15"/>
-    <p:sldId id="331" r:id="rId16"/>
-    <p:sldId id="334" r:id="rId17"/>
-    <p:sldId id="335" r:id="rId18"/>
-    <p:sldId id="336" r:id="rId19"/>
-    <p:sldId id="337" r:id="rId20"/>
-    <p:sldId id="338" r:id="rId21"/>
-    <p:sldId id="340" r:id="rId22"/>
-    <p:sldId id="304" r:id="rId23"/>
-    <p:sldId id="323" r:id="rId24"/>
-    <p:sldId id="301" r:id="rId25"/>
+    <p:sldId id="341" r:id="rId15"/>
+    <p:sldId id="342" r:id="rId16"/>
+    <p:sldId id="343" r:id="rId17"/>
+    <p:sldId id="344" r:id="rId18"/>
+    <p:sldId id="345" r:id="rId19"/>
+    <p:sldId id="346" r:id="rId20"/>
+    <p:sldId id="347" r:id="rId21"/>
+    <p:sldId id="304" r:id="rId22"/>
+    <p:sldId id="323" r:id="rId23"/>
+    <p:sldId id="301" r:id="rId24"/>
   </p:sldIdLst>
   <p:sldSz cx="9144000" cy="5143500" type="screen16x9"/>
   <p:notesSz cx="6858000" cy="9144000"/>
@@ -249,7 +248,7 @@
             <a:fld id="{8A7CD7E6-D14C-4ECF-BE72-9282675AAFCC}" type="datetimeFigureOut">
               <a:rPr lang="de-DE" smtClean="0"/>
               <a:pPr/>
-              <a:t>05.08.2018</a:t>
+              <a:t>05.08.18</a:t>
             </a:fld>
             <a:endParaRPr lang="de-DE"/>
           </a:p>
@@ -316,7 +315,7 @@
             <a:fld id="{7119B856-22C7-4D3D-8424-185753AB3E24}" type="slidenum">
               <a:rPr lang="de-DE" smtClean="0"/>
               <a:pPr/>
-              <a:t>‹Nr.›</a:t>
+              <a:t>‹#›</a:t>
             </a:fld>
             <a:endParaRPr lang="de-DE"/>
           </a:p>
@@ -416,7 +415,7 @@
             <a:fld id="{9DEF7BA6-6945-4979-A31E-1F3FA0D91DC4}" type="datetimeFigureOut">
               <a:rPr lang="de-DE" smtClean="0"/>
               <a:pPr/>
-              <a:t>05.08.2018</a:t>
+              <a:t>05.08.18</a:t>
             </a:fld>
             <a:endParaRPr lang="de-DE"/>
           </a:p>
@@ -577,7 +576,7 @@
             <a:fld id="{6706D1AF-4C0D-4753-9D96-DDC1A4BC5412}" type="slidenum">
               <a:rPr lang="de-DE" smtClean="0"/>
               <a:pPr/>
-              <a:t>‹Nr.›</a:t>
+              <a:t>‹#›</a:t>
             </a:fld>
             <a:endParaRPr lang="de-DE"/>
           </a:p>
@@ -792,7 +791,7 @@
       </p:grpSpPr>
       <p:sp>
         <p:nvSpPr>
-          <p:cNvPr id="2" name="Folienbildplatzhalter 1"/>
+          <p:cNvPr id="2" name="Slide Image Placeholder 1"/>
           <p:cNvSpPr>
             <a:spLocks noGrp="1" noRot="1" noChangeAspect="1"/>
           </p:cNvSpPr>
@@ -804,7 +803,7 @@
       </p:sp>
       <p:sp>
         <p:nvSpPr>
-          <p:cNvPr id="3" name="Notizenplatzhalter 2"/>
+          <p:cNvPr id="3" name="Notes Placeholder 2"/>
           <p:cNvSpPr>
             <a:spLocks noGrp="1"/>
           </p:cNvSpPr>
@@ -823,7 +822,7 @@
       </p:sp>
       <p:sp>
         <p:nvSpPr>
-          <p:cNvPr id="4" name="Foliennummernplatzhalter 3"/>
+          <p:cNvPr id="4" name="Slide Number Placeholder 3"/>
           <p:cNvSpPr>
             <a:spLocks noGrp="1"/>
           </p:cNvSpPr>
@@ -839,7 +838,92 @@
             <a:fld id="{6706D1AF-4C0D-4753-9D96-DDC1A4BC5412}" type="slidenum">
               <a:rPr lang="de-DE" smtClean="0"/>
               <a:pPr/>
-              <a:t>22</a:t>
+              <a:t>20</a:t>
+            </a:fld>
+            <a:endParaRPr lang="de-DE"/>
+          </a:p>
+        </p:txBody>
+      </p:sp>
+    </p:spTree>
+    <p:extLst>
+      <p:ext uri="{BB962C8B-B14F-4D97-AF65-F5344CB8AC3E}">
+        <p14:creationId xmlns:p14="http://schemas.microsoft.com/office/powerpoint/2010/main" val="907930197"/>
+      </p:ext>
+    </p:extLst>
+  </p:cSld>
+  <p:clrMapOvr>
+    <a:masterClrMapping/>
+  </p:clrMapOvr>
+</p:notes>
+</file>
+
+<file path=ppt/notesSlides/notesSlide11.xml><?xml version="1.0" encoding="utf-8"?>
+<p:notes xmlns:a="http://schemas.openxmlformats.org/drawingml/2006/main" xmlns:r="http://schemas.openxmlformats.org/officeDocument/2006/relationships" xmlns:p="http://schemas.openxmlformats.org/presentationml/2006/main">
+  <p:cSld>
+    <p:spTree>
+      <p:nvGrpSpPr>
+        <p:cNvPr id="1" name=""/>
+        <p:cNvGrpSpPr/>
+        <p:nvPr/>
+      </p:nvGrpSpPr>
+      <p:grpSpPr>
+        <a:xfrm>
+          <a:off x="0" y="0"/>
+          <a:ext cx="0" cy="0"/>
+          <a:chOff x="0" y="0"/>
+          <a:chExt cx="0" cy="0"/>
+        </a:xfrm>
+      </p:grpSpPr>
+      <p:sp>
+        <p:nvSpPr>
+          <p:cNvPr id="2" name="Folienbildplatzhalter 1"/>
+          <p:cNvSpPr>
+            <a:spLocks noGrp="1" noRot="1" noChangeAspect="1"/>
+          </p:cNvSpPr>
+          <p:nvPr>
+            <p:ph type="sldImg"/>
+          </p:nvPr>
+        </p:nvSpPr>
+        <p:spPr/>
+      </p:sp>
+      <p:sp>
+        <p:nvSpPr>
+          <p:cNvPr id="3" name="Notizenplatzhalter 2"/>
+          <p:cNvSpPr>
+            <a:spLocks noGrp="1"/>
+          </p:cNvSpPr>
+          <p:nvPr>
+            <p:ph type="body" idx="1"/>
+          </p:nvPr>
+        </p:nvSpPr>
+        <p:spPr/>
+        <p:txBody>
+          <a:bodyPr/>
+          <a:lstStyle/>
+          <a:p>
+            <a:endParaRPr lang="de-DE" dirty="0"/>
+          </a:p>
+        </p:txBody>
+      </p:sp>
+      <p:sp>
+        <p:nvSpPr>
+          <p:cNvPr id="4" name="Foliennummernplatzhalter 3"/>
+          <p:cNvSpPr>
+            <a:spLocks noGrp="1"/>
+          </p:cNvSpPr>
+          <p:nvPr>
+            <p:ph type="sldNum" sz="quarter" idx="10"/>
+          </p:nvPr>
+        </p:nvSpPr>
+        <p:spPr/>
+        <p:txBody>
+          <a:bodyPr/>
+          <a:lstStyle/>
+          <a:p>
+            <a:fld id="{6706D1AF-4C0D-4753-9D96-DDC1A4BC5412}" type="slidenum">
+              <a:rPr lang="de-DE" smtClean="0"/>
+              <a:pPr/>
+              <a:t>21</a:t>
             </a:fld>
             <a:endParaRPr lang="de-DE"/>
           </a:p>
@@ -1322,12 +1406,8 @@
           <a:lstStyle/>
           <a:p>
             <a:r>
-              <a:rPr lang="de-DE" dirty="0" smtClean="0"/>
-              <a:t>Zu </a:t>
-            </a:r>
-            <a:r>
               <a:rPr lang="de-DE" dirty="0"/>
-              <a:t>GARCH(1,1):</a:t>
+              <a:t>Zu GARCH(1,1):</a:t>
             </a:r>
             <a:r>
               <a:rPr lang="de-DE" baseline="0" dirty="0"/>
@@ -2611,7 +2691,7 @@
     </p:spTree>
     <p:extLst>
       <p:ext uri="{BB962C8B-B14F-4D97-AF65-F5344CB8AC3E}">
-        <p14:creationId xmlns:p14="http://schemas.microsoft.com/office/powerpoint/2010/main" val="456308351"/>
+        <p14:creationId xmlns:p14="http://schemas.microsoft.com/office/powerpoint/2010/main" val="1535560334"/>
       </p:ext>
     </p:extLst>
   </p:cSld>
@@ -2696,7 +2776,7 @@
     </p:spTree>
     <p:extLst>
       <p:ext uri="{BB962C8B-B14F-4D97-AF65-F5344CB8AC3E}">
-        <p14:creationId xmlns:p14="http://schemas.microsoft.com/office/powerpoint/2010/main" val="3478881884"/>
+        <p14:creationId xmlns:p14="http://schemas.microsoft.com/office/powerpoint/2010/main" val="459565419"/>
       </p:ext>
     </p:extLst>
   </p:cSld>
@@ -3106,7 +3186,7 @@
             <a:fld id="{C6F490E5-6BD8-4297-ACA2-2AC87192B70F}" type="datetime1">
               <a:rPr lang="de-DE" smtClean="0"/>
               <a:pPr/>
-              <a:t>05.08.2018</a:t>
+              <a:t>05.08.18</a:t>
             </a:fld>
             <a:endParaRPr lang="de-DE"/>
           </a:p>
@@ -3130,7 +3210,7 @@
             <a:fld id="{015363AA-F6CB-4A58-B5AD-B2CDFEAF0813}" type="slidenum">
               <a:rPr lang="de-DE" smtClean="0"/>
               <a:pPr/>
-              <a:t>‹Nr.›</a:t>
+              <a:t>‹#›</a:t>
             </a:fld>
             <a:endParaRPr lang="de-DE"/>
           </a:p>
@@ -3406,7 +3486,7 @@
             <a:fld id="{18321833-73FA-4B7B-8368-585F78905B8E}" type="datetime1">
               <a:rPr lang="de-DE" smtClean="0"/>
               <a:pPr/>
-              <a:t>05.08.2018</a:t>
+              <a:t>05.08.18</a:t>
             </a:fld>
             <a:endParaRPr lang="de-DE"/>
           </a:p>
@@ -3452,7 +3532,7 @@
             <a:fld id="{015363AA-F6CB-4A58-B5AD-B2CDFEAF0813}" type="slidenum">
               <a:rPr lang="de-DE" smtClean="0"/>
               <a:pPr/>
-              <a:t>‹Nr.›</a:t>
+              <a:t>‹#›</a:t>
             </a:fld>
             <a:endParaRPr lang="de-DE"/>
           </a:p>
@@ -3523,7 +3603,7 @@
             <a:fld id="{3E1C52E8-7F49-4B86-AEB2-23BC7104D5B2}" type="datetime1">
               <a:rPr lang="de-DE" smtClean="0"/>
               <a:pPr/>
-              <a:t>05.08.2018</a:t>
+              <a:t>05.08.18</a:t>
             </a:fld>
             <a:endParaRPr lang="de-DE"/>
           </a:p>
@@ -3569,7 +3649,7 @@
             <a:fld id="{015363AA-F6CB-4A58-B5AD-B2CDFEAF0813}" type="slidenum">
               <a:rPr lang="de-DE" smtClean="0"/>
               <a:pPr/>
-              <a:t>‹Nr.›</a:t>
+              <a:t>‹#›</a:t>
             </a:fld>
             <a:endParaRPr lang="de-DE"/>
           </a:p>
@@ -3787,7 +3867,7 @@
             <a:fld id="{3E1C52E8-7F49-4B86-AEB2-23BC7104D5B2}" type="datetime1">
               <a:rPr lang="de-DE" smtClean="0"/>
               <a:pPr/>
-              <a:t>05.08.2018</a:t>
+              <a:t>05.08.18</a:t>
             </a:fld>
             <a:endParaRPr lang="de-DE"/>
           </a:p>
@@ -3833,7 +3913,7 @@
             <a:fld id="{015363AA-F6CB-4A58-B5AD-B2CDFEAF0813}" type="slidenum">
               <a:rPr lang="de-DE" smtClean="0"/>
               <a:pPr/>
-              <a:t>‹Nr.›</a:t>
+              <a:t>‹#›</a:t>
             </a:fld>
             <a:endParaRPr lang="de-DE"/>
           </a:p>
@@ -4489,7 +4569,7 @@
             <a:fld id="{DA5DE712-6C0E-4DF7-B336-AC97213DC93D}" type="datetime1">
               <a:rPr lang="de-DE" smtClean="0"/>
               <a:pPr/>
-              <a:t>05.08.2018</a:t>
+              <a:t>05.08.18</a:t>
             </a:fld>
             <a:endParaRPr lang="de-DE"/>
           </a:p>
@@ -4535,7 +4615,7 @@
             <a:fld id="{015363AA-F6CB-4A58-B5AD-B2CDFEAF0813}" type="slidenum">
               <a:rPr lang="de-DE" smtClean="0"/>
               <a:pPr/>
-              <a:t>‹Nr.›</a:t>
+              <a:t>‹#›</a:t>
             </a:fld>
             <a:endParaRPr lang="de-DE"/>
           </a:p>
@@ -5052,7 +5132,7 @@
             <a:fld id="{DA5DE712-6C0E-4DF7-B336-AC97213DC93D}" type="datetime1">
               <a:rPr lang="de-DE" smtClean="0"/>
               <a:pPr/>
-              <a:t>05.08.2018</a:t>
+              <a:t>05.08.18</a:t>
             </a:fld>
             <a:endParaRPr lang="de-DE"/>
           </a:p>
@@ -5098,7 +5178,7 @@
             <a:fld id="{015363AA-F6CB-4A58-B5AD-B2CDFEAF0813}" type="slidenum">
               <a:rPr lang="de-DE" smtClean="0"/>
               <a:pPr/>
-              <a:t>‹Nr.›</a:t>
+              <a:t>‹#›</a:t>
             </a:fld>
             <a:endParaRPr lang="de-DE"/>
           </a:p>
@@ -5355,7 +5435,7 @@
             <a:fld id="{19A0FC43-5E73-44C2-BFDB-9FAD1E8FED0E}" type="datetime1">
               <a:rPr lang="de-DE" smtClean="0"/>
               <a:pPr/>
-              <a:t>05.08.2018</a:t>
+              <a:t>05.08.18</a:t>
             </a:fld>
             <a:endParaRPr lang="de-DE"/>
           </a:p>
@@ -5401,7 +5481,7 @@
             <a:fld id="{015363AA-F6CB-4A58-B5AD-B2CDFEAF0813}" type="slidenum">
               <a:rPr lang="de-DE" smtClean="0"/>
               <a:pPr/>
-              <a:t>‹Nr.›</a:t>
+              <a:t>‹#›</a:t>
             </a:fld>
             <a:endParaRPr lang="de-DE"/>
           </a:p>
@@ -5632,7 +5712,7 @@
             <a:fld id="{065E8A4D-8D16-457C-AFD8-844AF28C1B14}" type="datetime1">
               <a:rPr lang="de-DE" smtClean="0"/>
               <a:pPr/>
-              <a:t>05.08.2018</a:t>
+              <a:t>05.08.18</a:t>
             </a:fld>
             <a:endParaRPr lang="de-DE"/>
           </a:p>
@@ -5678,7 +5758,7 @@
             <a:fld id="{015363AA-F6CB-4A58-B5AD-B2CDFEAF0813}" type="slidenum">
               <a:rPr lang="de-DE" smtClean="0"/>
               <a:pPr/>
-              <a:t>‹Nr.›</a:t>
+              <a:t>‹#›</a:t>
             </a:fld>
             <a:endParaRPr lang="de-DE"/>
           </a:p>
@@ -5834,7 +5914,7 @@
             <a:fld id="{6DB845E5-DACF-426C-8A10-A6438D29DD66}" type="datetime1">
               <a:rPr lang="de-DE" smtClean="0"/>
               <a:pPr/>
-              <a:t>05.08.2018</a:t>
+              <a:t>05.08.18</a:t>
             </a:fld>
             <a:endParaRPr lang="de-DE"/>
           </a:p>
@@ -5880,7 +5960,7 @@
             <a:fld id="{015363AA-F6CB-4A58-B5AD-B2CDFEAF0813}" type="slidenum">
               <a:rPr lang="de-DE" smtClean="0"/>
               <a:pPr/>
-              <a:t>‹Nr.›</a:t>
+              <a:t>‹#›</a:t>
             </a:fld>
             <a:endParaRPr lang="de-DE"/>
           </a:p>
@@ -6139,7 +6219,7 @@
             <a:fld id="{CA605C2C-549A-4615-A3C1-D5E9E9947B76}" type="datetime1">
               <a:rPr lang="de-DE" smtClean="0"/>
               <a:pPr/>
-              <a:t>05.08.2018</a:t>
+              <a:t>05.08.18</a:t>
             </a:fld>
             <a:endParaRPr lang="de-DE"/>
           </a:p>
@@ -6185,7 +6265,7 @@
             <a:fld id="{015363AA-F6CB-4A58-B5AD-B2CDFEAF0813}" type="slidenum">
               <a:rPr lang="de-DE" smtClean="0"/>
               <a:pPr/>
-              <a:t>‹Nr.›</a:t>
+              <a:t>‹#›</a:t>
             </a:fld>
             <a:endParaRPr lang="de-DE"/>
           </a:p>
@@ -6610,7 +6690,7 @@
             <a:fld id="{DA5DE712-6C0E-4DF7-B336-AC97213DC93D}" type="datetime1">
               <a:rPr lang="de-DE" smtClean="0"/>
               <a:pPr/>
-              <a:t>05.08.2018</a:t>
+              <a:t>05.08.18</a:t>
             </a:fld>
             <a:endParaRPr lang="de-DE"/>
           </a:p>
@@ -6656,7 +6736,7 @@
             <a:fld id="{015363AA-F6CB-4A58-B5AD-B2CDFEAF0813}" type="slidenum">
               <a:rPr lang="de-DE" smtClean="0"/>
               <a:pPr/>
-              <a:t>‹Nr.›</a:t>
+              <a:t>‹#›</a:t>
             </a:fld>
             <a:endParaRPr lang="de-DE"/>
           </a:p>
@@ -7081,7 +7161,7 @@
             <a:fld id="{DA5DE712-6C0E-4DF7-B336-AC97213DC93D}" type="datetime1">
               <a:rPr lang="de-DE" smtClean="0"/>
               <a:pPr/>
-              <a:t>05.08.2018</a:t>
+              <a:t>05.08.18</a:t>
             </a:fld>
             <a:endParaRPr lang="de-DE"/>
           </a:p>
@@ -7127,7 +7207,7 @@
             <a:fld id="{015363AA-F6CB-4A58-B5AD-B2CDFEAF0813}" type="slidenum">
               <a:rPr lang="de-DE" smtClean="0"/>
               <a:pPr/>
-              <a:t>‹Nr.›</a:t>
+              <a:t>‹#›</a:t>
             </a:fld>
             <a:endParaRPr lang="de-DE"/>
           </a:p>
@@ -7352,7 +7432,7 @@
             <a:fld id="{12CE0ACD-0B71-463F-9507-4095300257BC}" type="datetime1">
               <a:rPr lang="de-DE" smtClean="0"/>
               <a:pPr/>
-              <a:t>05.08.2018</a:t>
+              <a:t>05.08.18</a:t>
             </a:fld>
             <a:endParaRPr lang="de-DE"/>
           </a:p>
@@ -7398,7 +7478,7 @@
             <a:fld id="{015363AA-F6CB-4A58-B5AD-B2CDFEAF0813}" type="slidenum">
               <a:rPr lang="de-DE" smtClean="0"/>
               <a:pPr/>
-              <a:t>‹Nr.›</a:t>
+              <a:t>‹#›</a:t>
             </a:fld>
             <a:endParaRPr lang="de-DE"/>
           </a:p>
@@ -7495,7 +7575,7 @@
             <a:fld id="{89026A34-A4A3-4CC2-B452-9E4A0F73B38C}" type="datetime1">
               <a:rPr lang="de-DE" smtClean="0"/>
               <a:pPr/>
-              <a:t>05.08.2018</a:t>
+              <a:t>05.08.18</a:t>
             </a:fld>
             <a:endParaRPr lang="de-DE"/>
           </a:p>
@@ -7541,7 +7621,7 @@
             <a:fld id="{015363AA-F6CB-4A58-B5AD-B2CDFEAF0813}" type="slidenum">
               <a:rPr lang="de-DE" smtClean="0"/>
               <a:pPr/>
-              <a:t>‹Nr.›</a:t>
+              <a:t>‹#›</a:t>
             </a:fld>
             <a:endParaRPr lang="de-DE"/>
           </a:p>
@@ -7773,7 +7853,7 @@
             <a:fld id="{D509922F-D4D2-4984-9115-CE10B66F29DF}" type="datetime1">
               <a:rPr lang="de-DE" smtClean="0"/>
               <a:pPr/>
-              <a:t>05.08.2018</a:t>
+              <a:t>05.08.18</a:t>
             </a:fld>
             <a:endParaRPr lang="de-DE"/>
           </a:p>
@@ -7819,7 +7899,7 @@
             <a:fld id="{015363AA-F6CB-4A58-B5AD-B2CDFEAF0813}" type="slidenum">
               <a:rPr lang="de-DE" smtClean="0"/>
               <a:pPr/>
-              <a:t>‹Nr.›</a:t>
+              <a:t>‹#›</a:t>
             </a:fld>
             <a:endParaRPr lang="de-DE"/>
           </a:p>
@@ -8091,7 +8171,7 @@
             <a:fld id="{9624F9CC-0A0D-4C8D-81F7-82F64A12AE8F}" type="datetime1">
               <a:rPr lang="de-DE" smtClean="0"/>
               <a:pPr/>
-              <a:t>05.08.2018</a:t>
+              <a:t>05.08.18</a:t>
             </a:fld>
             <a:endParaRPr lang="de-DE"/>
           </a:p>
@@ -8179,7 +8259,7 @@
             <a:fld id="{015363AA-F6CB-4A58-B5AD-B2CDFEAF0813}" type="slidenum">
               <a:rPr lang="de-DE" smtClean="0"/>
               <a:pPr/>
-              <a:t>‹Nr.›</a:t>
+              <a:t>‹#›</a:t>
             </a:fld>
             <a:endParaRPr lang="de-DE"/>
           </a:p>
@@ -8685,8 +8765,8 @@
           </a:p>
         </p:txBody>
       </p:sp>
-      <mc:AlternateContent xmlns:mc="http://schemas.openxmlformats.org/markup-compatibility/2006">
-        <mc:Choice xmlns:a14="http://schemas.microsoft.com/office/drawing/2010/main" Requires="a14">
+      <mc:AlternateContent xmlns:mc="http://schemas.openxmlformats.org/markup-compatibility/2006" xmlns:a14="http://schemas.microsoft.com/office/drawing/2010/main">
+        <mc:Choice Requires="a14">
           <p:sp>
             <p:nvSpPr>
               <p:cNvPr id="4" name="Inhaltsplatzhalter 3"/>
@@ -8704,13 +8784,8 @@
               <a:p>
                 <a:r>
                   <a:rPr lang="de-DE" dirty="0"/>
-                  <a:t>Daten im Zeitreihenkontext mit n = </a:t>
+                  <a:t>Daten im Zeitreihenkontext mit n = 100000</a:t>
                 </a:r>
-                <a:r>
-                  <a:rPr lang="de-DE" dirty="0"/>
-                  <a:t>100000</a:t>
-                </a:r>
-                <a:endParaRPr lang="de-DE" dirty="0"/>
               </a:p>
               <a:p>
                 <a14:m>
@@ -9073,7 +9148,7 @@
             </p:txBody>
           </p:sp>
         </mc:Choice>
-        <mc:Fallback>
+        <mc:Fallback xmlns="">
           <p:sp>
             <p:nvSpPr>
               <p:cNvPr id="4" name="Inhaltsplatzhalter 3"/>
@@ -9130,8 +9205,8 @@
           </a:p>
         </p:txBody>
       </p:sp>
-      <mc:AlternateContent xmlns:mc="http://schemas.openxmlformats.org/markup-compatibility/2006">
-        <mc:Choice xmlns:a14="http://schemas.microsoft.com/office/drawing/2010/main" Requires="a14">
+      <mc:AlternateContent xmlns:mc="http://schemas.openxmlformats.org/markup-compatibility/2006" xmlns:a14="http://schemas.microsoft.com/office/drawing/2010/main">
+        <mc:Choice Requires="a14">
           <p:sp>
             <p:nvSpPr>
               <p:cNvPr id="6" name="Inhaltsplatzhalter 5"/>
@@ -9149,13 +9224,8 @@
               <a:p>
                 <a:r>
                   <a:rPr lang="de-DE" dirty="0"/>
-                  <a:t>Daten im Zeitreihenkontext mit n = </a:t>
+                  <a:t>Daten im Zeitreihenkontext mit n = 100000</a:t>
                 </a:r>
-                <a:r>
-                  <a:rPr lang="de-DE" dirty="0"/>
-                  <a:t>100000</a:t>
-                </a:r>
-                <a:endParaRPr lang="de-DE" dirty="0"/>
               </a:p>
               <a:p>
                 <a14:m>
@@ -9715,7 +9785,7 @@
             </p:txBody>
           </p:sp>
         </mc:Choice>
-        <mc:Fallback>
+        <mc:Fallback xmlns="">
           <p:sp>
             <p:nvSpPr>
               <p:cNvPr id="6" name="Inhaltsplatzhalter 5"/>
@@ -9767,7 +9837,7 @@
             <a:fld id="{DA5DE712-6C0E-4DF7-B336-AC97213DC93D}" type="datetime1">
               <a:rPr lang="de-DE" smtClean="0"/>
               <a:pPr/>
-              <a:t>05.08.2018</a:t>
+              <a:t>05.08.18</a:t>
             </a:fld>
             <a:endParaRPr lang="de-DE"/>
           </a:p>
@@ -12127,7 +12197,7 @@
             <a:fld id="{DA5DE712-6C0E-4DF7-B336-AC97213DC93D}" type="datetime1">
               <a:rPr lang="de-DE" smtClean="0"/>
               <a:pPr/>
-              <a:t>05.08.2018</a:t>
+              <a:t>05.08.18</a:t>
             </a:fld>
             <a:endParaRPr lang="de-DE"/>
           </a:p>
@@ -12180,8 +12250,8 @@
           </a:p>
         </p:txBody>
       </p:sp>
-      <mc:AlternateContent xmlns:mc="http://schemas.openxmlformats.org/markup-compatibility/2006">
-        <mc:Choice xmlns:a14="http://schemas.microsoft.com/office/drawing/2010/main" Requires="a14">
+      <mc:AlternateContent xmlns:mc="http://schemas.openxmlformats.org/markup-compatibility/2006" xmlns:a14="http://schemas.microsoft.com/office/drawing/2010/main">
+        <mc:Choice Requires="a14">
           <p:sp>
             <p:nvSpPr>
               <p:cNvPr id="10" name="Inhaltsplatzhalter 9"/>
@@ -12200,7 +12270,7 @@
               <a:lstStyle/>
               <a:p>
                 <a:r>
-                  <a:rPr lang="de-DE" dirty="0" smtClean="0"/>
+                  <a:rPr lang="de-DE" dirty="0"/>
                   <a:t>Best fit: ARCH(1)-Modell mit </a:t>
                 </a:r>
                 <a14:m>
@@ -12289,13 +12359,7 @@
                       <a:rPr lang="de-DE" i="1">
                         <a:latin typeface="Cambria Math" panose="02040503050406030204" pitchFamily="18" charset="0"/>
                       </a:rPr>
-                      <m:t>=0.</m:t>
-                    </m:r>
-                    <m:r>
-                      <a:rPr lang="de-DE" i="1">
-                        <a:latin typeface="Cambria Math" panose="02040503050406030204" pitchFamily="18" charset="0"/>
-                      </a:rPr>
-                      <m:t>5</m:t>
+                      <m:t>=0.5</m:t>
                     </m:r>
                     <m:r>
                       <a:rPr lang="de-DE" b="0" i="1" smtClean="0">
@@ -12313,15 +12377,14 @@
                   <a:t>p-Wert Box-Pierce-Test der Residuen: </a:t>
                 </a:r>
                 <a:r>
-                  <a:rPr lang="de-DE" b="1" dirty="0" smtClean="0"/>
+                  <a:rPr lang="de-DE" b="1" dirty="0"/>
                   <a:t>0.3972</a:t>
                 </a:r>
-                <a:endParaRPr lang="de-DE" b="1" dirty="0"/>
               </a:p>
             </p:txBody>
           </p:sp>
         </mc:Choice>
-        <mc:Fallback>
+        <mc:Fallback xmlns="">
           <p:sp>
             <p:nvSpPr>
               <p:cNvPr id="10" name="Inhaltsplatzhalter 9"/>
@@ -14035,7 +14098,7 @@
             <a:fld id="{DA5DE712-6C0E-4DF7-B336-AC97213DC93D}" type="datetime1">
               <a:rPr lang="de-DE" smtClean="0"/>
               <a:pPr/>
-              <a:t>05.08.2018</a:t>
+              <a:t>05.08.18</a:t>
             </a:fld>
             <a:endParaRPr lang="de-DE"/>
           </a:p>
@@ -14088,8 +14151,8 @@
           </a:p>
         </p:txBody>
       </p:sp>
-      <mc:AlternateContent xmlns:mc="http://schemas.openxmlformats.org/markup-compatibility/2006">
-        <mc:Choice xmlns:a14="http://schemas.microsoft.com/office/drawing/2010/main" Requires="a14">
+      <mc:AlternateContent xmlns:mc="http://schemas.openxmlformats.org/markup-compatibility/2006" xmlns:a14="http://schemas.microsoft.com/office/drawing/2010/main">
+        <mc:Choice Requires="a14">
           <p:sp>
             <p:nvSpPr>
               <p:cNvPr id="10" name="Inhaltsplatzhalter 9"/>
@@ -14108,7 +14171,7 @@
               <a:lstStyle/>
               <a:p>
                 <a:r>
-                  <a:rPr lang="de-DE" dirty="0" smtClean="0"/>
+                  <a:rPr lang="de-DE" dirty="0"/>
                   <a:t>Best fit: ARCH(3)-Modell mit </a:t>
                 </a:r>
                 <a14:m>
@@ -14283,13 +14346,7 @@
                       <a:rPr lang="de-DE" i="1">
                         <a:latin typeface="Cambria Math" panose="02040503050406030204" pitchFamily="18" charset="0"/>
                       </a:rPr>
-                      <m:t>=0.</m:t>
-                    </m:r>
-                    <m:r>
-                      <a:rPr lang="de-DE" i="1">
-                        <a:latin typeface="Cambria Math" panose="02040503050406030204" pitchFamily="18" charset="0"/>
-                      </a:rPr>
-                      <m:t>1</m:t>
+                      <m:t>=0.1</m:t>
                     </m:r>
                     <m:r>
                       <a:rPr lang="de-DE" b="0" i="1" smtClean="0">
@@ -14307,15 +14364,14 @@
                   <a:t>p-Wert Box-Pierce-Test der Residuen: </a:t>
                 </a:r>
                 <a:r>
-                  <a:rPr lang="de-DE" b="1" dirty="0" smtClean="0"/>
+                  <a:rPr lang="de-DE" b="1" dirty="0"/>
                   <a:t>0.401</a:t>
                 </a:r>
-                <a:endParaRPr lang="de-DE" b="1" dirty="0"/>
               </a:p>
             </p:txBody>
           </p:sp>
         </mc:Choice>
-        <mc:Fallback>
+        <mc:Fallback xmlns="">
           <p:sp>
             <p:nvSpPr>
               <p:cNvPr id="10" name="Inhaltsplatzhalter 9"/>
@@ -16123,7 +16179,7 @@
             <a:fld id="{DA5DE712-6C0E-4DF7-B336-AC97213DC93D}" type="datetime1">
               <a:rPr lang="de-DE" smtClean="0"/>
               <a:pPr/>
-              <a:t>05.08.2018</a:t>
+              <a:t>05.08.18</a:t>
             </a:fld>
             <a:endParaRPr lang="de-DE"/>
           </a:p>
@@ -16176,8 +16232,8 @@
           </a:p>
         </p:txBody>
       </p:sp>
-      <mc:AlternateContent xmlns:mc="http://schemas.openxmlformats.org/markup-compatibility/2006">
-        <mc:Choice xmlns:a14="http://schemas.microsoft.com/office/drawing/2010/main" Requires="a14">
+      <mc:AlternateContent xmlns:mc="http://schemas.openxmlformats.org/markup-compatibility/2006" xmlns:a14="http://schemas.microsoft.com/office/drawing/2010/main">
+        <mc:Choice Requires="a14">
           <p:sp>
             <p:nvSpPr>
               <p:cNvPr id="10" name="Inhaltsplatzhalter 9"/>
@@ -16196,7 +16252,7 @@
               <a:lstStyle/>
               <a:p>
                 <a:r>
-                  <a:rPr lang="de-DE" dirty="0" smtClean="0"/>
+                  <a:rPr lang="de-DE" dirty="0"/>
                   <a:t>Best fit: GARCH(1,1) mit </a:t>
                 </a:r>
                 <a14:m>
@@ -16343,19 +16399,18 @@
                   <a:t>p-Wert Box-Pierce-Test der Residuen: </a:t>
                 </a:r>
                 <a:r>
-                  <a:rPr lang="de-DE" b="1" dirty="0" smtClean="0"/>
+                  <a:rPr lang="de-DE" b="1" dirty="0"/>
                   <a:t>0.3953</a:t>
                 </a:r>
                 <a:r>
-                  <a:rPr lang="de-DE" dirty="0" smtClean="0"/>
+                  <a:rPr lang="de-DE" dirty="0"/>
                   <a:t> </a:t>
                 </a:r>
-                <a:endParaRPr lang="de-DE" dirty="0"/>
               </a:p>
             </p:txBody>
           </p:sp>
         </mc:Choice>
-        <mc:Fallback>
+        <mc:Fallback xmlns="">
           <p:sp>
             <p:nvSpPr>
               <p:cNvPr id="10" name="Inhaltsplatzhalter 9"/>
@@ -16471,7 +16526,7 @@
             <a:fld id="{12CE0ACD-0B71-463F-9507-4095300257BC}" type="datetime1">
               <a:rPr lang="de-DE" smtClean="0"/>
               <a:pPr/>
-              <a:t>05.08.2018</a:t>
+              <a:t>05.08.18</a:t>
             </a:fld>
             <a:endParaRPr lang="de-DE"/>
           </a:p>
@@ -16549,11 +16604,7 @@
             <a:graphicFrameLocks noGrp="1"/>
           </p:cNvGraphicFramePr>
           <p:nvPr>
-            <p:extLst>
-              <p:ext uri="{D42A27DB-BD31-4B8C-83A1-F6EECF244321}">
-                <p14:modId xmlns:p14="http://schemas.microsoft.com/office/powerpoint/2010/main" val="263242061"/>
-              </p:ext>
-            </p:extLst>
+            <p:extLst/>
           </p:nvPr>
         </p:nvGraphicFramePr>
         <p:xfrm>
@@ -16868,7 +16919,7 @@
     </p:spTree>
     <p:extLst>
       <p:ext uri="{BB962C8B-B14F-4D97-AF65-F5344CB8AC3E}">
-        <p14:creationId xmlns:p14="http://schemas.microsoft.com/office/powerpoint/2010/main" val="1181804092"/>
+        <p14:creationId xmlns:p14="http://schemas.microsoft.com/office/powerpoint/2010/main" val="1017072635"/>
       </p:ext>
     </p:extLst>
   </p:cSld>
@@ -16947,7 +16998,7 @@
             <a:fld id="{12CE0ACD-0B71-463F-9507-4095300257BC}" type="datetime1">
               <a:rPr lang="de-DE" smtClean="0"/>
               <a:pPr/>
-              <a:t>05.08.2018</a:t>
+              <a:t>05.08.18</a:t>
             </a:fld>
             <a:endParaRPr lang="de-DE"/>
           </a:p>
@@ -17114,11 +17165,7 @@
             <a:graphicFrameLocks noGrp="1"/>
           </p:cNvGraphicFramePr>
           <p:nvPr>
-            <p:extLst>
-              <p:ext uri="{D42A27DB-BD31-4B8C-83A1-F6EECF244321}">
-                <p14:modId xmlns:p14="http://schemas.microsoft.com/office/powerpoint/2010/main" val="68375357"/>
-              </p:ext>
-            </p:extLst>
+            <p:extLst/>
           </p:nvPr>
         </p:nvGraphicFramePr>
         <p:xfrm>
@@ -17450,7 +17497,7 @@
     </p:spTree>
     <p:extLst>
       <p:ext uri="{BB962C8B-B14F-4D97-AF65-F5344CB8AC3E}">
-        <p14:creationId xmlns:p14="http://schemas.microsoft.com/office/powerpoint/2010/main" val="1948337129"/>
+        <p14:creationId xmlns:p14="http://schemas.microsoft.com/office/powerpoint/2010/main" val="2853250385"/>
       </p:ext>
     </p:extLst>
   </p:cSld>
@@ -17500,7 +17547,7 @@
           <a:p>
             <a:r>
               <a:rPr lang="de-DE" dirty="0"/>
-              <a:t>Versuchsreihe: Dax 30</a:t>
+              <a:t>Versuchsreihe: Dax 30 – Autokorrelation der Residuen</a:t>
             </a:r>
           </a:p>
         </p:txBody>
@@ -17529,7 +17576,7 @@
             <a:fld id="{12CE0ACD-0B71-463F-9507-4095300257BC}" type="datetime1">
               <a:rPr lang="de-DE" smtClean="0"/>
               <a:pPr/>
-              <a:t>05.08.2018</a:t>
+              <a:t>05.08.18</a:t>
             </a:fld>
             <a:endParaRPr lang="de-DE"/>
           </a:p>
@@ -17716,7 +17763,7 @@
         <p:spPr>
           <a:xfrm>
             <a:off x="3306525" y="4299942"/>
-            <a:ext cx="2602957" cy="369332"/>
+            <a:ext cx="2552943" cy="369332"/>
           </a:xfrm>
           <a:prstGeom prst="rect">
             <a:avLst/>
@@ -17731,7 +17778,7 @@
           <a:p>
             <a:r>
               <a:rPr lang="de-DE" dirty="0"/>
-              <a:t>ARCH-Effekte vorhanden?</a:t>
+              <a:t>Liegen ARCH-Effekte vor?</a:t>
             </a:r>
           </a:p>
         </p:txBody>
@@ -17739,7 +17786,7 @@
     </p:spTree>
     <p:extLst>
       <p:ext uri="{BB962C8B-B14F-4D97-AF65-F5344CB8AC3E}">
-        <p14:creationId xmlns:p14="http://schemas.microsoft.com/office/powerpoint/2010/main" val="2040067600"/>
+        <p14:creationId xmlns:p14="http://schemas.microsoft.com/office/powerpoint/2010/main" val="3919391604"/>
       </p:ext>
     </p:extLst>
   </p:cSld>
@@ -17784,12 +17831,14 @@
         </p:nvSpPr>
         <p:spPr/>
         <p:txBody>
-          <a:bodyPr/>
+          <a:bodyPr>
+            <a:normAutofit fontScale="90000"/>
+          </a:bodyPr>
           <a:lstStyle/>
           <a:p>
             <a:r>
               <a:rPr lang="de-DE" dirty="0"/>
-              <a:t>Versuchsreihe: Dax 30</a:t>
+              <a:t>Versuchsreihe: Dax 30 – GARCH-Modell basierend auf ARIMA(0,0,0)</a:t>
             </a:r>
           </a:p>
         </p:txBody>
@@ -17818,7 +17867,7 @@
             <a:fld id="{12CE0ACD-0B71-463F-9507-4095300257BC}" type="datetime1">
               <a:rPr lang="de-DE" smtClean="0"/>
               <a:pPr/>
-              <a:t>05.08.2018</a:t>
+              <a:t>05.08.18</a:t>
             </a:fld>
             <a:endParaRPr lang="de-DE"/>
           </a:p>
@@ -17957,7 +18006,7 @@
     </p:spTree>
     <p:extLst>
       <p:ext uri="{BB962C8B-B14F-4D97-AF65-F5344CB8AC3E}">
-        <p14:creationId xmlns:p14="http://schemas.microsoft.com/office/powerpoint/2010/main" val="905678871"/>
+        <p14:creationId xmlns:p14="http://schemas.microsoft.com/office/powerpoint/2010/main" val="2972891155"/>
       </p:ext>
     </p:extLst>
   </p:cSld>
@@ -17968,153 +18017,6 @@
 </file>
 
 <file path=ppt/slides/slide18.xml><?xml version="1.0" encoding="utf-8"?>
-<p:sld xmlns:a="http://schemas.openxmlformats.org/drawingml/2006/main" xmlns:r="http://schemas.openxmlformats.org/officeDocument/2006/relationships" xmlns:p="http://schemas.openxmlformats.org/presentationml/2006/main">
-  <p:cSld>
-    <p:spTree>
-      <p:nvGrpSpPr>
-        <p:cNvPr id="1" name=""/>
-        <p:cNvGrpSpPr/>
-        <p:nvPr/>
-      </p:nvGrpSpPr>
-      <p:grpSpPr>
-        <a:xfrm>
-          <a:off x="0" y="0"/>
-          <a:ext cx="0" cy="0"/>
-          <a:chOff x="0" y="0"/>
-          <a:chExt cx="0" cy="0"/>
-        </a:xfrm>
-      </p:grpSpPr>
-      <p:sp>
-        <p:nvSpPr>
-          <p:cNvPr id="2" name="Title 1">
-            <a:extLst>
-              <a:ext uri="{FF2B5EF4-FFF2-40B4-BE49-F238E27FC236}">
-                <a16:creationId xmlns:a16="http://schemas.microsoft.com/office/drawing/2014/main" id="{5913E78F-16B7-3440-93BB-F987622E4F29}"/>
-              </a:ext>
-            </a:extLst>
-          </p:cNvPr>
-          <p:cNvSpPr>
-            <a:spLocks noGrp="1"/>
-          </p:cNvSpPr>
-          <p:nvPr>
-            <p:ph type="title"/>
-          </p:nvPr>
-        </p:nvSpPr>
-        <p:spPr/>
-        <p:txBody>
-          <a:bodyPr/>
-          <a:lstStyle/>
-          <a:p>
-            <a:r>
-              <a:rPr lang="de-DE" dirty="0"/>
-              <a:t>Versuchsreihe: Dax 30</a:t>
-            </a:r>
-          </a:p>
-        </p:txBody>
-      </p:sp>
-      <p:sp>
-        <p:nvSpPr>
-          <p:cNvPr id="3" name="Date Placeholder 2">
-            <a:extLst>
-              <a:ext uri="{FF2B5EF4-FFF2-40B4-BE49-F238E27FC236}">
-                <a16:creationId xmlns:a16="http://schemas.microsoft.com/office/drawing/2014/main" id="{B5577484-49D9-364D-96A1-860BAE53DAC7}"/>
-              </a:ext>
-            </a:extLst>
-          </p:cNvPr>
-          <p:cNvSpPr>
-            <a:spLocks noGrp="1"/>
-          </p:cNvSpPr>
-          <p:nvPr>
-            <p:ph type="dt" sz="half" idx="10"/>
-          </p:nvPr>
-        </p:nvSpPr>
-        <p:spPr/>
-        <p:txBody>
-          <a:bodyPr/>
-          <a:lstStyle/>
-          <a:p>
-            <a:fld id="{12CE0ACD-0B71-463F-9507-4095300257BC}" type="datetime1">
-              <a:rPr lang="de-DE" smtClean="0"/>
-              <a:pPr/>
-              <a:t>05.08.2018</a:t>
-            </a:fld>
-            <a:endParaRPr lang="de-DE"/>
-          </a:p>
-        </p:txBody>
-      </p:sp>
-      <p:sp>
-        <p:nvSpPr>
-          <p:cNvPr id="4" name="Footer Placeholder 3">
-            <a:extLst>
-              <a:ext uri="{FF2B5EF4-FFF2-40B4-BE49-F238E27FC236}">
-                <a16:creationId xmlns:a16="http://schemas.microsoft.com/office/drawing/2014/main" id="{C2260F1C-3970-4C4B-A246-C22E19B93C13}"/>
-              </a:ext>
-            </a:extLst>
-          </p:cNvPr>
-          <p:cNvSpPr>
-            <a:spLocks noGrp="1"/>
-          </p:cNvSpPr>
-          <p:nvPr>
-            <p:ph type="ftr" sz="quarter" idx="11"/>
-          </p:nvPr>
-        </p:nvSpPr>
-        <p:spPr/>
-        <p:txBody>
-          <a:bodyPr/>
-          <a:lstStyle/>
-          <a:p>
-            <a:r>
-              <a:rPr lang="de-DE"/>
-              <a:t>Time Series Analysis – Sommersemester 2018</a:t>
-            </a:r>
-            <a:endParaRPr lang="de-DE" dirty="0"/>
-          </a:p>
-        </p:txBody>
-      </p:sp>
-      <p:sp>
-        <p:nvSpPr>
-          <p:cNvPr id="5" name="Slide Number Placeholder 4">
-            <a:extLst>
-              <a:ext uri="{FF2B5EF4-FFF2-40B4-BE49-F238E27FC236}">
-                <a16:creationId xmlns:a16="http://schemas.microsoft.com/office/drawing/2014/main" id="{A6A2199C-5932-794D-8157-6911987C3463}"/>
-              </a:ext>
-            </a:extLst>
-          </p:cNvPr>
-          <p:cNvSpPr>
-            <a:spLocks noGrp="1"/>
-          </p:cNvSpPr>
-          <p:nvPr>
-            <p:ph type="sldNum" sz="quarter" idx="12"/>
-          </p:nvPr>
-        </p:nvSpPr>
-        <p:spPr/>
-        <p:txBody>
-          <a:bodyPr/>
-          <a:lstStyle/>
-          <a:p>
-            <a:fld id="{015363AA-F6CB-4A58-B5AD-B2CDFEAF0813}" type="slidenum">
-              <a:rPr lang="de-DE" smtClean="0"/>
-              <a:pPr/>
-              <a:t>18</a:t>
-            </a:fld>
-            <a:endParaRPr lang="de-DE"/>
-          </a:p>
-        </p:txBody>
-      </p:sp>
-    </p:spTree>
-    <p:extLst>
-      <p:ext uri="{BB962C8B-B14F-4D97-AF65-F5344CB8AC3E}">
-        <p14:creationId xmlns:p14="http://schemas.microsoft.com/office/powerpoint/2010/main" val="3697593727"/>
-      </p:ext>
-    </p:extLst>
-  </p:cSld>
-  <p:clrMapOvr>
-    <a:masterClrMapping/>
-  </p:clrMapOvr>
-</p:sld>
-</file>
-
-<file path=ppt/slides/slide19.xml><?xml version="1.0" encoding="utf-8"?>
 <p:sld xmlns:a="http://schemas.openxmlformats.org/drawingml/2006/main" xmlns:r="http://schemas.openxmlformats.org/officeDocument/2006/relationships" xmlns:p="http://schemas.openxmlformats.org/presentationml/2006/main">
   <p:cSld>
     <p:spTree>
@@ -18253,7 +18155,7 @@
             <a:fld id="{D509922F-D4D2-4984-9115-CE10B66F29DF}" type="datetime1">
               <a:rPr lang="de-DE" smtClean="0"/>
               <a:pPr/>
-              <a:t>05.08.2018</a:t>
+              <a:t>05.08.18</a:t>
             </a:fld>
             <a:endParaRPr lang="de-DE"/>
           </a:p>
@@ -18312,7 +18214,7 @@
             <a:fld id="{015363AA-F6CB-4A58-B5AD-B2CDFEAF0813}" type="slidenum">
               <a:rPr lang="de-DE" smtClean="0"/>
               <a:pPr/>
-              <a:t>19</a:t>
+              <a:t>18</a:t>
             </a:fld>
             <a:endParaRPr lang="de-DE"/>
           </a:p>
@@ -18336,12 +18238,14 @@
         </p:nvSpPr>
         <p:spPr/>
         <p:txBody>
-          <a:bodyPr/>
+          <a:bodyPr>
+            <a:normAutofit/>
+          </a:bodyPr>
           <a:lstStyle/>
           <a:p>
             <a:r>
               <a:rPr lang="de-DE" dirty="0"/>
-              <a:t>Versuchsreihe: Dax 30</a:t>
+              <a:t>Versuchsreihe: Dax 30 – Normalverteilung der Residuen</a:t>
             </a:r>
           </a:p>
         </p:txBody>
@@ -18349,7 +18253,254 @@
     </p:spTree>
     <p:extLst>
       <p:ext uri="{BB962C8B-B14F-4D97-AF65-F5344CB8AC3E}">
-        <p14:creationId xmlns:p14="http://schemas.microsoft.com/office/powerpoint/2010/main" val="2260786811"/>
+        <p14:creationId xmlns:p14="http://schemas.microsoft.com/office/powerpoint/2010/main" val="1339015251"/>
+      </p:ext>
+    </p:extLst>
+  </p:cSld>
+  <p:clrMapOvr>
+    <a:masterClrMapping/>
+  </p:clrMapOvr>
+</p:sld>
+</file>
+
+<file path=ppt/slides/slide19.xml><?xml version="1.0" encoding="utf-8"?>
+<p:sld xmlns:a="http://schemas.openxmlformats.org/drawingml/2006/main" xmlns:r="http://schemas.openxmlformats.org/officeDocument/2006/relationships" xmlns:p="http://schemas.openxmlformats.org/presentationml/2006/main">
+  <p:cSld>
+    <p:spTree>
+      <p:nvGrpSpPr>
+        <p:cNvPr id="1" name=""/>
+        <p:cNvGrpSpPr/>
+        <p:nvPr/>
+      </p:nvGrpSpPr>
+      <p:grpSpPr>
+        <a:xfrm>
+          <a:off x="0" y="0"/>
+          <a:ext cx="0" cy="0"/>
+          <a:chOff x="0" y="0"/>
+          <a:chExt cx="0" cy="0"/>
+        </a:xfrm>
+      </p:grpSpPr>
+      <p:sp>
+        <p:nvSpPr>
+          <p:cNvPr id="3" name="Text Placeholder 2">
+            <a:extLst>
+              <a:ext uri="{FF2B5EF4-FFF2-40B4-BE49-F238E27FC236}">
+                <a16:creationId xmlns:a16="http://schemas.microsoft.com/office/drawing/2014/main" id="{7C58D974-6B67-D444-882F-B8D539D75ED0}"/>
+              </a:ext>
+            </a:extLst>
+          </p:cNvPr>
+          <p:cNvSpPr>
+            <a:spLocks noGrp="1"/>
+          </p:cNvSpPr>
+          <p:nvPr>
+            <p:ph type="body" sz="half" idx="2"/>
+          </p:nvPr>
+        </p:nvSpPr>
+        <p:spPr/>
+        <p:txBody>
+          <a:bodyPr/>
+          <a:lstStyle/>
+          <a:p>
+            <a:pPr marL="342900" indent="-342900">
+              <a:buFont typeface="+mj-lt"/>
+              <a:buAutoNum type="arabicPeriod"/>
+            </a:pPr>
+            <a:r>
+              <a:rPr lang="de-DE" dirty="0"/>
+              <a:t>ARCH-Effekte in den quadrierten Residuen</a:t>
+            </a:r>
+          </a:p>
+          <a:p>
+            <a:pPr marL="342900" indent="-342900">
+              <a:buFont typeface="+mj-lt"/>
+              <a:buAutoNum type="arabicPeriod"/>
+            </a:pPr>
+            <a:r>
+              <a:rPr lang="de-DE" dirty="0"/>
+              <a:t>Normalverteilung der standardisierten Residuen des GARCH-Models</a:t>
+            </a:r>
+          </a:p>
+          <a:p>
+            <a:pPr marL="342900" indent="-342900">
+              <a:buFont typeface="+mj-lt"/>
+              <a:buAutoNum type="arabicPeriod"/>
+            </a:pPr>
+            <a:r>
+              <a:rPr lang="de-DE" dirty="0">
+                <a:solidFill>
+                  <a:srgbClr val="C00000"/>
+                </a:solidFill>
+              </a:rPr>
+              <a:t>Keine Autokorrelation der quadrierten standardisierten Residuen des GARCH-Models</a:t>
+            </a:r>
+          </a:p>
+          <a:p>
+            <a:pPr marL="285750" indent="-285750">
+              <a:buFont typeface="Arial" panose="020B0604020202020204" pitchFamily="34" charset="0"/>
+              <a:buChar char="•"/>
+            </a:pPr>
+            <a:endParaRPr lang="de-DE" dirty="0"/>
+          </a:p>
+        </p:txBody>
+      </p:sp>
+      <p:sp>
+        <p:nvSpPr>
+          <p:cNvPr id="4" name="Date Placeholder 3">
+            <a:extLst>
+              <a:ext uri="{FF2B5EF4-FFF2-40B4-BE49-F238E27FC236}">
+                <a16:creationId xmlns:a16="http://schemas.microsoft.com/office/drawing/2014/main" id="{210CCB76-226E-6D49-82B9-F25F30362223}"/>
+              </a:ext>
+            </a:extLst>
+          </p:cNvPr>
+          <p:cNvSpPr>
+            <a:spLocks noGrp="1"/>
+          </p:cNvSpPr>
+          <p:nvPr>
+            <p:ph type="dt" sz="half" idx="10"/>
+          </p:nvPr>
+        </p:nvSpPr>
+        <p:spPr/>
+        <p:txBody>
+          <a:bodyPr/>
+          <a:lstStyle/>
+          <a:p>
+            <a:fld id="{D509922F-D4D2-4984-9115-CE10B66F29DF}" type="datetime1">
+              <a:rPr lang="de-DE" smtClean="0"/>
+              <a:pPr/>
+              <a:t>05.08.18</a:t>
+            </a:fld>
+            <a:endParaRPr lang="de-DE"/>
+          </a:p>
+        </p:txBody>
+      </p:sp>
+      <p:sp>
+        <p:nvSpPr>
+          <p:cNvPr id="5" name="Footer Placeholder 4">
+            <a:extLst>
+              <a:ext uri="{FF2B5EF4-FFF2-40B4-BE49-F238E27FC236}">
+                <a16:creationId xmlns:a16="http://schemas.microsoft.com/office/drawing/2014/main" id="{A18FD021-684D-C245-B2E2-087729D8215C}"/>
+              </a:ext>
+            </a:extLst>
+          </p:cNvPr>
+          <p:cNvSpPr>
+            <a:spLocks noGrp="1"/>
+          </p:cNvSpPr>
+          <p:nvPr>
+            <p:ph type="ftr" sz="quarter" idx="11"/>
+          </p:nvPr>
+        </p:nvSpPr>
+        <p:spPr/>
+        <p:txBody>
+          <a:bodyPr/>
+          <a:lstStyle/>
+          <a:p>
+            <a:r>
+              <a:rPr lang="de-DE"/>
+              <a:t>Time Series Analysis – Sommersemester 2018</a:t>
+            </a:r>
+            <a:endParaRPr lang="de-DE" dirty="0"/>
+          </a:p>
+        </p:txBody>
+      </p:sp>
+      <p:sp>
+        <p:nvSpPr>
+          <p:cNvPr id="6" name="Slide Number Placeholder 5">
+            <a:extLst>
+              <a:ext uri="{FF2B5EF4-FFF2-40B4-BE49-F238E27FC236}">
+                <a16:creationId xmlns:a16="http://schemas.microsoft.com/office/drawing/2014/main" id="{BC18C5B3-EE93-BE4E-BDAB-25CC1BD2DA8E}"/>
+              </a:ext>
+            </a:extLst>
+          </p:cNvPr>
+          <p:cNvSpPr>
+            <a:spLocks noGrp="1"/>
+          </p:cNvSpPr>
+          <p:nvPr>
+            <p:ph type="sldNum" sz="quarter" idx="12"/>
+          </p:nvPr>
+        </p:nvSpPr>
+        <p:spPr/>
+        <p:txBody>
+          <a:bodyPr/>
+          <a:lstStyle/>
+          <a:p>
+            <a:fld id="{015363AA-F6CB-4A58-B5AD-B2CDFEAF0813}" type="slidenum">
+              <a:rPr lang="de-DE" smtClean="0"/>
+              <a:pPr/>
+              <a:t>19</a:t>
+            </a:fld>
+            <a:endParaRPr lang="de-DE"/>
+          </a:p>
+        </p:txBody>
+      </p:sp>
+      <p:sp>
+        <p:nvSpPr>
+          <p:cNvPr id="7" name="Title 6">
+            <a:extLst>
+              <a:ext uri="{FF2B5EF4-FFF2-40B4-BE49-F238E27FC236}">
+                <a16:creationId xmlns:a16="http://schemas.microsoft.com/office/drawing/2014/main" id="{53FB6306-6D07-9D47-B750-22BD56735AFD}"/>
+              </a:ext>
+            </a:extLst>
+          </p:cNvPr>
+          <p:cNvSpPr>
+            <a:spLocks noGrp="1"/>
+          </p:cNvSpPr>
+          <p:nvPr>
+            <p:ph type="title"/>
+          </p:nvPr>
+        </p:nvSpPr>
+        <p:spPr/>
+        <p:txBody>
+          <a:bodyPr>
+            <a:normAutofit/>
+          </a:bodyPr>
+          <a:lstStyle/>
+          <a:p>
+            <a:r>
+              <a:rPr lang="de-DE" dirty="0"/>
+              <a:t>Versuchsreihe: Dax 30 – Autokorrelation der Residuen</a:t>
+            </a:r>
+          </a:p>
+        </p:txBody>
+      </p:sp>
+      <p:pic>
+        <p:nvPicPr>
+          <p:cNvPr id="11" name="Content Placeholder 10">
+            <a:extLst>
+              <a:ext uri="{FF2B5EF4-FFF2-40B4-BE49-F238E27FC236}">
+                <a16:creationId xmlns:a16="http://schemas.microsoft.com/office/drawing/2014/main" id="{B7A5038E-F0D4-2E42-88E1-B2A3F58D71CA}"/>
+              </a:ext>
+            </a:extLst>
+          </p:cNvPr>
+          <p:cNvPicPr>
+            <a:picLocks noGrp="1" noChangeAspect="1"/>
+          </p:cNvPicPr>
+          <p:nvPr>
+            <p:ph idx="1"/>
+          </p:nvPr>
+        </p:nvPicPr>
+        <p:blipFill>
+          <a:blip r:embed="rId2">
+            <a:extLst>
+              <a:ext uri="{28A0092B-C50C-407E-A947-70E740481C1C}">
+                <a14:useLocalDpi xmlns:a14="http://schemas.microsoft.com/office/drawing/2010/main" val="0"/>
+              </a:ext>
+            </a:extLst>
+          </a:blip>
+          <a:stretch>
+            <a:fillRect/>
+          </a:stretch>
+        </p:blipFill>
+        <p:spPr>
+          <a:xfrm>
+            <a:off x="3995936" y="1236211"/>
+            <a:ext cx="5007272" cy="3240000"/>
+          </a:xfrm>
+        </p:spPr>
+      </p:pic>
+    </p:spTree>
+    <p:extLst>
+      <p:ext uri="{BB962C8B-B14F-4D97-AF65-F5344CB8AC3E}">
+        <p14:creationId xmlns:p14="http://schemas.microsoft.com/office/powerpoint/2010/main" val="3479761428"/>
       </p:ext>
     </p:extLst>
   </p:cSld>
@@ -18567,7 +18718,7 @@
             <a:fld id="{6DB845E5-DACF-426C-8A10-A6438D29DD66}" type="datetime1">
               <a:rPr lang="de-DE" smtClean="0"/>
               <a:pPr/>
-              <a:t>05.08.2018</a:t>
+              <a:t>05.08.18</a:t>
             </a:fld>
             <a:endParaRPr lang="de-DE"/>
           </a:p>
@@ -18651,10 +18802,10 @@
       </p:grpSpPr>
       <p:sp>
         <p:nvSpPr>
-          <p:cNvPr id="3" name="Text Placeholder 2">
+          <p:cNvPr id="2" name="Title 1">
             <a:extLst>
               <a:ext uri="{FF2B5EF4-FFF2-40B4-BE49-F238E27FC236}">
-                <a16:creationId xmlns:a16="http://schemas.microsoft.com/office/drawing/2014/main" id="{7C58D974-6B67-D444-882F-B8D539D75ED0}"/>
+                <a16:creationId xmlns:a16="http://schemas.microsoft.com/office/drawing/2014/main" id="{16C2D24F-031D-3042-8DB3-2C9F1FFAA6D2}"/>
               </a:ext>
             </a:extLst>
           </p:cNvPr>
@@ -18662,62 +18813,29 @@
             <a:spLocks noGrp="1"/>
           </p:cNvSpPr>
           <p:nvPr>
-            <p:ph type="body" sz="half" idx="2"/>
+            <p:ph type="title"/>
           </p:nvPr>
         </p:nvSpPr>
         <p:spPr/>
         <p:txBody>
-          <a:bodyPr/>
+          <a:bodyPr>
+            <a:normAutofit/>
+          </a:bodyPr>
           <a:lstStyle/>
           <a:p>
-            <a:pPr marL="342900" indent="-342900">
-              <a:buFont typeface="+mj-lt"/>
-              <a:buAutoNum type="arabicPeriod"/>
-            </a:pPr>
             <a:r>
               <a:rPr lang="de-DE" dirty="0"/>
-              <a:t>ARCH-Effekte in den quadrierten Residuen</a:t>
-            </a:r>
-          </a:p>
-          <a:p>
-            <a:pPr marL="342900" indent="-342900">
-              <a:buFont typeface="+mj-lt"/>
-              <a:buAutoNum type="arabicPeriod"/>
-            </a:pPr>
-            <a:r>
-              <a:rPr lang="de-DE" dirty="0"/>
-              <a:t>Normalverteilung der standardisierten Residuen des GARCH-Models</a:t>
-            </a:r>
-          </a:p>
-          <a:p>
-            <a:pPr marL="342900" indent="-342900">
-              <a:buFont typeface="+mj-lt"/>
-              <a:buAutoNum type="arabicPeriod"/>
-            </a:pPr>
-            <a:r>
-              <a:rPr lang="de-DE" dirty="0">
-                <a:solidFill>
-                  <a:srgbClr val="C00000"/>
-                </a:solidFill>
-              </a:rPr>
-              <a:t>Keine Autokorrelation der quadrierten standardisierten Residuen des GARCH-Models</a:t>
-            </a:r>
-          </a:p>
-          <a:p>
-            <a:pPr marL="285750" indent="-285750">
-              <a:buFont typeface="Arial" panose="020B0604020202020204" pitchFamily="34" charset="0"/>
-              <a:buChar char="•"/>
-            </a:pPr>
-            <a:endParaRPr lang="de-DE" dirty="0"/>
-          </a:p>
-        </p:txBody>
-      </p:sp>
-      <p:sp>
-        <p:nvSpPr>
-          <p:cNvPr id="4" name="Date Placeholder 3">
+              <a:t>Versuchsreihe: Dax 30 – Vorhersagefähigkeit</a:t>
+            </a:r>
+          </a:p>
+        </p:txBody>
+      </p:sp>
+      <p:sp>
+        <p:nvSpPr>
+          <p:cNvPr id="3" name="Date Placeholder 2">
             <a:extLst>
               <a:ext uri="{FF2B5EF4-FFF2-40B4-BE49-F238E27FC236}">
-                <a16:creationId xmlns:a16="http://schemas.microsoft.com/office/drawing/2014/main" id="{210CCB76-226E-6D49-82B9-F25F30362223}"/>
+                <a16:creationId xmlns:a16="http://schemas.microsoft.com/office/drawing/2014/main" id="{2974CD45-0965-DD47-B0B7-BB5DDCC4D698}"/>
               </a:ext>
             </a:extLst>
           </p:cNvPr>
@@ -18733,10 +18851,10 @@
           <a:bodyPr/>
           <a:lstStyle/>
           <a:p>
-            <a:fld id="{D509922F-D4D2-4984-9115-CE10B66F29DF}" type="datetime1">
+            <a:fld id="{12CE0ACD-0B71-463F-9507-4095300257BC}" type="datetime1">
               <a:rPr lang="de-DE" smtClean="0"/>
               <a:pPr/>
-              <a:t>05.08.2018</a:t>
+              <a:t>05.08.18</a:t>
             </a:fld>
             <a:endParaRPr lang="de-DE"/>
           </a:p>
@@ -18744,10 +18862,10 @@
       </p:sp>
       <p:sp>
         <p:nvSpPr>
-          <p:cNvPr id="5" name="Footer Placeholder 4">
+          <p:cNvPr id="4" name="Footer Placeholder 3">
             <a:extLst>
               <a:ext uri="{FF2B5EF4-FFF2-40B4-BE49-F238E27FC236}">
-                <a16:creationId xmlns:a16="http://schemas.microsoft.com/office/drawing/2014/main" id="{A18FD021-684D-C245-B2E2-087729D8215C}"/>
+                <a16:creationId xmlns:a16="http://schemas.microsoft.com/office/drawing/2014/main" id="{36CFC7C2-E6FE-9C49-8D63-01C2420DF4AF}"/>
               </a:ext>
             </a:extLst>
           </p:cNvPr>
@@ -18773,10 +18891,10 @@
       </p:sp>
       <p:sp>
         <p:nvSpPr>
-          <p:cNvPr id="6" name="Slide Number Placeholder 5">
+          <p:cNvPr id="5" name="Slide Number Placeholder 4">
             <a:extLst>
               <a:ext uri="{FF2B5EF4-FFF2-40B4-BE49-F238E27FC236}">
-                <a16:creationId xmlns:a16="http://schemas.microsoft.com/office/drawing/2014/main" id="{BC18C5B3-EE93-BE4E-BDAB-25CC1BD2DA8E}"/>
+                <a16:creationId xmlns:a16="http://schemas.microsoft.com/office/drawing/2014/main" id="{B85CF25C-E699-6D44-A5D6-AA445BF709F8}"/>
               </a:ext>
             </a:extLst>
           </p:cNvPr>
@@ -18801,52 +18919,22 @@
           </a:p>
         </p:txBody>
       </p:sp>
-      <p:sp>
-        <p:nvSpPr>
-          <p:cNvPr id="7" name="Title 6">
+      <p:pic>
+        <p:nvPicPr>
+          <p:cNvPr id="9" name="Picture 8">
             <a:extLst>
               <a:ext uri="{FF2B5EF4-FFF2-40B4-BE49-F238E27FC236}">
-                <a16:creationId xmlns:a16="http://schemas.microsoft.com/office/drawing/2014/main" id="{53FB6306-6D07-9D47-B750-22BD56735AFD}"/>
-              </a:ext>
-            </a:extLst>
-          </p:cNvPr>
-          <p:cNvSpPr>
-            <a:spLocks noGrp="1"/>
-          </p:cNvSpPr>
-          <p:nvPr>
-            <p:ph type="title"/>
-          </p:nvPr>
-        </p:nvSpPr>
-        <p:spPr/>
-        <p:txBody>
-          <a:bodyPr/>
-          <a:lstStyle/>
-          <a:p>
-            <a:r>
-              <a:rPr lang="de-DE" dirty="0"/>
-              <a:t>Versuchsreihe: Dax 30</a:t>
-            </a:r>
-          </a:p>
-        </p:txBody>
-      </p:sp>
-      <p:pic>
-        <p:nvPicPr>
-          <p:cNvPr id="11" name="Content Placeholder 10">
-            <a:extLst>
-              <a:ext uri="{FF2B5EF4-FFF2-40B4-BE49-F238E27FC236}">
-                <a16:creationId xmlns:a16="http://schemas.microsoft.com/office/drawing/2014/main" id="{B7A5038E-F0D4-2E42-88E1-B2A3F58D71CA}"/>
+                <a16:creationId xmlns:a16="http://schemas.microsoft.com/office/drawing/2014/main" id="{E8FC95AB-256E-A749-AB9B-A5112FC33686}"/>
               </a:ext>
             </a:extLst>
           </p:cNvPr>
           <p:cNvPicPr>
-            <a:picLocks noGrp="1" noChangeAspect="1"/>
+            <a:picLocks noChangeAspect="1"/>
           </p:cNvPicPr>
-          <p:nvPr>
-            <p:ph idx="1"/>
-          </p:nvPr>
+          <p:nvPr/>
         </p:nvPicPr>
         <p:blipFill>
-          <a:blip r:embed="rId2">
+          <a:blip r:embed="rId3">
             <a:extLst>
               <a:ext uri="{28A0092B-C50C-407E-A947-70E740481C1C}">
                 <a14:useLocalDpi xmlns:a14="http://schemas.microsoft.com/office/drawing/2010/main" val="0"/>
@@ -18859,15 +18947,124 @@
         </p:blipFill>
         <p:spPr>
           <a:xfrm>
-            <a:off x="3995936" y="1236211"/>
-            <a:ext cx="5007272" cy="3240000"/>
+            <a:off x="539552" y="1059581"/>
+            <a:ext cx="5463965" cy="3445430"/>
           </a:xfrm>
+          <a:prstGeom prst="rect">
+            <a:avLst/>
+          </a:prstGeom>
         </p:spPr>
       </p:pic>
+      <p:sp>
+        <p:nvSpPr>
+          <p:cNvPr id="11" name="TextBox 10">
+            <a:extLst>
+              <a:ext uri="{FF2B5EF4-FFF2-40B4-BE49-F238E27FC236}">
+                <a16:creationId xmlns:a16="http://schemas.microsoft.com/office/drawing/2014/main" id="{8AA6A156-7A53-BC41-9135-85BD263F5808}"/>
+              </a:ext>
+            </a:extLst>
+          </p:cNvPr>
+          <p:cNvSpPr txBox="1"/>
+          <p:nvPr/>
+        </p:nvSpPr>
+        <p:spPr>
+          <a:xfrm>
+            <a:off x="6606693" y="1551190"/>
+            <a:ext cx="2089033" cy="2462213"/>
+          </a:xfrm>
+          <a:prstGeom prst="rect">
+            <a:avLst/>
+          </a:prstGeom>
+          <a:noFill/>
+        </p:spPr>
+        <p:txBody>
+          <a:bodyPr wrap="none" rtlCol="0">
+            <a:spAutoFit/>
+          </a:bodyPr>
+          <a:lstStyle/>
+          <a:p>
+            <a:pPr fontAlgn="t"/>
+            <a:r>
+              <a:rPr lang="de-DE" sz="1400" dirty="0"/>
+              <a:t>          Series            Sigma</a:t>
+            </a:r>
+          </a:p>
+          <a:p>
+            <a:pPr fontAlgn="t"/>
+            <a:r>
+              <a:rPr lang="de-DE" sz="1400" dirty="0"/>
+              <a:t>T+1  -0.0008865   0.01662</a:t>
+            </a:r>
+          </a:p>
+          <a:p>
+            <a:pPr fontAlgn="t"/>
+            <a:r>
+              <a:rPr lang="de-DE" sz="1400" dirty="0"/>
+              <a:t>T+2  -0.0008865   0.01658</a:t>
+            </a:r>
+          </a:p>
+          <a:p>
+            <a:pPr fontAlgn="t"/>
+            <a:r>
+              <a:rPr lang="de-DE" sz="1400" dirty="0"/>
+              <a:t>T+3  -0.0008865   0.01655</a:t>
+            </a:r>
+          </a:p>
+          <a:p>
+            <a:pPr fontAlgn="t"/>
+            <a:r>
+              <a:rPr lang="de-DE" sz="1400" dirty="0"/>
+              <a:t>T+4  -0.0008865   0.01652</a:t>
+            </a:r>
+          </a:p>
+          <a:p>
+            <a:pPr fontAlgn="t"/>
+            <a:r>
+              <a:rPr lang="de-DE" sz="1400" dirty="0"/>
+              <a:t>T+5  -0.0008865   0.01648</a:t>
+            </a:r>
+          </a:p>
+          <a:p>
+            <a:pPr fontAlgn="t"/>
+            <a:r>
+              <a:rPr lang="de-DE" sz="1400" dirty="0"/>
+              <a:t>T+6  -0.0008865   0.01645</a:t>
+            </a:r>
+          </a:p>
+          <a:p>
+            <a:pPr fontAlgn="t"/>
+            <a:r>
+              <a:rPr lang="de-DE" sz="1400" dirty="0"/>
+              <a:t>T+7  -0.0008865   0.01642</a:t>
+            </a:r>
+          </a:p>
+          <a:p>
+            <a:pPr fontAlgn="t"/>
+            <a:r>
+              <a:rPr lang="de-DE" sz="1400" dirty="0"/>
+              <a:t>T+8  -0.0008865   0.01638</a:t>
+            </a:r>
+          </a:p>
+          <a:p>
+            <a:pPr fontAlgn="t"/>
+            <a:r>
+              <a:rPr lang="de-DE" sz="1400" dirty="0"/>
+              <a:t>T+9  -0.0008865   0.01635</a:t>
+            </a:r>
+          </a:p>
+          <a:p>
+            <a:pPr fontAlgn="t"/>
+            <a:r>
+              <a:rPr lang="de-DE" sz="1400" dirty="0"/>
+              <a:t>T+10 -0.0008865  0.01632</a:t>
+            </a:r>
+          </a:p>
+        </p:txBody>
+      </p:sp>
     </p:spTree>
     <p:extLst>
       <p:ext uri="{BB962C8B-B14F-4D97-AF65-F5344CB8AC3E}">
-        <p14:creationId xmlns:p14="http://schemas.microsoft.com/office/powerpoint/2010/main" val="459564503"/>
+        <p14:creationId xmlns:p14="http://schemas.microsoft.com/office/powerpoint/2010/main" val="814099503"/>
       </p:ext>
     </p:extLst>
   </p:cSld>
@@ -18896,13 +19093,7 @@
       </p:grpSpPr>
       <p:sp>
         <p:nvSpPr>
-          <p:cNvPr id="2" name="Title 1">
-            <a:extLst>
-              <a:ext uri="{FF2B5EF4-FFF2-40B4-BE49-F238E27FC236}">
-                <a16:creationId xmlns:a16="http://schemas.microsoft.com/office/drawing/2014/main" id="{16C2D24F-031D-3042-8DB3-2C9F1FFAA6D2}"/>
-              </a:ext>
-            </a:extLst>
-          </p:cNvPr>
+          <p:cNvPr id="2" name="Titel 1"/>
           <p:cNvSpPr>
             <a:spLocks noGrp="1"/>
           </p:cNvSpPr>
@@ -18917,25 +19108,19 @@
           <a:p>
             <a:r>
               <a:rPr lang="de-DE" dirty="0"/>
-              <a:t>Versuchsreihe: Dax 30</a:t>
-            </a:r>
-          </a:p>
-        </p:txBody>
-      </p:sp>
-      <p:sp>
-        <p:nvSpPr>
-          <p:cNvPr id="3" name="Date Placeholder 2">
-            <a:extLst>
-              <a:ext uri="{FF2B5EF4-FFF2-40B4-BE49-F238E27FC236}">
-                <a16:creationId xmlns:a16="http://schemas.microsoft.com/office/drawing/2014/main" id="{2974CD45-0965-DD47-B0B7-BB5DDCC4D698}"/>
-              </a:ext>
-            </a:extLst>
-          </p:cNvPr>
-          <p:cNvSpPr>
-            <a:spLocks noGrp="1"/>
-          </p:cNvSpPr>
-          <p:nvPr>
-            <p:ph type="dt" sz="half" idx="10"/>
+              <a:t>Resümee</a:t>
+            </a:r>
+          </a:p>
+        </p:txBody>
+      </p:sp>
+      <p:sp>
+        <p:nvSpPr>
+          <p:cNvPr id="3" name="Inhaltsplatzhalter 2"/>
+          <p:cNvSpPr>
+            <a:spLocks noGrp="1"/>
+          </p:cNvSpPr>
+          <p:nvPr>
+            <p:ph idx="1"/>
           </p:nvPr>
         </p:nvSpPr>
         <p:spPr/>
@@ -18943,10 +19128,64 @@
           <a:bodyPr/>
           <a:lstStyle/>
           <a:p>
-            <a:fld id="{12CE0ACD-0B71-463F-9507-4095300257BC}" type="datetime1">
+            <a:r>
+              <a:rPr lang="de-DE" dirty="0"/>
+              <a:t>ARCH &amp; GARCH-Prozesse wichtig bei der Modellierung von Prozessen mit Volatilitätsschwankungen</a:t>
+            </a:r>
+          </a:p>
+          <a:p>
+            <a:r>
+              <a:rPr lang="de-DE" dirty="0"/>
+              <a:t>ARCH-Prozesse identifizierbar anhand der PACF der quadrierten Daten (AR-Modell)</a:t>
+            </a:r>
+          </a:p>
+          <a:p>
+            <a:r>
+              <a:rPr lang="de-DE" dirty="0"/>
+              <a:t>Identifizierung von GARCH-Prozessen schwierig (Verwechselbarkeit mit ARCH-Prozessen hohen Grades)</a:t>
+            </a:r>
+          </a:p>
+          <a:p>
+            <a:r>
+              <a:rPr lang="de-DE" dirty="0"/>
+              <a:t>BIC als Kriterium für Model </a:t>
+            </a:r>
+            <a:r>
+              <a:rPr lang="de-DE" dirty="0" err="1"/>
+              <a:t>Selection</a:t>
+            </a:r>
+            <a:r>
+              <a:rPr lang="de-DE" dirty="0"/>
+              <a:t> für große N zur Auswahl des korrekten Modells sinnvoll (asymptotisch konsistent)</a:t>
+            </a:r>
+          </a:p>
+          <a:p>
+            <a:r>
+              <a:rPr lang="de-DE" dirty="0"/>
+              <a:t>GARCH-Modellierung zur Vorhersage von Volatilitätsschwankungen bei Zeitreihen im Finanzbereich </a:t>
+            </a:r>
+          </a:p>
+        </p:txBody>
+      </p:sp>
+      <p:sp>
+        <p:nvSpPr>
+          <p:cNvPr id="4" name="Datumsplatzhalter 3"/>
+          <p:cNvSpPr>
+            <a:spLocks noGrp="1"/>
+          </p:cNvSpPr>
+          <p:nvPr>
+            <p:ph type="dt" sz="half" idx="10"/>
+          </p:nvPr>
+        </p:nvSpPr>
+        <p:spPr/>
+        <p:txBody>
+          <a:bodyPr/>
+          <a:lstStyle/>
+          <a:p>
+            <a:fld id="{6DB845E5-DACF-426C-8A10-A6438D29DD66}" type="datetime1">
               <a:rPr lang="de-DE" smtClean="0"/>
               <a:pPr/>
-              <a:t>05.08.2018</a:t>
+              <a:t>05.08.18</a:t>
             </a:fld>
             <a:endParaRPr lang="de-DE"/>
           </a:p>
@@ -18954,13 +19193,7 @@
       </p:sp>
       <p:sp>
         <p:nvSpPr>
-          <p:cNvPr id="4" name="Footer Placeholder 3">
-            <a:extLst>
-              <a:ext uri="{FF2B5EF4-FFF2-40B4-BE49-F238E27FC236}">
-                <a16:creationId xmlns:a16="http://schemas.microsoft.com/office/drawing/2014/main" id="{36CFC7C2-E6FE-9C49-8D63-01C2420DF4AF}"/>
-              </a:ext>
-            </a:extLst>
-          </p:cNvPr>
+          <p:cNvPr id="5" name="Fußzeilenplatzhalter 4"/>
           <p:cNvSpPr>
             <a:spLocks noGrp="1"/>
           </p:cNvSpPr>
@@ -18975,7 +19208,7 @@
           <a:p>
             <a:r>
               <a:rPr lang="de-DE"/>
-              <a:t>Time Series Analysis – Sommersemester 2018</a:t>
+              <a:t>Structural Equation Modelling – Wintersemester 2017/2018</a:t>
             </a:r>
             <a:endParaRPr lang="de-DE" dirty="0"/>
           </a:p>
@@ -18983,13 +19216,7 @@
       </p:sp>
       <p:sp>
         <p:nvSpPr>
-          <p:cNvPr id="5" name="Slide Number Placeholder 4">
-            <a:extLst>
-              <a:ext uri="{FF2B5EF4-FFF2-40B4-BE49-F238E27FC236}">
-                <a16:creationId xmlns:a16="http://schemas.microsoft.com/office/drawing/2014/main" id="{B85CF25C-E699-6D44-A5D6-AA445BF709F8}"/>
-              </a:ext>
-            </a:extLst>
-          </p:cNvPr>
+          <p:cNvPr id="6" name="Foliennummernplatzhalter 5"/>
           <p:cNvSpPr>
             <a:spLocks noGrp="1"/>
           </p:cNvSpPr>
@@ -19011,152 +19238,10 @@
           </a:p>
         </p:txBody>
       </p:sp>
-      <p:pic>
-        <p:nvPicPr>
-          <p:cNvPr id="9" name="Picture 8">
-            <a:extLst>
-              <a:ext uri="{FF2B5EF4-FFF2-40B4-BE49-F238E27FC236}">
-                <a16:creationId xmlns:a16="http://schemas.microsoft.com/office/drawing/2014/main" id="{E8FC95AB-256E-A749-AB9B-A5112FC33686}"/>
-              </a:ext>
-            </a:extLst>
-          </p:cNvPr>
-          <p:cNvPicPr>
-            <a:picLocks noChangeAspect="1"/>
-          </p:cNvPicPr>
-          <p:nvPr/>
-        </p:nvPicPr>
-        <p:blipFill>
-          <a:blip r:embed="rId2">
-            <a:extLst>
-              <a:ext uri="{28A0092B-C50C-407E-A947-70E740481C1C}">
-                <a14:useLocalDpi xmlns:a14="http://schemas.microsoft.com/office/drawing/2010/main" val="0"/>
-              </a:ext>
-            </a:extLst>
-          </a:blip>
-          <a:stretch>
-            <a:fillRect/>
-          </a:stretch>
-        </p:blipFill>
-        <p:spPr>
-          <a:xfrm>
-            <a:off x="539552" y="1059581"/>
-            <a:ext cx="5463965" cy="3445430"/>
-          </a:xfrm>
-          <a:prstGeom prst="rect">
-            <a:avLst/>
-          </a:prstGeom>
-        </p:spPr>
-      </p:pic>
-      <p:sp>
-        <p:nvSpPr>
-          <p:cNvPr id="11" name="TextBox 10">
-            <a:extLst>
-              <a:ext uri="{FF2B5EF4-FFF2-40B4-BE49-F238E27FC236}">
-                <a16:creationId xmlns:a16="http://schemas.microsoft.com/office/drawing/2014/main" id="{8AA6A156-7A53-BC41-9135-85BD263F5808}"/>
-              </a:ext>
-            </a:extLst>
-          </p:cNvPr>
-          <p:cNvSpPr txBox="1"/>
-          <p:nvPr/>
-        </p:nvSpPr>
-        <p:spPr>
-          <a:xfrm>
-            <a:off x="6606693" y="1551190"/>
-            <a:ext cx="2089033" cy="2462213"/>
-          </a:xfrm>
-          <a:prstGeom prst="rect">
-            <a:avLst/>
-          </a:prstGeom>
-          <a:noFill/>
-        </p:spPr>
-        <p:txBody>
-          <a:bodyPr wrap="none" rtlCol="0">
-            <a:spAutoFit/>
-          </a:bodyPr>
-          <a:lstStyle/>
-          <a:p>
-            <a:pPr fontAlgn="t"/>
-            <a:r>
-              <a:rPr lang="de-DE" sz="1400" dirty="0"/>
-              <a:t>         Series              Sigma</a:t>
-            </a:r>
-          </a:p>
-          <a:p>
-            <a:pPr fontAlgn="t"/>
-            <a:r>
-              <a:rPr lang="de-DE" sz="1400" dirty="0"/>
-              <a:t>T+1  -0.0008865   0.01662</a:t>
-            </a:r>
-          </a:p>
-          <a:p>
-            <a:pPr fontAlgn="t"/>
-            <a:r>
-              <a:rPr lang="de-DE" sz="1400" dirty="0"/>
-              <a:t>T+2  -0.0008865   0.01658</a:t>
-            </a:r>
-          </a:p>
-          <a:p>
-            <a:pPr fontAlgn="t"/>
-            <a:r>
-              <a:rPr lang="de-DE" sz="1400" dirty="0"/>
-              <a:t>T+3  -0.0008865   0.01655</a:t>
-            </a:r>
-          </a:p>
-          <a:p>
-            <a:pPr fontAlgn="t"/>
-            <a:r>
-              <a:rPr lang="de-DE" sz="1400" dirty="0"/>
-              <a:t>T+4  -0.0008865   0.01652</a:t>
-            </a:r>
-          </a:p>
-          <a:p>
-            <a:pPr fontAlgn="t"/>
-            <a:r>
-              <a:rPr lang="de-DE" sz="1400" dirty="0"/>
-              <a:t>T+5  -0.0008865   0.01648</a:t>
-            </a:r>
-          </a:p>
-          <a:p>
-            <a:pPr fontAlgn="t"/>
-            <a:r>
-              <a:rPr lang="de-DE" sz="1400" dirty="0"/>
-              <a:t>T+6  -0.0008865   0.01645</a:t>
-            </a:r>
-          </a:p>
-          <a:p>
-            <a:pPr fontAlgn="t"/>
-            <a:r>
-              <a:rPr lang="de-DE" sz="1400" dirty="0"/>
-              <a:t>T+7  -0.0008865   0.01642</a:t>
-            </a:r>
-          </a:p>
-          <a:p>
-            <a:pPr fontAlgn="t"/>
-            <a:r>
-              <a:rPr lang="de-DE" sz="1400" dirty="0"/>
-              <a:t>T+8  -0.0008865   0.01638</a:t>
-            </a:r>
-          </a:p>
-          <a:p>
-            <a:pPr fontAlgn="t"/>
-            <a:r>
-              <a:rPr lang="de-DE" sz="1400" dirty="0"/>
-              <a:t>T+9  -0.0008865   0.01635</a:t>
-            </a:r>
-          </a:p>
-          <a:p>
-            <a:pPr fontAlgn="t"/>
-            <a:r>
-              <a:rPr lang="de-DE" sz="1400" dirty="0"/>
-              <a:t>T+10 -0.0008865  0.01632</a:t>
-            </a:r>
-          </a:p>
-        </p:txBody>
-      </p:sp>
     </p:spTree>
     <p:extLst>
       <p:ext uri="{BB962C8B-B14F-4D97-AF65-F5344CB8AC3E}">
-        <p14:creationId xmlns:p14="http://schemas.microsoft.com/office/powerpoint/2010/main" val="3007730682"/>
+        <p14:creationId xmlns:p14="http://schemas.microsoft.com/office/powerpoint/2010/main" val="2137650087"/>
       </p:ext>
     </p:extLst>
   </p:cSld>
@@ -19200,7 +19285,7 @@
           <a:p>
             <a:r>
               <a:rPr lang="de-DE" dirty="0"/>
-              <a:t>Resümee</a:t>
+              <a:t>Literatur</a:t>
             </a:r>
           </a:p>
         </p:txBody>
@@ -19221,51 +19306,176 @@
           <a:lstStyle/>
           <a:p>
             <a:r>
-              <a:rPr lang="de-DE" dirty="0" smtClean="0"/>
-              <a:t>ARCH &amp; GARCH-Prozesse wichtig bei der Modellierung von Prozessen mit Volatilitätsschwankungen</a:t>
-            </a:r>
-          </a:p>
-          <a:p>
-            <a:r>
-              <a:rPr lang="de-DE" dirty="0" smtClean="0"/>
-              <a:t>ARCH-Prozesse identifizierbar anhand der PACF der quadrierten Daten (AR-Modell)</a:t>
-            </a:r>
-          </a:p>
-          <a:p>
-            <a:r>
-              <a:rPr lang="de-DE" dirty="0" smtClean="0"/>
-              <a:t>Identifizierung von GARCH-Prozessen schwierig (Verwechselbarkeit mit ARCH-Prozessen hohen Grades)</a:t>
-            </a:r>
-          </a:p>
-          <a:p>
-            <a:r>
-              <a:rPr lang="de-DE" dirty="0" smtClean="0"/>
-              <a:t>BIC als Kriterium für Model </a:t>
-            </a:r>
-            <a:r>
-              <a:rPr lang="de-DE" dirty="0" err="1" smtClean="0"/>
-              <a:t>Selection</a:t>
-            </a:r>
-            <a:r>
-              <a:rPr lang="de-DE" dirty="0" smtClean="0"/>
-              <a:t> für große N zur Auswahl des korrekten Modells sinnvoll (asymptotisch konsistent)</a:t>
-            </a:r>
-            <a:endParaRPr lang="de-DE" dirty="0" smtClean="0"/>
-          </a:p>
-          <a:p>
-            <a:r>
-              <a:rPr lang="de-DE" dirty="0" smtClean="0"/>
-              <a:t>GARCH-Modellierung zur Vorhersage von </a:t>
+              <a:rPr lang="de-DE" dirty="0" err="1"/>
+              <a:t>Mazzoni</a:t>
             </a:r>
             <a:r>
               <a:rPr lang="de-DE" dirty="0"/>
-              <a:t>Volatilitätsschwankungen</a:t>
-            </a:r>
-            <a:r>
-              <a:rPr lang="de-DE" dirty="0" smtClean="0"/>
-              <a:t> bei Zeitreihen im Finanzbereich </a:t>
-            </a:r>
-            <a:endParaRPr lang="de-DE" dirty="0"/>
+              <a:t>, Thomas: </a:t>
+            </a:r>
+            <a:br>
+              <a:rPr lang="de-DE" dirty="0"/>
+            </a:br>
+            <a:r>
+              <a:rPr lang="de-DE" sz="1400" dirty="0">
+                <a:solidFill>
+                  <a:schemeClr val="tx1">
+                    <a:lumMod val="75000"/>
+                    <a:lumOff val="25000"/>
+                  </a:schemeClr>
+                </a:solidFill>
+              </a:rPr>
+              <a:t>Zeitreihenanalyse</a:t>
+            </a:r>
+            <a:br>
+              <a:rPr lang="de-DE" sz="1400" dirty="0">
+                <a:solidFill>
+                  <a:schemeClr val="tx1">
+                    <a:lumMod val="75000"/>
+                    <a:lumOff val="25000"/>
+                  </a:schemeClr>
+                </a:solidFill>
+              </a:rPr>
+            </a:br>
+            <a:r>
+              <a:rPr lang="de-DE" sz="1400" dirty="0">
+                <a:solidFill>
+                  <a:schemeClr val="tx1">
+                    <a:lumMod val="75000"/>
+                    <a:lumOff val="25000"/>
+                  </a:schemeClr>
+                </a:solidFill>
+              </a:rPr>
+              <a:t>2010</a:t>
+            </a:r>
+          </a:p>
+          <a:p>
+            <a:r>
+              <a:rPr lang="de-DE" dirty="0"/>
+              <a:t>Zucchini, W., </a:t>
+            </a:r>
+            <a:r>
+              <a:rPr lang="de-DE" dirty="0" err="1"/>
+              <a:t>Nenadic</a:t>
+            </a:r>
+            <a:r>
+              <a:rPr lang="de-DE" dirty="0"/>
+              <a:t>, O., Schlegel, A.:</a:t>
+            </a:r>
+            <a:br>
+              <a:rPr lang="de-DE" sz="1400" dirty="0">
+                <a:solidFill>
+                  <a:schemeClr val="tx1">
+                    <a:lumMod val="75000"/>
+                    <a:lumOff val="25000"/>
+                  </a:schemeClr>
+                </a:solidFill>
+              </a:rPr>
+            </a:br>
+            <a:r>
+              <a:rPr lang="de-DE" sz="1400" dirty="0">
+                <a:solidFill>
+                  <a:schemeClr val="tx1">
+                    <a:lumMod val="75000"/>
+                    <a:lumOff val="25000"/>
+                  </a:schemeClr>
+                </a:solidFill>
+              </a:rPr>
+              <a:t>Zeitreihenanalyse – Nichtlineare Zeitreihenmodelle</a:t>
+            </a:r>
+          </a:p>
+          <a:p>
+            <a:pPr marL="0" indent="0">
+              <a:buNone/>
+            </a:pPr>
+            <a:r>
+              <a:rPr lang="de-DE" sz="1400" dirty="0">
+                <a:solidFill>
+                  <a:schemeClr val="tx1">
+                    <a:lumMod val="75000"/>
+                    <a:lumOff val="25000"/>
+                  </a:schemeClr>
+                </a:solidFill>
+              </a:rPr>
+              <a:t>       2009</a:t>
+            </a:r>
+          </a:p>
+          <a:p>
+            <a:r>
+              <a:rPr lang="de-DE" sz="1400" dirty="0" err="1"/>
+              <a:t>Wuertz</a:t>
+            </a:r>
+            <a:r>
+              <a:rPr lang="de-DE" sz="1400" dirty="0"/>
+              <a:t>, D. et. al.:</a:t>
+            </a:r>
+            <a:br>
+              <a:rPr lang="de-DE" sz="1400" dirty="0"/>
+            </a:br>
+            <a:r>
+              <a:rPr lang="de-DE" sz="1400" dirty="0">
+                <a:solidFill>
+                  <a:schemeClr val="tx1">
+                    <a:lumMod val="75000"/>
+                    <a:lumOff val="25000"/>
+                  </a:schemeClr>
+                </a:solidFill>
+              </a:rPr>
+              <a:t>Package „</a:t>
+            </a:r>
+            <a:r>
+              <a:rPr lang="de-DE" sz="1400" dirty="0" err="1">
+                <a:solidFill>
+                  <a:schemeClr val="tx1">
+                    <a:lumMod val="75000"/>
+                    <a:lumOff val="25000"/>
+                  </a:schemeClr>
+                </a:solidFill>
+              </a:rPr>
+              <a:t>fGarch</a:t>
+            </a:r>
+            <a:r>
+              <a:rPr lang="de-DE" sz="1400" dirty="0">
+                <a:solidFill>
+                  <a:schemeClr val="tx1">
+                    <a:lumMod val="75000"/>
+                    <a:lumOff val="25000"/>
+                  </a:schemeClr>
+                </a:solidFill>
+              </a:rPr>
+              <a:t>“</a:t>
+            </a:r>
+            <a:br>
+              <a:rPr lang="de-DE" sz="1400" dirty="0">
+                <a:solidFill>
+                  <a:schemeClr val="tx1">
+                    <a:lumMod val="75000"/>
+                    <a:lumOff val="25000"/>
+                  </a:schemeClr>
+                </a:solidFill>
+              </a:rPr>
+            </a:br>
+            <a:r>
+              <a:rPr lang="de-DE" sz="1400" dirty="0">
+                <a:solidFill>
+                  <a:schemeClr val="tx1">
+                    <a:lumMod val="75000"/>
+                    <a:lumOff val="25000"/>
+                  </a:schemeClr>
+                </a:solidFill>
+              </a:rPr>
+              <a:t>2017</a:t>
+            </a:r>
+          </a:p>
+          <a:p>
+            <a:endParaRPr lang="de-DE" sz="1400" dirty="0">
+              <a:solidFill>
+                <a:schemeClr val="tx1">
+                  <a:lumMod val="75000"/>
+                  <a:lumOff val="25000"/>
+                </a:schemeClr>
+              </a:solidFill>
+            </a:endParaRPr>
           </a:p>
         </p:txBody>
       </p:sp>
@@ -19287,7 +19497,7 @@
             <a:fld id="{6DB845E5-DACF-426C-8A10-A6438D29DD66}" type="datetime1">
               <a:rPr lang="de-DE" smtClean="0"/>
               <a:pPr/>
-              <a:t>05.08.2018</a:t>
+              <a:t>05.08.18</a:t>
             </a:fld>
             <a:endParaRPr lang="de-DE"/>
           </a:p>
@@ -19309,10 +19519,9 @@
           <a:lstStyle/>
           <a:p>
             <a:r>
-              <a:rPr lang="de-DE"/>
-              <a:t>Structural Equation Modelling – Wintersemester 2017/2018</a:t>
-            </a:r>
-            <a:endParaRPr lang="de-DE" dirty="0"/>
+              <a:rPr lang="de-DE" dirty="0"/>
+              <a:t>Time Series Analysis– Sommersemester 2018</a:t>
+            </a:r>
           </a:p>
         </p:txBody>
       </p:sp>
@@ -19343,7 +19552,7 @@
     </p:spTree>
     <p:extLst>
       <p:ext uri="{BB962C8B-B14F-4D97-AF65-F5344CB8AC3E}">
-        <p14:creationId xmlns:p14="http://schemas.microsoft.com/office/powerpoint/2010/main" val="2137650087"/>
+        <p14:creationId xmlns:p14="http://schemas.microsoft.com/office/powerpoint/2010/main" val="430762112"/>
       </p:ext>
     </p:extLst>
   </p:cSld>
@@ -19387,19 +19596,19 @@
           <a:p>
             <a:r>
               <a:rPr lang="de-DE" dirty="0"/>
-              <a:t>Literatur</a:t>
-            </a:r>
-          </a:p>
-        </p:txBody>
-      </p:sp>
-      <p:sp>
-        <p:nvSpPr>
-          <p:cNvPr id="3" name="Inhaltsplatzhalter 2"/>
-          <p:cNvSpPr>
-            <a:spLocks noGrp="1"/>
-          </p:cNvSpPr>
-          <p:nvPr>
-            <p:ph idx="1"/>
+              <a:t>Vielen Dank für Ihre Aufmerksamkeit.</a:t>
+            </a:r>
+          </a:p>
+        </p:txBody>
+      </p:sp>
+      <p:sp>
+        <p:nvSpPr>
+          <p:cNvPr id="3" name="Datumsplatzhalter 2"/>
+          <p:cNvSpPr>
+            <a:spLocks noGrp="1"/>
+          </p:cNvSpPr>
+          <p:nvPr>
+            <p:ph type="dt" sz="half" idx="10"/>
           </p:nvPr>
         </p:nvSpPr>
         <p:spPr/>
@@ -19407,199 +19616,23 @@
           <a:bodyPr/>
           <a:lstStyle/>
           <a:p>
-            <a:r>
-              <a:rPr lang="de-DE" dirty="0" err="1"/>
-              <a:t>Mazzoni</a:t>
-            </a:r>
-            <a:r>
-              <a:rPr lang="de-DE" dirty="0"/>
-              <a:t>, Thomas: </a:t>
-            </a:r>
-            <a:br>
-              <a:rPr lang="de-DE" dirty="0"/>
-            </a:br>
-            <a:r>
-              <a:rPr lang="de-DE" sz="1400" dirty="0">
-                <a:solidFill>
-                  <a:schemeClr val="tx1">
-                    <a:lumMod val="75000"/>
-                    <a:lumOff val="25000"/>
-                  </a:schemeClr>
-                </a:solidFill>
-              </a:rPr>
-              <a:t>Zeitreihenanalyse</a:t>
-            </a:r>
-            <a:br>
-              <a:rPr lang="de-DE" sz="1400" dirty="0">
-                <a:solidFill>
-                  <a:schemeClr val="tx1">
-                    <a:lumMod val="75000"/>
-                    <a:lumOff val="25000"/>
-                  </a:schemeClr>
-                </a:solidFill>
-              </a:rPr>
-            </a:br>
-            <a:r>
-              <a:rPr lang="de-DE" sz="1400" dirty="0">
-                <a:solidFill>
-                  <a:schemeClr val="tx1">
-                    <a:lumMod val="75000"/>
-                    <a:lumOff val="25000"/>
-                  </a:schemeClr>
-                </a:solidFill>
-              </a:rPr>
-              <a:t>2010</a:t>
-            </a:r>
-          </a:p>
-          <a:p>
-            <a:r>
-              <a:rPr lang="de-DE" dirty="0"/>
-              <a:t>Zucchini, W., </a:t>
-            </a:r>
-            <a:r>
-              <a:rPr lang="de-DE" dirty="0" err="1"/>
-              <a:t>Nenadic</a:t>
-            </a:r>
-            <a:r>
-              <a:rPr lang="de-DE" dirty="0"/>
-              <a:t>, O., Schlegel, A.:</a:t>
-            </a:r>
-            <a:r>
-              <a:rPr lang="de-DE" sz="1400" dirty="0">
-                <a:solidFill>
-                  <a:schemeClr val="tx1">
-                    <a:lumMod val="75000"/>
-                    <a:lumOff val="25000"/>
-                  </a:schemeClr>
-                </a:solidFill>
-              </a:rPr>
-              <a:t/>
-            </a:r>
-            <a:br>
-              <a:rPr lang="de-DE" sz="1400" dirty="0">
-                <a:solidFill>
-                  <a:schemeClr val="tx1">
-                    <a:lumMod val="75000"/>
-                    <a:lumOff val="25000"/>
-                  </a:schemeClr>
-                </a:solidFill>
-              </a:rPr>
-            </a:br>
-            <a:r>
-              <a:rPr lang="de-DE" sz="1400" dirty="0">
-                <a:solidFill>
-                  <a:schemeClr val="tx1">
-                    <a:lumMod val="75000"/>
-                    <a:lumOff val="25000"/>
-                  </a:schemeClr>
-                </a:solidFill>
-              </a:rPr>
-              <a:t>Zeitreihenanalyse – Nichtlineare Zeitreihenmodelle</a:t>
-            </a:r>
-          </a:p>
-          <a:p>
-            <a:pPr marL="0" indent="0">
-              <a:buNone/>
-            </a:pPr>
-            <a:r>
-              <a:rPr lang="de-DE" sz="1400" dirty="0">
-                <a:solidFill>
-                  <a:schemeClr val="tx1">
-                    <a:lumMod val="75000"/>
-                    <a:lumOff val="25000"/>
-                  </a:schemeClr>
-                </a:solidFill>
-              </a:rPr>
-              <a:t>       2009</a:t>
-            </a:r>
-          </a:p>
-          <a:p>
-            <a:r>
-              <a:rPr lang="de-DE" sz="1400" dirty="0" err="1"/>
-              <a:t>Wuertz</a:t>
-            </a:r>
-            <a:r>
-              <a:rPr lang="de-DE" sz="1400" dirty="0"/>
-              <a:t>, D. et. al.:</a:t>
-            </a:r>
-            <a:br>
-              <a:rPr lang="de-DE" sz="1400" dirty="0"/>
-            </a:br>
-            <a:r>
-              <a:rPr lang="de-DE" sz="1400" dirty="0">
-                <a:solidFill>
-                  <a:schemeClr val="tx1">
-                    <a:lumMod val="75000"/>
-                    <a:lumOff val="25000"/>
-                  </a:schemeClr>
-                </a:solidFill>
-              </a:rPr>
-              <a:t>Package „</a:t>
-            </a:r>
-            <a:r>
-              <a:rPr lang="de-DE" sz="1400" dirty="0" err="1">
-                <a:solidFill>
-                  <a:schemeClr val="tx1">
-                    <a:lumMod val="75000"/>
-                    <a:lumOff val="25000"/>
-                  </a:schemeClr>
-                </a:solidFill>
-              </a:rPr>
-              <a:t>fGarch</a:t>
-            </a:r>
-            <a:r>
-              <a:rPr lang="de-DE" sz="1400" dirty="0">
-                <a:solidFill>
-                  <a:schemeClr val="tx1">
-                    <a:lumMod val="75000"/>
-                    <a:lumOff val="25000"/>
-                  </a:schemeClr>
-                </a:solidFill>
-              </a:rPr>
-              <a:t>“</a:t>
-            </a:r>
-            <a:br>
-              <a:rPr lang="de-DE" sz="1400" dirty="0">
-                <a:solidFill>
-                  <a:schemeClr val="tx1">
-                    <a:lumMod val="75000"/>
-                    <a:lumOff val="25000"/>
-                  </a:schemeClr>
-                </a:solidFill>
-              </a:rPr>
-            </a:br>
-            <a:r>
-              <a:rPr lang="de-DE" sz="1400" dirty="0">
-                <a:solidFill>
-                  <a:schemeClr val="tx1">
-                    <a:lumMod val="75000"/>
-                    <a:lumOff val="25000"/>
-                  </a:schemeClr>
-                </a:solidFill>
-              </a:rPr>
-              <a:t>2017</a:t>
-            </a:r>
-          </a:p>
-          <a:p>
-            <a:endParaRPr lang="de-DE" sz="1400" dirty="0">
-              <a:solidFill>
-                <a:schemeClr val="tx1">
-                  <a:lumMod val="75000"/>
-                  <a:lumOff val="25000"/>
-                </a:schemeClr>
-              </a:solidFill>
-            </a:endParaRPr>
-          </a:p>
-        </p:txBody>
-      </p:sp>
-      <p:sp>
-        <p:nvSpPr>
-          <p:cNvPr id="4" name="Datumsplatzhalter 3"/>
-          <p:cNvSpPr>
-            <a:spLocks noGrp="1"/>
-          </p:cNvSpPr>
-          <p:nvPr>
-            <p:ph type="dt" sz="half" idx="10"/>
+            <a:fld id="{19A0FC43-5E73-44C2-BFDB-9FAD1E8FED0E}" type="datetime1">
+              <a:rPr lang="de-DE" smtClean="0"/>
+              <a:pPr/>
+              <a:t>05.08.18</a:t>
+            </a:fld>
+            <a:endParaRPr lang="de-DE"/>
+          </a:p>
+        </p:txBody>
+      </p:sp>
+      <p:sp>
+        <p:nvSpPr>
+          <p:cNvPr id="4" name="Fußzeilenplatzhalter 3"/>
+          <p:cNvSpPr>
+            <a:spLocks noGrp="1"/>
+          </p:cNvSpPr>
+          <p:nvPr>
+            <p:ph type="ftr" sz="quarter" idx="11"/>
           </p:nvPr>
         </p:nvSpPr>
         <p:spPr/>
@@ -19607,40 +19640,17 @@
           <a:bodyPr/>
           <a:lstStyle/>
           <a:p>
-            <a:fld id="{6DB845E5-DACF-426C-8A10-A6438D29DD66}" type="datetime1">
-              <a:rPr lang="de-DE" smtClean="0"/>
-              <a:pPr/>
-              <a:t>05.08.2018</a:t>
-            </a:fld>
-            <a:endParaRPr lang="de-DE"/>
-          </a:p>
-        </p:txBody>
-      </p:sp>
-      <p:sp>
-        <p:nvSpPr>
-          <p:cNvPr id="5" name="Fußzeilenplatzhalter 4"/>
-          <p:cNvSpPr>
-            <a:spLocks noGrp="1"/>
-          </p:cNvSpPr>
-          <p:nvPr>
-            <p:ph type="ftr" sz="quarter" idx="11"/>
-          </p:nvPr>
-        </p:nvSpPr>
-        <p:spPr/>
-        <p:txBody>
-          <a:bodyPr/>
-          <a:lstStyle/>
-          <a:p>
-            <a:r>
-              <a:rPr lang="de-DE" dirty="0"/>
-              <a:t>Time Series Analysis– Sommersemester 2018</a:t>
-            </a:r>
-          </a:p>
-        </p:txBody>
-      </p:sp>
-      <p:sp>
-        <p:nvSpPr>
-          <p:cNvPr id="6" name="Foliennummernplatzhalter 5"/>
+            <a:r>
+              <a:rPr lang="de-DE"/>
+              <a:t>Structural Equation Modelling – Wintersemester 2017/2018</a:t>
+            </a:r>
+            <a:endParaRPr lang="de-DE" dirty="0"/>
+          </a:p>
+        </p:txBody>
+      </p:sp>
+      <p:sp>
+        <p:nvSpPr>
+          <p:cNvPr id="5" name="Foliennummernplatzhalter 4"/>
           <p:cNvSpPr>
             <a:spLocks noGrp="1"/>
           </p:cNvSpPr>
@@ -19657,129 +19667,6 @@
               <a:rPr lang="de-DE" smtClean="0"/>
               <a:pPr/>
               <a:t>23</a:t>
-            </a:fld>
-            <a:endParaRPr lang="de-DE"/>
-          </a:p>
-        </p:txBody>
-      </p:sp>
-    </p:spTree>
-    <p:extLst>
-      <p:ext uri="{BB962C8B-B14F-4D97-AF65-F5344CB8AC3E}">
-        <p14:creationId xmlns:p14="http://schemas.microsoft.com/office/powerpoint/2010/main" val="430762112"/>
-      </p:ext>
-    </p:extLst>
-  </p:cSld>
-  <p:clrMapOvr>
-    <a:masterClrMapping/>
-  </p:clrMapOvr>
-</p:sld>
-</file>
-
-<file path=ppt/slides/slide24.xml><?xml version="1.0" encoding="utf-8"?>
-<p:sld xmlns:a="http://schemas.openxmlformats.org/drawingml/2006/main" xmlns:r="http://schemas.openxmlformats.org/officeDocument/2006/relationships" xmlns:p="http://schemas.openxmlformats.org/presentationml/2006/main">
-  <p:cSld>
-    <p:spTree>
-      <p:nvGrpSpPr>
-        <p:cNvPr id="1" name=""/>
-        <p:cNvGrpSpPr/>
-        <p:nvPr/>
-      </p:nvGrpSpPr>
-      <p:grpSpPr>
-        <a:xfrm>
-          <a:off x="0" y="0"/>
-          <a:ext cx="0" cy="0"/>
-          <a:chOff x="0" y="0"/>
-          <a:chExt cx="0" cy="0"/>
-        </a:xfrm>
-      </p:grpSpPr>
-      <p:sp>
-        <p:nvSpPr>
-          <p:cNvPr id="2" name="Titel 1"/>
-          <p:cNvSpPr>
-            <a:spLocks noGrp="1"/>
-          </p:cNvSpPr>
-          <p:nvPr>
-            <p:ph type="title"/>
-          </p:nvPr>
-        </p:nvSpPr>
-        <p:spPr/>
-        <p:txBody>
-          <a:bodyPr/>
-          <a:lstStyle/>
-          <a:p>
-            <a:r>
-              <a:rPr lang="de-DE" dirty="0"/>
-              <a:t>Vielen Dank für Ihre Aufmerksamkeit.</a:t>
-            </a:r>
-          </a:p>
-        </p:txBody>
-      </p:sp>
-      <p:sp>
-        <p:nvSpPr>
-          <p:cNvPr id="3" name="Datumsplatzhalter 2"/>
-          <p:cNvSpPr>
-            <a:spLocks noGrp="1"/>
-          </p:cNvSpPr>
-          <p:nvPr>
-            <p:ph type="dt" sz="half" idx="10"/>
-          </p:nvPr>
-        </p:nvSpPr>
-        <p:spPr/>
-        <p:txBody>
-          <a:bodyPr/>
-          <a:lstStyle/>
-          <a:p>
-            <a:fld id="{19A0FC43-5E73-44C2-BFDB-9FAD1E8FED0E}" type="datetime1">
-              <a:rPr lang="de-DE" smtClean="0"/>
-              <a:pPr/>
-              <a:t>05.08.2018</a:t>
-            </a:fld>
-            <a:endParaRPr lang="de-DE"/>
-          </a:p>
-        </p:txBody>
-      </p:sp>
-      <p:sp>
-        <p:nvSpPr>
-          <p:cNvPr id="4" name="Fußzeilenplatzhalter 3"/>
-          <p:cNvSpPr>
-            <a:spLocks noGrp="1"/>
-          </p:cNvSpPr>
-          <p:nvPr>
-            <p:ph type="ftr" sz="quarter" idx="11"/>
-          </p:nvPr>
-        </p:nvSpPr>
-        <p:spPr/>
-        <p:txBody>
-          <a:bodyPr/>
-          <a:lstStyle/>
-          <a:p>
-            <a:r>
-              <a:rPr lang="de-DE"/>
-              <a:t>Structural Equation Modelling – Wintersemester 2017/2018</a:t>
-            </a:r>
-            <a:endParaRPr lang="de-DE" dirty="0"/>
-          </a:p>
-        </p:txBody>
-      </p:sp>
-      <p:sp>
-        <p:nvSpPr>
-          <p:cNvPr id="5" name="Foliennummernplatzhalter 4"/>
-          <p:cNvSpPr>
-            <a:spLocks noGrp="1"/>
-          </p:cNvSpPr>
-          <p:nvPr>
-            <p:ph type="sldNum" sz="quarter" idx="12"/>
-          </p:nvPr>
-        </p:nvSpPr>
-        <p:spPr/>
-        <p:txBody>
-          <a:bodyPr/>
-          <a:lstStyle/>
-          <a:p>
-            <a:fld id="{015363AA-F6CB-4A58-B5AD-B2CDFEAF0813}" type="slidenum">
-              <a:rPr lang="de-DE" smtClean="0"/>
-              <a:pPr/>
-              <a:t>24</a:t>
             </a:fld>
             <a:endParaRPr lang="de-DE"/>
           </a:p>
@@ -19991,7 +19878,7 @@
             <a:fld id="{6DB845E5-DACF-426C-8A10-A6438D29DD66}" type="datetime1">
               <a:rPr lang="de-DE" smtClean="0"/>
               <a:pPr/>
-              <a:t>05.08.2018</a:t>
+              <a:t>05.08.18</a:t>
             </a:fld>
             <a:endParaRPr lang="de-DE"/>
           </a:p>
@@ -20168,7 +20055,7 @@
             <a:fld id="{6DB845E5-DACF-426C-8A10-A6438D29DD66}" type="datetime1">
               <a:rPr lang="de-DE" smtClean="0"/>
               <a:pPr/>
-              <a:t>05.08.2018</a:t>
+              <a:t>05.08.18</a:t>
             </a:fld>
             <a:endParaRPr lang="de-DE"/>
           </a:p>
@@ -20377,7 +20264,7 @@
             <a:fld id="{6DB845E5-DACF-426C-8A10-A6438D29DD66}" type="datetime1">
               <a:rPr lang="de-DE" smtClean="0"/>
               <a:pPr/>
-              <a:t>05.08.2018</a:t>
+              <a:t>05.08.18</a:t>
             </a:fld>
             <a:endParaRPr lang="de-DE"/>
           </a:p>
@@ -20487,14 +20374,6 @@
   <p:clrMapOvr>
     <a:masterClrMapping/>
   </p:clrMapOvr>
-  <mc:AlternateContent xmlns:mc="http://schemas.openxmlformats.org/markup-compatibility/2006">
-    <mc:Choice xmlns:p14="http://schemas.microsoft.com/office/powerpoint/2010/main" Requires="p14">
-      <p:transition spd="slow" p14:dur="2000"/>
-    </mc:Choice>
-    <mc:Fallback>
-      <p:transition spd="slow"/>
-    </mc:Fallback>
-  </mc:AlternateContent>
 </p:sld>
 </file>
 
@@ -20691,7 +20570,7 @@
             <a:fld id="{6DB845E5-DACF-426C-8A10-A6438D29DD66}" type="datetime1">
               <a:rPr lang="de-DE" smtClean="0"/>
               <a:pPr/>
-              <a:t>05.08.2018</a:t>
+              <a:t>05.08.18</a:t>
             </a:fld>
             <a:endParaRPr lang="de-DE"/>
           </a:p>
@@ -20984,7 +20863,7 @@
             <a:fld id="{6DB845E5-DACF-426C-8A10-A6438D29DD66}" type="datetime1">
               <a:rPr lang="de-DE" smtClean="0"/>
               <a:pPr/>
-              <a:t>05.08.2018</a:t>
+              <a:t>05.08.18</a:t>
             </a:fld>
             <a:endParaRPr lang="de-DE"/>
           </a:p>
@@ -21148,7 +21027,7 @@
             <a:fld id="{12CE0ACD-0B71-463F-9507-4095300257BC}" type="datetime1">
               <a:rPr lang="de-DE" smtClean="0"/>
               <a:pPr/>
-              <a:t>05.08.2018</a:t>
+              <a:t>05.08.18</a:t>
             </a:fld>
             <a:endParaRPr lang="de-DE"/>
           </a:p>
@@ -21966,22 +21845,13 @@
               <a:t> </a:t>
             </a:r>
             <a:r>
-              <a:rPr lang="de-DE" sz="1400" dirty="0" err="1" smtClean="0"/>
+              <a:rPr lang="de-DE" sz="1400" dirty="0" err="1"/>
               <a:t>highest</a:t>
             </a:r>
             <a:r>
               <a:rPr lang="de-DE" sz="1400" dirty="0"/>
-              <a:t> </a:t>
-            </a:r>
-            <a:r>
-              <a:rPr lang="de-DE" sz="1400" dirty="0"/>
-              <a:t>B</a:t>
-            </a:r>
-            <a:r>
-              <a:rPr lang="de-DE" sz="1400" dirty="0" smtClean="0"/>
-              <a:t>IC</a:t>
-            </a:r>
-            <a:endParaRPr lang="de-DE" sz="1400" dirty="0"/>
+              <a:t> BIC</a:t>
+            </a:r>
           </a:p>
           <a:p>
             <a:endParaRPr lang="de-DE" dirty="0"/>
@@ -22328,8 +22198,8 @@
           </a:p>
         </p:txBody>
       </p:sp>
-      <mc:AlternateContent xmlns:mc="http://schemas.openxmlformats.org/markup-compatibility/2006">
-        <mc:Choice xmlns:a14="http://schemas.microsoft.com/office/drawing/2010/main" Requires="a14">
+      <mc:AlternateContent xmlns:mc="http://schemas.openxmlformats.org/markup-compatibility/2006" xmlns:a14="http://schemas.microsoft.com/office/drawing/2010/main">
+        <mc:Choice Requires="a14">
           <p:sp>
             <p:nvSpPr>
               <p:cNvPr id="3" name="Inhaltsplatzhalter 2"/>
@@ -23106,19 +22976,7 @@
                   <a:rPr lang="de-DE" dirty="0">
                     <a:sym typeface="Wingdings" panose="05000000000000000000" pitchFamily="2" charset="2"/>
                   </a:rPr>
-                  <a:t>Benutztes Kriterium: Kleinster </a:t>
-                </a:r>
-                <a:r>
-                  <a:rPr lang="de-DE" dirty="0" smtClean="0">
-                    <a:sym typeface="Wingdings" panose="05000000000000000000" pitchFamily="2" charset="2"/>
-                  </a:rPr>
-                  <a:t>BIC Wert (asymptotisch konsistent) </a:t>
-                </a:r>
-                <a:r>
-                  <a:rPr lang="de-DE" dirty="0">
-                    <a:sym typeface="Wingdings" panose="05000000000000000000" pitchFamily="2" charset="2"/>
-                  </a:rPr>
-                  <a:t> Best fit</a:t>
+                  <a:t>Benutztes Kriterium: Kleinster BIC Wert (asymptotisch konsistent)  Best fit</a:t>
                 </a:r>
                 <a:endParaRPr lang="de-DE" b="0" dirty="0">
                   <a:sym typeface="Wingdings" panose="05000000000000000000" pitchFamily="2" charset="2"/>
@@ -23198,7 +23056,7 @@
             </p:txBody>
           </p:sp>
         </mc:Choice>
-        <mc:Fallback>
+        <mc:Fallback xmlns="">
           <p:sp>
             <p:nvSpPr>
               <p:cNvPr id="3" name="Inhaltsplatzhalter 2"/>
@@ -23254,7 +23112,7 @@
             <a:fld id="{6DB845E5-DACF-426C-8A10-A6438D29DD66}" type="datetime1">
               <a:rPr lang="de-DE" smtClean="0"/>
               <a:pPr/>
-              <a:t>05.08.2018</a:t>
+              <a:t>05.08.18</a:t>
             </a:fld>
             <a:endParaRPr lang="de-DE"/>
           </a:p>

</xml_diff>

<commit_message>
add pacf to dax data
</commit_message>
<xml_diff>
--- a/presentation/tsa_presentation_final.pptx
+++ b/presentation/tsa_presentation_final.pptx
@@ -248,7 +248,7 @@
             <a:fld id="{8A7CD7E6-D14C-4ECF-BE72-9282675AAFCC}" type="datetimeFigureOut">
               <a:rPr lang="de-DE" smtClean="0"/>
               <a:pPr/>
-              <a:t>05.08.18</a:t>
+              <a:t>06.08.18</a:t>
             </a:fld>
             <a:endParaRPr lang="de-DE"/>
           </a:p>
@@ -415,7 +415,7 @@
             <a:fld id="{9DEF7BA6-6945-4979-A31E-1F3FA0D91DC4}" type="datetimeFigureOut">
               <a:rPr lang="de-DE" smtClean="0"/>
               <a:pPr/>
-              <a:t>05.08.18</a:t>
+              <a:t>06.08.18</a:t>
             </a:fld>
             <a:endParaRPr lang="de-DE"/>
           </a:p>
@@ -3186,7 +3186,7 @@
             <a:fld id="{C6F490E5-6BD8-4297-ACA2-2AC87192B70F}" type="datetime1">
               <a:rPr lang="de-DE" smtClean="0"/>
               <a:pPr/>
-              <a:t>05.08.18</a:t>
+              <a:t>06.08.18</a:t>
             </a:fld>
             <a:endParaRPr lang="de-DE"/>
           </a:p>
@@ -3486,7 +3486,7 @@
             <a:fld id="{18321833-73FA-4B7B-8368-585F78905B8E}" type="datetime1">
               <a:rPr lang="de-DE" smtClean="0"/>
               <a:pPr/>
-              <a:t>05.08.18</a:t>
+              <a:t>06.08.18</a:t>
             </a:fld>
             <a:endParaRPr lang="de-DE"/>
           </a:p>
@@ -3603,7 +3603,7 @@
             <a:fld id="{3E1C52E8-7F49-4B86-AEB2-23BC7104D5B2}" type="datetime1">
               <a:rPr lang="de-DE" smtClean="0"/>
               <a:pPr/>
-              <a:t>05.08.18</a:t>
+              <a:t>06.08.18</a:t>
             </a:fld>
             <a:endParaRPr lang="de-DE"/>
           </a:p>
@@ -3867,7 +3867,7 @@
             <a:fld id="{3E1C52E8-7F49-4B86-AEB2-23BC7104D5B2}" type="datetime1">
               <a:rPr lang="de-DE" smtClean="0"/>
               <a:pPr/>
-              <a:t>05.08.18</a:t>
+              <a:t>06.08.18</a:t>
             </a:fld>
             <a:endParaRPr lang="de-DE"/>
           </a:p>
@@ -4569,7 +4569,7 @@
             <a:fld id="{DA5DE712-6C0E-4DF7-B336-AC97213DC93D}" type="datetime1">
               <a:rPr lang="de-DE" smtClean="0"/>
               <a:pPr/>
-              <a:t>05.08.18</a:t>
+              <a:t>06.08.18</a:t>
             </a:fld>
             <a:endParaRPr lang="de-DE"/>
           </a:p>
@@ -5132,7 +5132,7 @@
             <a:fld id="{DA5DE712-6C0E-4DF7-B336-AC97213DC93D}" type="datetime1">
               <a:rPr lang="de-DE" smtClean="0"/>
               <a:pPr/>
-              <a:t>05.08.18</a:t>
+              <a:t>06.08.18</a:t>
             </a:fld>
             <a:endParaRPr lang="de-DE"/>
           </a:p>
@@ -5435,7 +5435,7 @@
             <a:fld id="{19A0FC43-5E73-44C2-BFDB-9FAD1E8FED0E}" type="datetime1">
               <a:rPr lang="de-DE" smtClean="0"/>
               <a:pPr/>
-              <a:t>05.08.18</a:t>
+              <a:t>06.08.18</a:t>
             </a:fld>
             <a:endParaRPr lang="de-DE"/>
           </a:p>
@@ -5712,7 +5712,7 @@
             <a:fld id="{065E8A4D-8D16-457C-AFD8-844AF28C1B14}" type="datetime1">
               <a:rPr lang="de-DE" smtClean="0"/>
               <a:pPr/>
-              <a:t>05.08.18</a:t>
+              <a:t>06.08.18</a:t>
             </a:fld>
             <a:endParaRPr lang="de-DE"/>
           </a:p>
@@ -5914,7 +5914,7 @@
             <a:fld id="{6DB845E5-DACF-426C-8A10-A6438D29DD66}" type="datetime1">
               <a:rPr lang="de-DE" smtClean="0"/>
               <a:pPr/>
-              <a:t>05.08.18</a:t>
+              <a:t>06.08.18</a:t>
             </a:fld>
             <a:endParaRPr lang="de-DE"/>
           </a:p>
@@ -6219,7 +6219,7 @@
             <a:fld id="{CA605C2C-549A-4615-A3C1-D5E9E9947B76}" type="datetime1">
               <a:rPr lang="de-DE" smtClean="0"/>
               <a:pPr/>
-              <a:t>05.08.18</a:t>
+              <a:t>06.08.18</a:t>
             </a:fld>
             <a:endParaRPr lang="de-DE"/>
           </a:p>
@@ -6690,7 +6690,7 @@
             <a:fld id="{DA5DE712-6C0E-4DF7-B336-AC97213DC93D}" type="datetime1">
               <a:rPr lang="de-DE" smtClean="0"/>
               <a:pPr/>
-              <a:t>05.08.18</a:t>
+              <a:t>06.08.18</a:t>
             </a:fld>
             <a:endParaRPr lang="de-DE"/>
           </a:p>
@@ -7161,7 +7161,7 @@
             <a:fld id="{DA5DE712-6C0E-4DF7-B336-AC97213DC93D}" type="datetime1">
               <a:rPr lang="de-DE" smtClean="0"/>
               <a:pPr/>
-              <a:t>05.08.18</a:t>
+              <a:t>06.08.18</a:t>
             </a:fld>
             <a:endParaRPr lang="de-DE"/>
           </a:p>
@@ -7432,7 +7432,7 @@
             <a:fld id="{12CE0ACD-0B71-463F-9507-4095300257BC}" type="datetime1">
               <a:rPr lang="de-DE" smtClean="0"/>
               <a:pPr/>
-              <a:t>05.08.18</a:t>
+              <a:t>06.08.18</a:t>
             </a:fld>
             <a:endParaRPr lang="de-DE"/>
           </a:p>
@@ -7575,7 +7575,7 @@
             <a:fld id="{89026A34-A4A3-4CC2-B452-9E4A0F73B38C}" type="datetime1">
               <a:rPr lang="de-DE" smtClean="0"/>
               <a:pPr/>
-              <a:t>05.08.18</a:t>
+              <a:t>06.08.18</a:t>
             </a:fld>
             <a:endParaRPr lang="de-DE"/>
           </a:p>
@@ -7853,7 +7853,7 @@
             <a:fld id="{D509922F-D4D2-4984-9115-CE10B66F29DF}" type="datetime1">
               <a:rPr lang="de-DE" smtClean="0"/>
               <a:pPr/>
-              <a:t>05.08.18</a:t>
+              <a:t>06.08.18</a:t>
             </a:fld>
             <a:endParaRPr lang="de-DE"/>
           </a:p>
@@ -8171,7 +8171,7 @@
             <a:fld id="{9624F9CC-0A0D-4C8D-81F7-82F64A12AE8F}" type="datetime1">
               <a:rPr lang="de-DE" smtClean="0"/>
               <a:pPr/>
-              <a:t>05.08.18</a:t>
+              <a:t>06.08.18</a:t>
             </a:fld>
             <a:endParaRPr lang="de-DE"/>
           </a:p>
@@ -9837,7 +9837,7 @@
             <a:fld id="{DA5DE712-6C0E-4DF7-B336-AC97213DC93D}" type="datetime1">
               <a:rPr lang="de-DE" smtClean="0"/>
               <a:pPr/>
-              <a:t>05.08.18</a:t>
+              <a:t>06.08.18</a:t>
             </a:fld>
             <a:endParaRPr lang="de-DE"/>
           </a:p>
@@ -12197,7 +12197,7 @@
             <a:fld id="{DA5DE712-6C0E-4DF7-B336-AC97213DC93D}" type="datetime1">
               <a:rPr lang="de-DE" smtClean="0"/>
               <a:pPr/>
-              <a:t>05.08.18</a:t>
+              <a:t>06.08.18</a:t>
             </a:fld>
             <a:endParaRPr lang="de-DE"/>
           </a:p>
@@ -14098,7 +14098,7 @@
             <a:fld id="{DA5DE712-6C0E-4DF7-B336-AC97213DC93D}" type="datetime1">
               <a:rPr lang="de-DE" smtClean="0"/>
               <a:pPr/>
-              <a:t>05.08.18</a:t>
+              <a:t>06.08.18</a:t>
             </a:fld>
             <a:endParaRPr lang="de-DE"/>
           </a:p>
@@ -16179,7 +16179,7 @@
             <a:fld id="{DA5DE712-6C0E-4DF7-B336-AC97213DC93D}" type="datetime1">
               <a:rPr lang="de-DE" smtClean="0"/>
               <a:pPr/>
-              <a:t>05.08.18</a:t>
+              <a:t>06.08.18</a:t>
             </a:fld>
             <a:endParaRPr lang="de-DE"/>
           </a:p>
@@ -16526,7 +16526,7 @@
             <a:fld id="{12CE0ACD-0B71-463F-9507-4095300257BC}" type="datetime1">
               <a:rPr lang="de-DE" smtClean="0"/>
               <a:pPr/>
-              <a:t>05.08.18</a:t>
+              <a:t>06.08.18</a:t>
             </a:fld>
             <a:endParaRPr lang="de-DE"/>
           </a:p>
@@ -16998,7 +16998,7 @@
             <a:fld id="{12CE0ACD-0B71-463F-9507-4095300257BC}" type="datetime1">
               <a:rPr lang="de-DE" smtClean="0"/>
               <a:pPr/>
-              <a:t>05.08.18</a:t>
+              <a:t>06.08.18</a:t>
             </a:fld>
             <a:endParaRPr lang="de-DE"/>
           </a:p>
@@ -17576,7 +17576,7 @@
             <a:fld id="{12CE0ACD-0B71-463F-9507-4095300257BC}" type="datetime1">
               <a:rPr lang="de-DE" smtClean="0"/>
               <a:pPr/>
-              <a:t>05.08.18</a:t>
+              <a:t>06.08.18</a:t>
             </a:fld>
             <a:endParaRPr lang="de-DE"/>
           </a:p>
@@ -17638,41 +17638,6 @@
               <a:t>16</a:t>
             </a:fld>
             <a:endParaRPr lang="de-DE"/>
-          </a:p>
-        </p:txBody>
-      </p:sp>
-      <p:sp>
-        <p:nvSpPr>
-          <p:cNvPr id="6" name="TextBox 5">
-            <a:extLst>
-              <a:ext uri="{FF2B5EF4-FFF2-40B4-BE49-F238E27FC236}">
-                <a16:creationId xmlns:a16="http://schemas.microsoft.com/office/drawing/2014/main" id="{F5DA7DEA-393A-4445-AC69-0AD7E0DE4F6C}"/>
-              </a:ext>
-            </a:extLst>
-          </p:cNvPr>
-          <p:cNvSpPr txBox="1"/>
-          <p:nvPr/>
-        </p:nvSpPr>
-        <p:spPr>
-          <a:xfrm>
-            <a:off x="2582001" y="1059582"/>
-            <a:ext cx="4052007" cy="369332"/>
-          </a:xfrm>
-          <a:prstGeom prst="rect">
-            <a:avLst/>
-          </a:prstGeom>
-          <a:noFill/>
-        </p:spPr>
-        <p:txBody>
-          <a:bodyPr wrap="none" rtlCol="0">
-            <a:spAutoFit/>
-          </a:bodyPr>
-          <a:lstStyle/>
-          <a:p>
-            <a:r>
-              <a:rPr lang="de-DE" dirty="0"/>
-              <a:t>Bestes AIC auf Log-Returns: ARIMA(0,0,0)</a:t>
-            </a:r>
           </a:p>
         </p:txBody>
       </p:sp>
@@ -17686,7 +17651,7 @@
             </a:extLst>
           </p:cNvPr>
           <p:cNvPicPr>
-            <a:picLocks noChangeAspect="1"/>
+            <a:picLocks/>
           </p:cNvPicPr>
           <p:nvPr/>
         </p:nvPicPr>
@@ -17704,14 +17669,49 @@
         </p:blipFill>
         <p:spPr>
           <a:xfrm>
-            <a:off x="413792" y="1428914"/>
-            <a:ext cx="3862800" cy="3035058"/>
+            <a:off x="0" y="1773231"/>
+            <a:ext cx="2160000" cy="1983600"/>
           </a:xfrm>
           <a:prstGeom prst="rect">
             <a:avLst/>
           </a:prstGeom>
         </p:spPr>
       </p:pic>
+      <p:sp>
+        <p:nvSpPr>
+          <p:cNvPr id="6" name="TextBox 5">
+            <a:extLst>
+              <a:ext uri="{FF2B5EF4-FFF2-40B4-BE49-F238E27FC236}">
+                <a16:creationId xmlns:a16="http://schemas.microsoft.com/office/drawing/2014/main" id="{F5DA7DEA-393A-4445-AC69-0AD7E0DE4F6C}"/>
+              </a:ext>
+            </a:extLst>
+          </p:cNvPr>
+          <p:cNvSpPr txBox="1"/>
+          <p:nvPr/>
+        </p:nvSpPr>
+        <p:spPr>
+          <a:xfrm>
+            <a:off x="2582001" y="1059582"/>
+            <a:ext cx="4052007" cy="369332"/>
+          </a:xfrm>
+          <a:prstGeom prst="rect">
+            <a:avLst/>
+          </a:prstGeom>
+          <a:noFill/>
+        </p:spPr>
+        <p:txBody>
+          <a:bodyPr wrap="none" rtlCol="0">
+            <a:spAutoFit/>
+          </a:bodyPr>
+          <a:lstStyle/>
+          <a:p>
+            <a:r>
+              <a:rPr lang="de-DE" dirty="0"/>
+              <a:t>Bestes AIC auf Log-Returns: ARIMA(0,0,0)</a:t>
+            </a:r>
+          </a:p>
+        </p:txBody>
+      </p:sp>
       <p:pic>
         <p:nvPicPr>
           <p:cNvPr id="12" name="Picture 11">
@@ -17722,7 +17722,7 @@
             </a:extLst>
           </p:cNvPr>
           <p:cNvPicPr>
-            <a:picLocks noChangeAspect="1"/>
+            <a:picLocks/>
           </p:cNvPicPr>
           <p:nvPr/>
         </p:nvPicPr>
@@ -17740,8 +17740,8 @@
         </p:blipFill>
         <p:spPr>
           <a:xfrm>
-            <a:off x="4716016" y="1428914"/>
-            <a:ext cx="3862800" cy="3035057"/>
+            <a:off x="2221917" y="1746582"/>
+            <a:ext cx="2160000" cy="1983600"/>
           </a:xfrm>
           <a:prstGeom prst="rect">
             <a:avLst/>
@@ -17783,6 +17783,78 @@
           </a:p>
         </p:txBody>
       </p:sp>
+      <p:pic>
+        <p:nvPicPr>
+          <p:cNvPr id="8" name="Picture 7">
+            <a:extLst>
+              <a:ext uri="{FF2B5EF4-FFF2-40B4-BE49-F238E27FC236}">
+                <a16:creationId xmlns:a16="http://schemas.microsoft.com/office/drawing/2014/main" id="{E4BD37D8-1B72-5349-97B3-B823AD750A75}"/>
+              </a:ext>
+            </a:extLst>
+          </p:cNvPr>
+          <p:cNvPicPr>
+            <a:picLocks/>
+          </p:cNvPicPr>
+          <p:nvPr/>
+        </p:nvPicPr>
+        <p:blipFill>
+          <a:blip r:embed="rId5">
+            <a:extLst>
+              <a:ext uri="{28A0092B-C50C-407E-A947-70E740481C1C}">
+                <a14:useLocalDpi xmlns:a14="http://schemas.microsoft.com/office/drawing/2010/main" val="0"/>
+              </a:ext>
+            </a:extLst>
+          </a:blip>
+          <a:stretch>
+            <a:fillRect/>
+          </a:stretch>
+        </p:blipFill>
+        <p:spPr>
+          <a:xfrm>
+            <a:off x="4443835" y="1746582"/>
+            <a:ext cx="2160000" cy="1983600"/>
+          </a:xfrm>
+          <a:prstGeom prst="rect">
+            <a:avLst/>
+          </a:prstGeom>
+        </p:spPr>
+      </p:pic>
+      <p:pic>
+        <p:nvPicPr>
+          <p:cNvPr id="11" name="Picture 10">
+            <a:extLst>
+              <a:ext uri="{FF2B5EF4-FFF2-40B4-BE49-F238E27FC236}">
+                <a16:creationId xmlns:a16="http://schemas.microsoft.com/office/drawing/2014/main" id="{0D94C3E8-9AE0-8442-9C07-7F8512A449DA}"/>
+              </a:ext>
+            </a:extLst>
+          </p:cNvPr>
+          <p:cNvPicPr>
+            <a:picLocks/>
+          </p:cNvPicPr>
+          <p:nvPr/>
+        </p:nvPicPr>
+        <p:blipFill>
+          <a:blip r:embed="rId6">
+            <a:extLst>
+              <a:ext uri="{28A0092B-C50C-407E-A947-70E740481C1C}">
+                <a14:useLocalDpi xmlns:a14="http://schemas.microsoft.com/office/drawing/2010/main" val="0"/>
+              </a:ext>
+            </a:extLst>
+          </a:blip>
+          <a:stretch>
+            <a:fillRect/>
+          </a:stretch>
+        </p:blipFill>
+        <p:spPr>
+          <a:xfrm>
+            <a:off x="6804248" y="1746582"/>
+            <a:ext cx="2160000" cy="1983600"/>
+          </a:xfrm>
+          <a:prstGeom prst="rect">
+            <a:avLst/>
+          </a:prstGeom>
+        </p:spPr>
+      </p:pic>
     </p:spTree>
     <p:extLst>
       <p:ext uri="{BB962C8B-B14F-4D97-AF65-F5344CB8AC3E}">
@@ -17867,7 +17939,7 @@
             <a:fld id="{12CE0ACD-0B71-463F-9507-4095300257BC}" type="datetime1">
               <a:rPr lang="de-DE" smtClean="0"/>
               <a:pPr/>
-              <a:t>05.08.18</a:t>
+              <a:t>06.08.18</a:t>
             </a:fld>
             <a:endParaRPr lang="de-DE"/>
           </a:p>
@@ -18155,7 +18227,7 @@
             <a:fld id="{D509922F-D4D2-4984-9115-CE10B66F29DF}" type="datetime1">
               <a:rPr lang="de-DE" smtClean="0"/>
               <a:pPr/>
-              <a:t>05.08.18</a:t>
+              <a:t>06.08.18</a:t>
             </a:fld>
             <a:endParaRPr lang="de-DE"/>
           </a:p>
@@ -18367,7 +18439,7 @@
             <a:fld id="{D509922F-D4D2-4984-9115-CE10B66F29DF}" type="datetime1">
               <a:rPr lang="de-DE" smtClean="0"/>
               <a:pPr/>
-              <a:t>05.08.18</a:t>
+              <a:t>06.08.18</a:t>
             </a:fld>
             <a:endParaRPr lang="de-DE"/>
           </a:p>
@@ -18718,7 +18790,7 @@
             <a:fld id="{6DB845E5-DACF-426C-8A10-A6438D29DD66}" type="datetime1">
               <a:rPr lang="de-DE" smtClean="0"/>
               <a:pPr/>
-              <a:t>05.08.18</a:t>
+              <a:t>06.08.18</a:t>
             </a:fld>
             <a:endParaRPr lang="de-DE"/>
           </a:p>
@@ -18854,7 +18926,7 @@
             <a:fld id="{12CE0ACD-0B71-463F-9507-4095300257BC}" type="datetime1">
               <a:rPr lang="de-DE" smtClean="0"/>
               <a:pPr/>
-              <a:t>05.08.18</a:t>
+              <a:t>06.08.18</a:t>
             </a:fld>
             <a:endParaRPr lang="de-DE"/>
           </a:p>
@@ -19185,7 +19257,7 @@
             <a:fld id="{6DB845E5-DACF-426C-8A10-A6438D29DD66}" type="datetime1">
               <a:rPr lang="de-DE" smtClean="0"/>
               <a:pPr/>
-              <a:t>05.08.18</a:t>
+              <a:t>06.08.18</a:t>
             </a:fld>
             <a:endParaRPr lang="de-DE"/>
           </a:p>
@@ -19497,7 +19569,7 @@
             <a:fld id="{6DB845E5-DACF-426C-8A10-A6438D29DD66}" type="datetime1">
               <a:rPr lang="de-DE" smtClean="0"/>
               <a:pPr/>
-              <a:t>05.08.18</a:t>
+              <a:t>06.08.18</a:t>
             </a:fld>
             <a:endParaRPr lang="de-DE"/>
           </a:p>
@@ -19619,7 +19691,7 @@
             <a:fld id="{19A0FC43-5E73-44C2-BFDB-9FAD1E8FED0E}" type="datetime1">
               <a:rPr lang="de-DE" smtClean="0"/>
               <a:pPr/>
-              <a:t>05.08.18</a:t>
+              <a:t>06.08.18</a:t>
             </a:fld>
             <a:endParaRPr lang="de-DE"/>
           </a:p>
@@ -19878,7 +19950,7 @@
             <a:fld id="{6DB845E5-DACF-426C-8A10-A6438D29DD66}" type="datetime1">
               <a:rPr lang="de-DE" smtClean="0"/>
               <a:pPr/>
-              <a:t>05.08.18</a:t>
+              <a:t>06.08.18</a:t>
             </a:fld>
             <a:endParaRPr lang="de-DE"/>
           </a:p>
@@ -20055,7 +20127,7 @@
             <a:fld id="{6DB845E5-DACF-426C-8A10-A6438D29DD66}" type="datetime1">
               <a:rPr lang="de-DE" smtClean="0"/>
               <a:pPr/>
-              <a:t>05.08.18</a:t>
+              <a:t>06.08.18</a:t>
             </a:fld>
             <a:endParaRPr lang="de-DE"/>
           </a:p>
@@ -20264,7 +20336,7 @@
             <a:fld id="{6DB845E5-DACF-426C-8A10-A6438D29DD66}" type="datetime1">
               <a:rPr lang="de-DE" smtClean="0"/>
               <a:pPr/>
-              <a:t>05.08.18</a:t>
+              <a:t>06.08.18</a:t>
             </a:fld>
             <a:endParaRPr lang="de-DE"/>
           </a:p>
@@ -20570,7 +20642,7 @@
             <a:fld id="{6DB845E5-DACF-426C-8A10-A6438D29DD66}" type="datetime1">
               <a:rPr lang="de-DE" smtClean="0"/>
               <a:pPr/>
-              <a:t>05.08.18</a:t>
+              <a:t>06.08.18</a:t>
             </a:fld>
             <a:endParaRPr lang="de-DE"/>
           </a:p>
@@ -20863,7 +20935,7 @@
             <a:fld id="{6DB845E5-DACF-426C-8A10-A6438D29DD66}" type="datetime1">
               <a:rPr lang="de-DE" smtClean="0"/>
               <a:pPr/>
-              <a:t>05.08.18</a:t>
+              <a:t>06.08.18</a:t>
             </a:fld>
             <a:endParaRPr lang="de-DE"/>
           </a:p>
@@ -21027,7 +21099,7 @@
             <a:fld id="{12CE0ACD-0B71-463F-9507-4095300257BC}" type="datetime1">
               <a:rPr lang="de-DE" smtClean="0"/>
               <a:pPr/>
-              <a:t>05.08.18</a:t>
+              <a:t>06.08.18</a:t>
             </a:fld>
             <a:endParaRPr lang="de-DE"/>
           </a:p>
@@ -23112,7 +23184,7 @@
             <a:fld id="{6DB845E5-DACF-426C-8A10-A6438D29DD66}" type="datetime1">
               <a:rPr lang="de-DE" smtClean="0"/>
               <a:pPr/>
-              <a:t>05.08.18</a:t>
+              <a:t>06.08.18</a:t>
             </a:fld>
             <a:endParaRPr lang="de-DE"/>
           </a:p>

</xml_diff>